<commit_message>
changed order of excercise 2 and UoE resources in DMP slides
</commit_message>
<xml_diff>
--- a/instructors/14-data_management_planning_v2.0.pptx
+++ b/instructors/14-data_management_planning_v2.0.pptx
@@ -15,13 +15,13 @@
     <p:sldId id="258" r:id="rId6"/>
     <p:sldId id="269" r:id="rId7"/>
     <p:sldId id="270" r:id="rId8"/>
-    <p:sldId id="271" r:id="rId9"/>
-    <p:sldId id="272" r:id="rId10"/>
-    <p:sldId id="335" r:id="rId11"/>
-    <p:sldId id="336" r:id="rId12"/>
-    <p:sldId id="337" r:id="rId13"/>
-    <p:sldId id="338" r:id="rId14"/>
-    <p:sldId id="262" r:id="rId15"/>
+    <p:sldId id="262" r:id="rId9"/>
+    <p:sldId id="271" r:id="rId10"/>
+    <p:sldId id="272" r:id="rId11"/>
+    <p:sldId id="335" r:id="rId12"/>
+    <p:sldId id="336" r:id="rId13"/>
+    <p:sldId id="337" r:id="rId14"/>
+    <p:sldId id="338" r:id="rId15"/>
     <p:sldId id="268" r:id="rId16"/>
   </p:sldIdLst>
   <p:sldSz cx="12192000" cy="6858000"/>
@@ -4206,434 +4206,12 @@
           <a:chExt cx="0" cy="0"/>
         </a:xfrm>
       </p:grpSpPr>
-      <p:sp>
-        <p:nvSpPr>
-          <p:cNvPr id="4" name="Title 1">
-            <a:extLst>
-              <a:ext uri="{FF2B5EF4-FFF2-40B4-BE49-F238E27FC236}">
-                <a16:creationId xmlns:a16="http://schemas.microsoft.com/office/drawing/2014/main" id="{B7C65D11-187F-415C-B5B7-D269A1D22511}"/>
-              </a:ext>
-            </a:extLst>
-          </p:cNvPr>
-          <p:cNvSpPr txBox="1">
-            <a:spLocks/>
-          </p:cNvSpPr>
-          <p:nvPr/>
-        </p:nvSpPr>
-        <p:spPr bwMode="auto">
-          <a:xfrm>
-            <a:off x="3604261" y="193664"/>
-            <a:ext cx="6097088" cy="607448"/>
-          </a:xfrm>
-          <a:prstGeom prst="rect">
-            <a:avLst/>
-          </a:prstGeom>
-          <a:noFill/>
-          <a:ln>
-            <a:noFill/>
-          </a:ln>
-          <a:extLst>
-            <a:ext uri="{909E8E84-426E-40dd-AFC4-6F175D3DCCD1}">
-              <a14:hiddenFill xmlns="" xmlns:a14="http://schemas.microsoft.com/office/drawing/2010/main">
-                <a:solidFill>
-                  <a:srgbClr val="FFFFFF"/>
-                </a:solidFill>
-              </a14:hiddenFill>
-            </a:ext>
-            <a:ext uri="{91240B29-F687-4f45-9708-019B960494DF}">
-              <a14:hiddenLine xmlns="" xmlns:a14="http://schemas.microsoft.com/office/drawing/2010/main" w="9525">
-                <a:solidFill>
-                  <a:srgbClr val="000000"/>
-                </a:solidFill>
-                <a:miter lim="800000"/>
-                <a:headEnd/>
-                <a:tailEnd/>
-              </a14:hiddenLine>
-            </a:ext>
-          </a:extLst>
-        </p:spPr>
-        <p:txBody>
-          <a:bodyPr vert="horz" wrap="square" lIns="91440" tIns="45720" rIns="91440" bIns="45720" numCol="1" anchor="ctr" anchorCtr="0" compatLnSpc="1">
-            <a:prstTxWarp prst="textNoShape">
-              <a:avLst/>
-            </a:prstTxWarp>
-          </a:bodyPr>
-          <a:lstStyle>
-            <a:lvl1pPr algn="l" rtl="0" eaLnBrk="1" fontAlgn="base" hangingPunct="1">
-              <a:lnSpc>
-                <a:spcPct val="90000"/>
-              </a:lnSpc>
-              <a:spcBef>
-                <a:spcPct val="0"/>
-              </a:spcBef>
-              <a:spcAft>
-                <a:spcPct val="0"/>
-              </a:spcAft>
-              <a:defRPr lang="en-GB" sz="3200" kern="1200" dirty="0">
-                <a:solidFill>
-                  <a:schemeClr val="tx1"/>
-                </a:solidFill>
-                <a:latin typeface="+mj-lt"/>
-                <a:ea typeface="ＭＳ Ｐゴシック" charset="-128"/>
-                <a:cs typeface="ＭＳ Ｐゴシック" charset="-128"/>
-              </a:defRPr>
-            </a:lvl1pPr>
-            <a:lvl2pPr algn="l" rtl="0" eaLnBrk="1" fontAlgn="base" hangingPunct="1">
-              <a:lnSpc>
-                <a:spcPct val="90000"/>
-              </a:lnSpc>
-              <a:spcBef>
-                <a:spcPct val="0"/>
-              </a:spcBef>
-              <a:spcAft>
-                <a:spcPct val="0"/>
-              </a:spcAft>
-              <a:defRPr sz="4400">
-                <a:solidFill>
-                  <a:schemeClr val="tx1"/>
-                </a:solidFill>
-                <a:latin typeface="Calibri Light" charset="0"/>
-                <a:ea typeface="ＭＳ Ｐゴシック" charset="-128"/>
-                <a:cs typeface="ＭＳ Ｐゴシック" charset="-128"/>
-              </a:defRPr>
-            </a:lvl2pPr>
-            <a:lvl3pPr algn="l" rtl="0" eaLnBrk="1" fontAlgn="base" hangingPunct="1">
-              <a:lnSpc>
-                <a:spcPct val="90000"/>
-              </a:lnSpc>
-              <a:spcBef>
-                <a:spcPct val="0"/>
-              </a:spcBef>
-              <a:spcAft>
-                <a:spcPct val="0"/>
-              </a:spcAft>
-              <a:defRPr sz="4400">
-                <a:solidFill>
-                  <a:schemeClr val="tx1"/>
-                </a:solidFill>
-                <a:latin typeface="Calibri Light" charset="0"/>
-                <a:ea typeface="ＭＳ Ｐゴシック" charset="-128"/>
-                <a:cs typeface="ＭＳ Ｐゴシック" charset="-128"/>
-              </a:defRPr>
-            </a:lvl3pPr>
-            <a:lvl4pPr algn="l" rtl="0" eaLnBrk="1" fontAlgn="base" hangingPunct="1">
-              <a:lnSpc>
-                <a:spcPct val="90000"/>
-              </a:lnSpc>
-              <a:spcBef>
-                <a:spcPct val="0"/>
-              </a:spcBef>
-              <a:spcAft>
-                <a:spcPct val="0"/>
-              </a:spcAft>
-              <a:defRPr sz="4400">
-                <a:solidFill>
-                  <a:schemeClr val="tx1"/>
-                </a:solidFill>
-                <a:latin typeface="Calibri Light" charset="0"/>
-                <a:ea typeface="ＭＳ Ｐゴシック" charset="-128"/>
-                <a:cs typeface="ＭＳ Ｐゴシック" charset="-128"/>
-              </a:defRPr>
-            </a:lvl4pPr>
-            <a:lvl5pPr algn="l" rtl="0" eaLnBrk="1" fontAlgn="base" hangingPunct="1">
-              <a:lnSpc>
-                <a:spcPct val="90000"/>
-              </a:lnSpc>
-              <a:spcBef>
-                <a:spcPct val="0"/>
-              </a:spcBef>
-              <a:spcAft>
-                <a:spcPct val="0"/>
-              </a:spcAft>
-              <a:defRPr sz="4400">
-                <a:solidFill>
-                  <a:schemeClr val="tx1"/>
-                </a:solidFill>
-                <a:latin typeface="Calibri Light" charset="0"/>
-                <a:ea typeface="ＭＳ Ｐゴシック" charset="-128"/>
-                <a:cs typeface="ＭＳ Ｐゴシック" charset="-128"/>
-              </a:defRPr>
-            </a:lvl5pPr>
-            <a:lvl6pPr marL="457200" algn="l" rtl="0" eaLnBrk="1" fontAlgn="base" hangingPunct="1">
-              <a:lnSpc>
-                <a:spcPct val="90000"/>
-              </a:lnSpc>
-              <a:spcBef>
-                <a:spcPct val="0"/>
-              </a:spcBef>
-              <a:spcAft>
-                <a:spcPct val="0"/>
-              </a:spcAft>
-              <a:defRPr sz="4400">
-                <a:solidFill>
-                  <a:schemeClr val="tx1"/>
-                </a:solidFill>
-                <a:latin typeface="Calibri Light" charset="0"/>
-                <a:ea typeface="ＭＳ Ｐゴシック" charset="-128"/>
-                <a:cs typeface="ＭＳ Ｐゴシック" charset="-128"/>
-              </a:defRPr>
-            </a:lvl6pPr>
-            <a:lvl7pPr marL="914400" algn="l" rtl="0" eaLnBrk="1" fontAlgn="base" hangingPunct="1">
-              <a:lnSpc>
-                <a:spcPct val="90000"/>
-              </a:lnSpc>
-              <a:spcBef>
-                <a:spcPct val="0"/>
-              </a:spcBef>
-              <a:spcAft>
-                <a:spcPct val="0"/>
-              </a:spcAft>
-              <a:defRPr sz="4400">
-                <a:solidFill>
-                  <a:schemeClr val="tx1"/>
-                </a:solidFill>
-                <a:latin typeface="Calibri Light" charset="0"/>
-                <a:ea typeface="ＭＳ Ｐゴシック" charset="-128"/>
-                <a:cs typeface="ＭＳ Ｐゴシック" charset="-128"/>
-              </a:defRPr>
-            </a:lvl7pPr>
-            <a:lvl8pPr marL="1371600" algn="l" rtl="0" eaLnBrk="1" fontAlgn="base" hangingPunct="1">
-              <a:lnSpc>
-                <a:spcPct val="90000"/>
-              </a:lnSpc>
-              <a:spcBef>
-                <a:spcPct val="0"/>
-              </a:spcBef>
-              <a:spcAft>
-                <a:spcPct val="0"/>
-              </a:spcAft>
-              <a:defRPr sz="4400">
-                <a:solidFill>
-                  <a:schemeClr val="tx1"/>
-                </a:solidFill>
-                <a:latin typeface="Calibri Light" charset="0"/>
-                <a:ea typeface="ＭＳ Ｐゴシック" charset="-128"/>
-                <a:cs typeface="ＭＳ Ｐゴシック" charset="-128"/>
-              </a:defRPr>
-            </a:lvl8pPr>
-            <a:lvl9pPr marL="1828800" algn="l" rtl="0" eaLnBrk="1" fontAlgn="base" hangingPunct="1">
-              <a:lnSpc>
-                <a:spcPct val="90000"/>
-              </a:lnSpc>
-              <a:spcBef>
-                <a:spcPct val="0"/>
-              </a:spcBef>
-              <a:spcAft>
-                <a:spcPct val="0"/>
-              </a:spcAft>
-              <a:defRPr sz="4400">
-                <a:solidFill>
-                  <a:schemeClr val="tx1"/>
-                </a:solidFill>
-                <a:latin typeface="Calibri Light" charset="0"/>
-                <a:ea typeface="ＭＳ Ｐゴシック" charset="-128"/>
-                <a:cs typeface="ＭＳ Ｐゴシック" charset="-128"/>
-              </a:defRPr>
-            </a:lvl9pPr>
-          </a:lstStyle>
-          <a:p>
-            <a:r>
-              <a:rPr lang="en-GB" sz="2800" dirty="0">
-                <a:solidFill>
-                  <a:schemeClr val="bg1"/>
-                </a:solidFill>
-                <a:latin typeface="Arial" panose="020B0604020202020204" pitchFamily="34" charset="0"/>
-                <a:cs typeface="Arial" panose="020B0604020202020204" pitchFamily="34" charset="0"/>
-              </a:rPr>
-              <a:t>RDM </a:t>
-            </a:r>
-            <a:r>
-              <a:rPr lang="pl-PL" sz="2800" dirty="0">
-                <a:solidFill>
-                  <a:schemeClr val="bg1"/>
-                </a:solidFill>
-                <a:latin typeface="Arial" panose="020B0604020202020204" pitchFamily="34" charset="0"/>
-                <a:cs typeface="Arial" panose="020B0604020202020204" pitchFamily="34" charset="0"/>
-              </a:rPr>
-              <a:t>as part of </a:t>
-            </a:r>
-            <a:r>
-              <a:rPr lang="en-GB" sz="2800" dirty="0">
-                <a:solidFill>
-                  <a:schemeClr val="bg1"/>
-                </a:solidFill>
-                <a:latin typeface="Arial" panose="020B0604020202020204" pitchFamily="34" charset="0"/>
-                <a:cs typeface="Arial" panose="020B0604020202020204" pitchFamily="34" charset="0"/>
-              </a:rPr>
-              <a:t>the </a:t>
-            </a:r>
-            <a:r>
-              <a:rPr lang="pl-PL" sz="2800" dirty="0">
-                <a:solidFill>
-                  <a:schemeClr val="bg1"/>
-                </a:solidFill>
-                <a:latin typeface="Arial" panose="020B0604020202020204" pitchFamily="34" charset="0"/>
-                <a:cs typeface="Arial" panose="020B0604020202020204" pitchFamily="34" charset="0"/>
-              </a:rPr>
-              <a:t>workflow</a:t>
-            </a:r>
-            <a:endParaRPr lang="en-GB" sz="2800" kern="0" dirty="0">
-              <a:solidFill>
-                <a:schemeClr val="bg1"/>
-              </a:solidFill>
-              <a:latin typeface="Arial" panose="020B0604020202020204" pitchFamily="34" charset="0"/>
-              <a:cs typeface="Arial" panose="020B0604020202020204" pitchFamily="34" charset="0"/>
-            </a:endParaRPr>
-          </a:p>
-        </p:txBody>
-      </p:sp>
-      <p:sp>
-        <p:nvSpPr>
-          <p:cNvPr id="21" name="TextBox 20">
-            <a:extLst>
-              <a:ext uri="{FF2B5EF4-FFF2-40B4-BE49-F238E27FC236}">
-                <a16:creationId xmlns:a16="http://schemas.microsoft.com/office/drawing/2014/main" id="{B4A1FDA6-9A54-40DF-AB76-AC86A3DBCAFE}"/>
-              </a:ext>
-            </a:extLst>
-          </p:cNvPr>
-          <p:cNvSpPr txBox="1"/>
-          <p:nvPr/>
-        </p:nvSpPr>
-        <p:spPr>
-          <a:xfrm>
-            <a:off x="2069120" y="1331780"/>
-            <a:ext cx="8053760" cy="2542363"/>
-          </a:xfrm>
-          <a:prstGeom prst="rect">
-            <a:avLst/>
-          </a:prstGeom>
-          <a:noFill/>
-        </p:spPr>
-        <p:txBody>
-          <a:bodyPr wrap="square" rtlCol="0">
-            <a:spAutoFit/>
-          </a:bodyPr>
-          <a:lstStyle/>
-          <a:p>
-            <a:pPr marL="285750" indent="-285750">
-              <a:lnSpc>
-                <a:spcPct val="150000"/>
-              </a:lnSpc>
-              <a:buFont typeface="Arial" panose="020B0604020202020204" pitchFamily="34" charset="0"/>
-              <a:buChar char="•"/>
-            </a:pPr>
-            <a:r>
-              <a:rPr lang="en-GB" dirty="0"/>
-              <a:t>‘Golden’ copy of data.</a:t>
-            </a:r>
-          </a:p>
-          <a:p>
-            <a:pPr marL="285750" indent="-285750">
-              <a:lnSpc>
-                <a:spcPct val="150000"/>
-              </a:lnSpc>
-              <a:buFont typeface="Arial" panose="020B0604020202020204" pitchFamily="34" charset="0"/>
-              <a:buChar char="•"/>
-            </a:pPr>
-            <a:r>
-              <a:rPr lang="en-GB" dirty="0"/>
-              <a:t>Full encryption for sensitive data.</a:t>
-            </a:r>
-          </a:p>
-          <a:p>
-            <a:pPr marL="285750" indent="-285750">
-              <a:lnSpc>
-                <a:spcPct val="150000"/>
-              </a:lnSpc>
-              <a:buFont typeface="Arial" panose="020B0604020202020204" pitchFamily="34" charset="0"/>
-              <a:buChar char="•"/>
-            </a:pPr>
-            <a:r>
-              <a:rPr lang="en-GB" dirty="0"/>
-              <a:t>Long term storage of research data.</a:t>
-            </a:r>
-          </a:p>
-          <a:p>
-            <a:pPr marL="285750" indent="-285750">
-              <a:lnSpc>
-                <a:spcPct val="150000"/>
-              </a:lnSpc>
-              <a:buFont typeface="Arial" panose="020B0604020202020204" pitchFamily="34" charset="0"/>
-              <a:buChar char="•"/>
-            </a:pPr>
-            <a:r>
-              <a:rPr lang="en-GB" dirty="0"/>
-              <a:t>Permanent dataset identifier DOI.</a:t>
-            </a:r>
-          </a:p>
-          <a:p>
-            <a:pPr marL="285750" indent="-285750">
-              <a:lnSpc>
-                <a:spcPct val="150000"/>
-              </a:lnSpc>
-              <a:buFont typeface="Arial" panose="020B0604020202020204" pitchFamily="34" charset="0"/>
-              <a:buChar char="•"/>
-            </a:pPr>
-            <a:r>
-              <a:rPr lang="en-GB" dirty="0"/>
-              <a:t>Required by funders (e.g.: BBSRC requires 10 years of long term data storage after a research project has finished).</a:t>
-            </a:r>
-          </a:p>
-        </p:txBody>
-      </p:sp>
-      <p:sp>
-        <p:nvSpPr>
-          <p:cNvPr id="14" name="TextBox 13">
-            <a:extLst>
-              <a:ext uri="{FF2B5EF4-FFF2-40B4-BE49-F238E27FC236}">
-                <a16:creationId xmlns:a16="http://schemas.microsoft.com/office/drawing/2014/main" id="{6D8FC977-CB4F-4AA9-8254-B3840E55B9EC}"/>
-              </a:ext>
-            </a:extLst>
-          </p:cNvPr>
-          <p:cNvSpPr txBox="1"/>
-          <p:nvPr/>
-        </p:nvSpPr>
-        <p:spPr>
-          <a:xfrm>
-            <a:off x="1265074" y="5028539"/>
-            <a:ext cx="9661852" cy="646331"/>
-          </a:xfrm>
-          <a:prstGeom prst="rect">
-            <a:avLst/>
-          </a:prstGeom>
-          <a:noFill/>
-        </p:spPr>
-        <p:txBody>
-          <a:bodyPr wrap="square">
-            <a:spAutoFit/>
-          </a:bodyPr>
-          <a:lstStyle/>
-          <a:p>
-            <a:r>
-              <a:rPr lang="en-GB" dirty="0">
-                <a:hlinkClick r:id="rId2"/>
-              </a:rPr>
-              <a:t>https://www.wiki.ed.ac.uk/x/3smBGQ</a:t>
-            </a:r>
-            <a:endParaRPr lang="pl-PL" dirty="0">
-              <a:hlinkClick r:id="rId2"/>
-            </a:endParaRPr>
-          </a:p>
-          <a:p>
-            <a:r>
-              <a:rPr lang="en-GB" dirty="0">
-                <a:hlinkClick r:id="rId2"/>
-              </a:rPr>
-              <a:t>https://www.ed.ac.uk/information-services/research-support/research-data-service/after/datavault</a:t>
-            </a:r>
-            <a:r>
-              <a:rPr lang="en-GB" dirty="0"/>
-              <a:t> </a:t>
-            </a:r>
-          </a:p>
-        </p:txBody>
-      </p:sp>
       <p:pic>
         <p:nvPicPr>
-          <p:cNvPr id="15" name="Picture 2" descr="Ed_DaSH">
-            <a:extLst>
-              <a:ext uri="{FF2B5EF4-FFF2-40B4-BE49-F238E27FC236}">
-                <a16:creationId xmlns:a16="http://schemas.microsoft.com/office/drawing/2014/main" id="{C3A7EB11-F737-4E59-98C0-89D512297C46}"/>
+          <p:cNvPr id="4" name="Picture 2" descr="Ed_DaSH">
+            <a:extLst>
+              <a:ext uri="{FF2B5EF4-FFF2-40B4-BE49-F238E27FC236}">
+                <a16:creationId xmlns:a16="http://schemas.microsoft.com/office/drawing/2014/main" id="{268E435B-ABCF-4E47-99FC-7B83F9E83698}"/>
               </a:ext>
             </a:extLst>
           </p:cNvPr>
@@ -4643,7 +4221,7 @@
           <p:nvPr/>
         </p:nvPicPr>
         <p:blipFill>
-          <a:blip r:embed="rId3">
+          <a:blip r:embed="rId2">
             <a:extLst>
               <a:ext uri="{28A0092B-C50C-407E-A947-70E740481C1C}">
                 <a14:useLocalDpi xmlns:a14="http://schemas.microsoft.com/office/drawing/2010/main" val="0"/>
@@ -4677,10 +4255,10 @@
       </p:pic>
       <p:sp>
         <p:nvSpPr>
-          <p:cNvPr id="16" name="TextBox 15">
-            <a:extLst>
-              <a:ext uri="{FF2B5EF4-FFF2-40B4-BE49-F238E27FC236}">
-                <a16:creationId xmlns:a16="http://schemas.microsoft.com/office/drawing/2014/main" id="{9EEED67F-1E1B-4255-ACD6-15E77A5FB269}"/>
+          <p:cNvPr id="5" name="TextBox 4">
+            <a:extLst>
+              <a:ext uri="{FF2B5EF4-FFF2-40B4-BE49-F238E27FC236}">
+                <a16:creationId xmlns:a16="http://schemas.microsoft.com/office/drawing/2014/main" id="{DEF75148-C2ED-43D3-9AFC-0148A8784CF8}"/>
               </a:ext>
             </a:extLst>
           </p:cNvPr>
@@ -4689,8 +4267,8 @@
         </p:nvSpPr>
         <p:spPr>
           <a:xfrm>
-            <a:off x="515880" y="488425"/>
-            <a:ext cx="9464530" cy="646331"/>
+            <a:off x="1956883" y="1152070"/>
+            <a:ext cx="8053760" cy="2126864"/>
           </a:xfrm>
           <a:prstGeom prst="rect">
             <a:avLst/>
@@ -4698,41 +4276,120 @@
           <a:noFill/>
         </p:spPr>
         <p:txBody>
+          <a:bodyPr wrap="square" rtlCol="0">
+            <a:spAutoFit/>
+          </a:bodyPr>
+          <a:lstStyle/>
+          <a:p>
+            <a:pPr marL="285750" indent="-285750">
+              <a:lnSpc>
+                <a:spcPct val="150000"/>
+              </a:lnSpc>
+              <a:buFont typeface="Arial" panose="020B0604020202020204" pitchFamily="34" charset="0"/>
+              <a:buChar char="•"/>
+            </a:pPr>
+            <a:r>
+              <a:rPr lang="en-GB" dirty="0"/>
+              <a:t>It is an active storage solution, which is backed up off site (3 secure locations).</a:t>
+            </a:r>
+          </a:p>
+          <a:p>
+            <a:pPr marL="285750" indent="-285750">
+              <a:lnSpc>
+                <a:spcPct val="150000"/>
+              </a:lnSpc>
+              <a:buFont typeface="Arial" panose="020B0604020202020204" pitchFamily="34" charset="0"/>
+              <a:buChar char="•"/>
+            </a:pPr>
+            <a:r>
+              <a:rPr lang="en-GB" dirty="0"/>
+              <a:t>500 Gb per PhD student of free storage (there is a fee for more space).</a:t>
+            </a:r>
+          </a:p>
+          <a:p>
+            <a:pPr marL="285750" indent="-285750">
+              <a:lnSpc>
+                <a:spcPct val="150000"/>
+              </a:lnSpc>
+              <a:buFont typeface="Arial" panose="020B0604020202020204" pitchFamily="34" charset="0"/>
+              <a:buChar char="•"/>
+            </a:pPr>
+            <a:r>
+              <a:rPr lang="en-GB" dirty="0"/>
+              <a:t>Data can be shared with all lab members or with someone specific within the UoE community.</a:t>
+            </a:r>
+          </a:p>
+          <a:p>
+            <a:pPr marL="285750" indent="-285750">
+              <a:lnSpc>
+                <a:spcPct val="150000"/>
+              </a:lnSpc>
+              <a:buFont typeface="Arial" panose="020B0604020202020204" pitchFamily="34" charset="0"/>
+              <a:buChar char="•"/>
+            </a:pPr>
+            <a:r>
+              <a:rPr lang="en-GB" dirty="0"/>
+              <a:t>Closed when you leave University (there is a small grace period before deletion).</a:t>
+            </a:r>
+          </a:p>
+        </p:txBody>
+      </p:sp>
+      <p:sp>
+        <p:nvSpPr>
+          <p:cNvPr id="6" name="TextBox 5">
+            <a:extLst>
+              <a:ext uri="{FF2B5EF4-FFF2-40B4-BE49-F238E27FC236}">
+                <a16:creationId xmlns:a16="http://schemas.microsoft.com/office/drawing/2014/main" id="{1ACFE7B6-EEC6-491B-8FDB-BDDEC13AB997}"/>
+              </a:ext>
+            </a:extLst>
+          </p:cNvPr>
+          <p:cNvSpPr txBox="1"/>
+          <p:nvPr/>
+        </p:nvSpPr>
+        <p:spPr>
+          <a:xfrm>
+            <a:off x="1125416" y="4361301"/>
+            <a:ext cx="9941168" cy="646331"/>
+          </a:xfrm>
+          <a:prstGeom prst="rect">
+            <a:avLst/>
+          </a:prstGeom>
+          <a:noFill/>
+        </p:spPr>
+        <p:txBody>
           <a:bodyPr wrap="square">
             <a:spAutoFit/>
           </a:bodyPr>
           <a:lstStyle/>
           <a:p>
             <a:r>
-              <a:rPr lang="en-GB" sz="3600" dirty="0">
-                <a:solidFill>
-                  <a:srgbClr val="0070C0"/>
-                </a:solidFill>
-              </a:rPr>
-              <a:t>After: UoE </a:t>
-            </a:r>
-            <a:r>
-              <a:rPr lang="en-GB" sz="3600" dirty="0" err="1">
-                <a:solidFill>
-                  <a:srgbClr val="0070C0"/>
-                </a:solidFill>
-              </a:rPr>
-              <a:t>DataVault</a:t>
-            </a:r>
-            <a:endParaRPr lang="en-GB" sz="3600" dirty="0">
-              <a:solidFill>
-                <a:srgbClr val="0070C0"/>
-              </a:solidFill>
-            </a:endParaRPr>
-          </a:p>
-        </p:txBody>
-      </p:sp>
-      <p:sp>
-        <p:nvSpPr>
-          <p:cNvPr id="19" name="Arrow: Down 18">
-            <a:extLst>
-              <a:ext uri="{FF2B5EF4-FFF2-40B4-BE49-F238E27FC236}">
-                <a16:creationId xmlns:a16="http://schemas.microsoft.com/office/drawing/2014/main" id="{A2186F0E-0C8E-4E20-8320-4482DEA668F0}"/>
+              <a:rPr lang="en-GB" dirty="0">
+                <a:hlinkClick r:id="rId3"/>
+              </a:rPr>
+              <a:t>https://www.ed.ac.uk/information-services/research-support/research-data-service/during/data-storage</a:t>
+            </a:r>
+            <a:endParaRPr lang="en-GB" dirty="0"/>
+          </a:p>
+          <a:p>
+            <a:r>
+              <a:rPr lang="en-GB" dirty="0">
+                <a:hlinkClick r:id="rId4"/>
+              </a:rPr>
+              <a:t>https://www.wiki.ed.ac.uk/x/tet_H</a:t>
+            </a:r>
+            <a:r>
+              <a:rPr lang="en-GB" dirty="0"/>
+              <a:t>  </a:t>
+            </a:r>
+          </a:p>
+        </p:txBody>
+      </p:sp>
+      <p:sp>
+        <p:nvSpPr>
+          <p:cNvPr id="7" name="Arrow: Down 6">
+            <a:extLst>
+              <a:ext uri="{FF2B5EF4-FFF2-40B4-BE49-F238E27FC236}">
+                <a16:creationId xmlns:a16="http://schemas.microsoft.com/office/drawing/2014/main" id="{7FC09654-64CA-4B4E-83DC-39E2EBA03F2A}"/>
               </a:ext>
             </a:extLst>
           </p:cNvPr>
@@ -4741,7 +4398,7 @@
         </p:nvSpPr>
         <p:spPr>
           <a:xfrm>
-            <a:off x="5162422" y="4112075"/>
+            <a:off x="5705033" y="3429000"/>
             <a:ext cx="781934" cy="806248"/>
           </a:xfrm>
           <a:prstGeom prst="downArrow">
@@ -4775,10 +4432,10 @@
       </p:sp>
       <p:sp>
         <p:nvSpPr>
-          <p:cNvPr id="20" name="TextBox 19">
-            <a:extLst>
-              <a:ext uri="{FF2B5EF4-FFF2-40B4-BE49-F238E27FC236}">
-                <a16:creationId xmlns:a16="http://schemas.microsoft.com/office/drawing/2014/main" id="{5FBF0767-F103-4FC1-BDDF-531007A5F7D3}"/>
+          <p:cNvPr id="8" name="TextBox 7">
+            <a:extLst>
+              <a:ext uri="{FF2B5EF4-FFF2-40B4-BE49-F238E27FC236}">
+                <a16:creationId xmlns:a16="http://schemas.microsoft.com/office/drawing/2014/main" id="{0C50DA4B-3502-4997-9D40-09033F3CCC73}"/>
               </a:ext>
             </a:extLst>
           </p:cNvPr>
@@ -4787,7 +4444,7 @@
         </p:nvSpPr>
         <p:spPr>
           <a:xfrm>
-            <a:off x="6078063" y="4388466"/>
+            <a:off x="6620674" y="3595175"/>
             <a:ext cx="4199996" cy="369332"/>
           </a:xfrm>
           <a:prstGeom prst="rect">
@@ -4816,10 +4473,220 @@
           </a:p>
         </p:txBody>
       </p:sp>
+      <p:sp>
+        <p:nvSpPr>
+          <p:cNvPr id="9" name="TextBox 8">
+            <a:extLst>
+              <a:ext uri="{FF2B5EF4-FFF2-40B4-BE49-F238E27FC236}">
+                <a16:creationId xmlns:a16="http://schemas.microsoft.com/office/drawing/2014/main" id="{573716CB-7B45-42F4-BF46-7C09BBFD4156}"/>
+              </a:ext>
+            </a:extLst>
+          </p:cNvPr>
+          <p:cNvSpPr txBox="1"/>
+          <p:nvPr/>
+        </p:nvSpPr>
+        <p:spPr>
+          <a:xfrm>
+            <a:off x="2277762" y="5531795"/>
+            <a:ext cx="7732881" cy="923330"/>
+          </a:xfrm>
+          <a:prstGeom prst="rect">
+            <a:avLst/>
+          </a:prstGeom>
+          <a:noFill/>
+        </p:spPr>
+        <p:txBody>
+          <a:bodyPr wrap="square" numCol="3">
+            <a:spAutoFit/>
+          </a:bodyPr>
+          <a:lstStyle/>
+          <a:p>
+            <a:pPr marL="285750" indent="-285750">
+              <a:buFont typeface="Arial" panose="020B0604020202020204" pitchFamily="34" charset="0"/>
+              <a:buChar char="•"/>
+            </a:pPr>
+            <a:r>
+              <a:rPr lang="en-GB" dirty="0"/>
+              <a:t>ELNs</a:t>
+            </a:r>
+          </a:p>
+          <a:p>
+            <a:pPr marL="285750" indent="-285750">
+              <a:buFont typeface="Arial" panose="020B0604020202020204" pitchFamily="34" charset="0"/>
+              <a:buChar char="•"/>
+            </a:pPr>
+            <a:r>
+              <a:rPr lang="en-GB" dirty="0"/>
+              <a:t>UoE Data </a:t>
+            </a:r>
+            <a:r>
+              <a:rPr lang="en-GB" dirty="0" err="1"/>
+              <a:t>SafeHaven</a:t>
+            </a:r>
+            <a:endParaRPr lang="en-GB" dirty="0"/>
+          </a:p>
+          <a:p>
+            <a:pPr marL="285750" indent="-285750">
+              <a:buFont typeface="Arial" panose="020B0604020202020204" pitchFamily="34" charset="0"/>
+              <a:buChar char="•"/>
+            </a:pPr>
+            <a:r>
+              <a:rPr lang="en-GB" dirty="0"/>
+              <a:t>UoE </a:t>
+            </a:r>
+            <a:r>
+              <a:rPr lang="en-GB" dirty="0" err="1"/>
+              <a:t>DataSync</a:t>
+            </a:r>
+            <a:endParaRPr lang="en-GB" dirty="0"/>
+          </a:p>
+          <a:p>
+            <a:pPr marL="285750" indent="-285750">
+              <a:buFont typeface="Arial" panose="020B0604020202020204" pitchFamily="34" charset="0"/>
+              <a:buChar char="•"/>
+            </a:pPr>
+            <a:r>
+              <a:rPr lang="en-GB" dirty="0"/>
+              <a:t>UoE Wiki</a:t>
+            </a:r>
+          </a:p>
+          <a:p>
+            <a:pPr marL="285750" indent="-285750">
+              <a:buFont typeface="Arial" panose="020B0604020202020204" pitchFamily="34" charset="0"/>
+              <a:buChar char="•"/>
+            </a:pPr>
+            <a:r>
+              <a:rPr lang="en-GB" dirty="0"/>
+              <a:t>UoE SharePoint</a:t>
+            </a:r>
+          </a:p>
+          <a:p>
+            <a:pPr marL="285750" indent="-285750">
+              <a:buFont typeface="Arial" panose="020B0604020202020204" pitchFamily="34" charset="0"/>
+              <a:buChar char="•"/>
+            </a:pPr>
+            <a:r>
+              <a:rPr lang="en-GB" dirty="0"/>
+              <a:t>UoE ECDF</a:t>
+            </a:r>
+          </a:p>
+          <a:p>
+            <a:pPr marL="285750" indent="-285750">
+              <a:buFont typeface="Arial" panose="020B0604020202020204" pitchFamily="34" charset="0"/>
+              <a:buChar char="•"/>
+            </a:pPr>
+            <a:r>
+              <a:rPr lang="en-GB" dirty="0"/>
+              <a:t>UoE GitLab</a:t>
+            </a:r>
+          </a:p>
+          <a:p>
+            <a:pPr marL="285750" indent="-285750">
+              <a:buFont typeface="Arial" panose="020B0604020202020204" pitchFamily="34" charset="0"/>
+              <a:buChar char="•"/>
+            </a:pPr>
+            <a:r>
+              <a:rPr lang="en-GB" dirty="0"/>
+              <a:t>UoE Subversion</a:t>
+            </a:r>
+          </a:p>
+        </p:txBody>
+      </p:sp>
+      <p:sp>
+        <p:nvSpPr>
+          <p:cNvPr id="10" name="TextBox 9">
+            <a:extLst>
+              <a:ext uri="{FF2B5EF4-FFF2-40B4-BE49-F238E27FC236}">
+                <a16:creationId xmlns:a16="http://schemas.microsoft.com/office/drawing/2014/main" id="{2DE95651-93C5-4ACB-9DB8-44BE36B18E3B}"/>
+              </a:ext>
+            </a:extLst>
+          </p:cNvPr>
+          <p:cNvSpPr txBox="1"/>
+          <p:nvPr/>
+        </p:nvSpPr>
+        <p:spPr>
+          <a:xfrm>
+            <a:off x="1854783" y="5162463"/>
+            <a:ext cx="1307730" cy="369332"/>
+          </a:xfrm>
+          <a:prstGeom prst="rect">
+            <a:avLst/>
+          </a:prstGeom>
+          <a:noFill/>
+        </p:spPr>
+        <p:txBody>
+          <a:bodyPr wrap="none" rtlCol="0">
+            <a:spAutoFit/>
+          </a:bodyPr>
+          <a:lstStyle/>
+          <a:p>
+            <a:r>
+              <a:rPr lang="en-GB" dirty="0">
+                <a:solidFill>
+                  <a:srgbClr val="002060"/>
+                </a:solidFill>
+              </a:rPr>
+              <a:t>Other tools:</a:t>
+            </a:r>
+          </a:p>
+        </p:txBody>
+      </p:sp>
+      <p:sp>
+        <p:nvSpPr>
+          <p:cNvPr id="11" name="TextBox 10">
+            <a:extLst>
+              <a:ext uri="{FF2B5EF4-FFF2-40B4-BE49-F238E27FC236}">
+                <a16:creationId xmlns:a16="http://schemas.microsoft.com/office/drawing/2014/main" id="{0B72F59E-464E-4BC5-89A1-053FD5537CF2}"/>
+              </a:ext>
+            </a:extLst>
+          </p:cNvPr>
+          <p:cNvSpPr txBox="1"/>
+          <p:nvPr/>
+        </p:nvSpPr>
+        <p:spPr>
+          <a:xfrm>
+            <a:off x="515880" y="488425"/>
+            <a:ext cx="9464530" cy="646331"/>
+          </a:xfrm>
+          <a:prstGeom prst="rect">
+            <a:avLst/>
+          </a:prstGeom>
+          <a:noFill/>
+        </p:spPr>
+        <p:txBody>
+          <a:bodyPr wrap="square">
+            <a:spAutoFit/>
+          </a:bodyPr>
+          <a:lstStyle/>
+          <a:p>
+            <a:r>
+              <a:rPr lang="en-GB" sz="3600" dirty="0">
+                <a:solidFill>
+                  <a:srgbClr val="0070C0"/>
+                </a:solidFill>
+              </a:rPr>
+              <a:t>During: UoE </a:t>
+            </a:r>
+            <a:r>
+              <a:rPr lang="en-GB" sz="3600" dirty="0" err="1">
+                <a:solidFill>
+                  <a:srgbClr val="0070C0"/>
+                </a:solidFill>
+              </a:rPr>
+              <a:t>DataStore</a:t>
+            </a:r>
+            <a:endParaRPr lang="en-GB" sz="3600" dirty="0">
+              <a:solidFill>
+                <a:srgbClr val="0070C0"/>
+              </a:solidFill>
+            </a:endParaRPr>
+          </a:p>
+        </p:txBody>
+      </p:sp>
     </p:spTree>
     <p:extLst>
       <p:ext uri="{BB962C8B-B14F-4D97-AF65-F5344CB8AC3E}">
-        <p14:creationId xmlns:p14="http://schemas.microsoft.com/office/powerpoint/2010/main" val="462202419"/>
+        <p14:creationId xmlns:p14="http://schemas.microsoft.com/office/powerpoint/2010/main" val="3785654337"/>
       </p:ext>
     </p:extLst>
   </p:cSld>
@@ -4874,14 +4741,14 @@
           </a:ln>
           <a:extLst>
             <a:ext uri="{909E8E84-426E-40dd-AFC4-6F175D3DCCD1}">
-              <a14:hiddenFill xmlns="" xmlns:a14="http://schemas.microsoft.com/office/drawing/2010/main">
+              <a14:hiddenFill xmlns:a14="http://schemas.microsoft.com/office/drawing/2010/main" xmlns="">
                 <a:solidFill>
                   <a:srgbClr val="FFFFFF"/>
                 </a:solidFill>
               </a14:hiddenFill>
             </a:ext>
             <a:ext uri="{91240B29-F687-4f45-9708-019B960494DF}">
-              <a14:hiddenLine xmlns="" xmlns:a14="http://schemas.microsoft.com/office/drawing/2010/main" w="9525">
+              <a14:hiddenLine xmlns:a14="http://schemas.microsoft.com/office/drawing/2010/main" xmlns="" w="9525">
                 <a:solidFill>
                   <a:srgbClr val="000000"/>
                 </a:solidFill>
@@ -5122,6 +4989,152 @@
           </a:p>
         </p:txBody>
       </p:sp>
+      <p:sp>
+        <p:nvSpPr>
+          <p:cNvPr id="21" name="TextBox 20">
+            <a:extLst>
+              <a:ext uri="{FF2B5EF4-FFF2-40B4-BE49-F238E27FC236}">
+                <a16:creationId xmlns:a16="http://schemas.microsoft.com/office/drawing/2014/main" id="{B4A1FDA6-9A54-40DF-AB76-AC86A3DBCAFE}"/>
+              </a:ext>
+            </a:extLst>
+          </p:cNvPr>
+          <p:cNvSpPr txBox="1"/>
+          <p:nvPr/>
+        </p:nvSpPr>
+        <p:spPr>
+          <a:xfrm>
+            <a:off x="2069120" y="1331780"/>
+            <a:ext cx="8053760" cy="2542363"/>
+          </a:xfrm>
+          <a:prstGeom prst="rect">
+            <a:avLst/>
+          </a:prstGeom>
+          <a:noFill/>
+        </p:spPr>
+        <p:txBody>
+          <a:bodyPr wrap="square" rtlCol="0">
+            <a:spAutoFit/>
+          </a:bodyPr>
+          <a:lstStyle/>
+          <a:p>
+            <a:pPr marL="285750" indent="-285750">
+              <a:lnSpc>
+                <a:spcPct val="150000"/>
+              </a:lnSpc>
+              <a:buFont typeface="Arial" panose="020B0604020202020204" pitchFamily="34" charset="0"/>
+              <a:buChar char="•"/>
+            </a:pPr>
+            <a:r>
+              <a:rPr lang="en-GB" dirty="0"/>
+              <a:t>‘Golden’ copy of data.</a:t>
+            </a:r>
+          </a:p>
+          <a:p>
+            <a:pPr marL="285750" indent="-285750">
+              <a:lnSpc>
+                <a:spcPct val="150000"/>
+              </a:lnSpc>
+              <a:buFont typeface="Arial" panose="020B0604020202020204" pitchFamily="34" charset="0"/>
+              <a:buChar char="•"/>
+            </a:pPr>
+            <a:r>
+              <a:rPr lang="en-GB" dirty="0"/>
+              <a:t>Full encryption for sensitive data.</a:t>
+            </a:r>
+          </a:p>
+          <a:p>
+            <a:pPr marL="285750" indent="-285750">
+              <a:lnSpc>
+                <a:spcPct val="150000"/>
+              </a:lnSpc>
+              <a:buFont typeface="Arial" panose="020B0604020202020204" pitchFamily="34" charset="0"/>
+              <a:buChar char="•"/>
+            </a:pPr>
+            <a:r>
+              <a:rPr lang="en-GB" dirty="0"/>
+              <a:t>Long term storage of research data.</a:t>
+            </a:r>
+          </a:p>
+          <a:p>
+            <a:pPr marL="285750" indent="-285750">
+              <a:lnSpc>
+                <a:spcPct val="150000"/>
+              </a:lnSpc>
+              <a:buFont typeface="Arial" panose="020B0604020202020204" pitchFamily="34" charset="0"/>
+              <a:buChar char="•"/>
+            </a:pPr>
+            <a:r>
+              <a:rPr lang="en-GB" dirty="0"/>
+              <a:t>Permanent dataset identifier DOI.</a:t>
+            </a:r>
+          </a:p>
+          <a:p>
+            <a:pPr marL="285750" indent="-285750">
+              <a:lnSpc>
+                <a:spcPct val="150000"/>
+              </a:lnSpc>
+              <a:buFont typeface="Arial" panose="020B0604020202020204" pitchFamily="34" charset="0"/>
+              <a:buChar char="•"/>
+            </a:pPr>
+            <a:r>
+              <a:rPr lang="en-GB" dirty="0"/>
+              <a:t>Required by funders (e.g.: BBSRC requires 10 years of long term data storage after a research project has finished).</a:t>
+            </a:r>
+          </a:p>
+        </p:txBody>
+      </p:sp>
+      <p:sp>
+        <p:nvSpPr>
+          <p:cNvPr id="14" name="TextBox 13">
+            <a:extLst>
+              <a:ext uri="{FF2B5EF4-FFF2-40B4-BE49-F238E27FC236}">
+                <a16:creationId xmlns:a16="http://schemas.microsoft.com/office/drawing/2014/main" id="{6D8FC977-CB4F-4AA9-8254-B3840E55B9EC}"/>
+              </a:ext>
+            </a:extLst>
+          </p:cNvPr>
+          <p:cNvSpPr txBox="1"/>
+          <p:nvPr/>
+        </p:nvSpPr>
+        <p:spPr>
+          <a:xfrm>
+            <a:off x="1265074" y="5028539"/>
+            <a:ext cx="9661852" cy="646331"/>
+          </a:xfrm>
+          <a:prstGeom prst="rect">
+            <a:avLst/>
+          </a:prstGeom>
+          <a:noFill/>
+        </p:spPr>
+        <p:txBody>
+          <a:bodyPr wrap="square">
+            <a:spAutoFit/>
+          </a:bodyPr>
+          <a:lstStyle/>
+          <a:p>
+            <a:r>
+              <a:rPr lang="en-GB" dirty="0">
+                <a:hlinkClick r:id="rId2"/>
+              </a:rPr>
+              <a:t>https://www.wiki.ed.ac.uk/x/3smBGQ</a:t>
+            </a:r>
+            <a:endParaRPr lang="pl-PL" dirty="0">
+              <a:hlinkClick r:id="rId2"/>
+            </a:endParaRPr>
+          </a:p>
+          <a:p>
+            <a:r>
+              <a:rPr lang="en-GB" dirty="0">
+                <a:hlinkClick r:id="rId2"/>
+              </a:rPr>
+              <a:t>https://www.ed.ac.uk/information-services/research-support/research-data-service/after/datavault</a:t>
+            </a:r>
+            <a:r>
+              <a:rPr lang="en-GB" dirty="0"/>
+              <a:t> </a:t>
+            </a:r>
+          </a:p>
+        </p:txBody>
+      </p:sp>
       <p:pic>
         <p:nvPicPr>
           <p:cNvPr id="15" name="Picture 2" descr="Ed_DaSH">
@@ -5137,7 +5150,7 @@
           <p:nvPr/>
         </p:nvPicPr>
         <p:blipFill>
-          <a:blip r:embed="rId2">
+          <a:blip r:embed="rId3">
             <a:extLst>
               <a:ext uri="{28A0092B-C50C-407E-A947-70E740481C1C}">
                 <a14:useLocalDpi xmlns:a14="http://schemas.microsoft.com/office/drawing/2010/main" val="0"/>
@@ -5211,7 +5224,7 @@
                   <a:srgbClr val="0070C0"/>
                 </a:solidFill>
               </a:rPr>
-              <a:t>DataShare</a:t>
+              <a:t>DataVault</a:t>
             </a:r>
             <a:endParaRPr lang="en-GB" sz="3600" dirty="0">
               <a:solidFill>
@@ -5235,7 +5248,7 @@
         </p:nvSpPr>
         <p:spPr>
           <a:xfrm>
-            <a:off x="5162422" y="4383372"/>
+            <a:off x="5162422" y="4112075"/>
             <a:ext cx="781934" cy="806248"/>
           </a:xfrm>
           <a:prstGeom prst="downArrow">
@@ -5281,7 +5294,7 @@
         </p:nvSpPr>
         <p:spPr>
           <a:xfrm>
-            <a:off x="6078063" y="4659763"/>
+            <a:off x="6078063" y="4388466"/>
             <a:ext cx="4199996" cy="369332"/>
           </a:xfrm>
           <a:prstGeom prst="rect">
@@ -5310,143 +5323,10 @@
           </a:p>
         </p:txBody>
       </p:sp>
-      <p:sp>
-        <p:nvSpPr>
-          <p:cNvPr id="9" name="TextBox 8">
-            <a:extLst>
-              <a:ext uri="{FF2B5EF4-FFF2-40B4-BE49-F238E27FC236}">
-                <a16:creationId xmlns:a16="http://schemas.microsoft.com/office/drawing/2014/main" id="{DBC65D3C-A2FF-4BD0-B253-B03D3D508145}"/>
-              </a:ext>
-            </a:extLst>
-          </p:cNvPr>
-          <p:cNvSpPr txBox="1"/>
-          <p:nvPr/>
-        </p:nvSpPr>
-        <p:spPr>
-          <a:xfrm>
-            <a:off x="807624" y="1274109"/>
-            <a:ext cx="10576753" cy="2957861"/>
-          </a:xfrm>
-          <a:prstGeom prst="rect">
-            <a:avLst/>
-          </a:prstGeom>
-          <a:noFill/>
-        </p:spPr>
-        <p:txBody>
-          <a:bodyPr wrap="square" rtlCol="0">
-            <a:spAutoFit/>
-          </a:bodyPr>
-          <a:lstStyle/>
-          <a:p>
-            <a:pPr marL="285750" indent="-285750">
-              <a:lnSpc>
-                <a:spcPct val="150000"/>
-              </a:lnSpc>
-              <a:buFont typeface="Arial" panose="020B0604020202020204" pitchFamily="34" charset="0"/>
-              <a:buChar char="•"/>
-            </a:pPr>
-            <a:r>
-              <a:rPr lang="en-GB" dirty="0"/>
-              <a:t>A big advantage of depositing your data is that they will be preserved - even for your own future use.</a:t>
-            </a:r>
-          </a:p>
-          <a:p>
-            <a:pPr marL="285750" indent="-285750">
-              <a:lnSpc>
-                <a:spcPct val="150000"/>
-              </a:lnSpc>
-              <a:buFont typeface="Arial" panose="020B0604020202020204" pitchFamily="34" charset="0"/>
-              <a:buChar char="•"/>
-            </a:pPr>
-            <a:r>
-              <a:rPr lang="en-GB" dirty="0"/>
-              <a:t>The data submission process creates a permanent record, a persistent identifier (DOI), and a suggested citation, so that your work can be formally attributed when re-analysed by others.</a:t>
-            </a:r>
-          </a:p>
-          <a:p>
-            <a:pPr marL="285750" indent="-285750">
-              <a:lnSpc>
-                <a:spcPct val="150000"/>
-              </a:lnSpc>
-              <a:buFont typeface="Arial" panose="020B0604020202020204" pitchFamily="34" charset="0"/>
-              <a:buChar char="•"/>
-            </a:pPr>
-            <a:r>
-              <a:rPr lang="en-GB" dirty="0"/>
-              <a:t>Your data will be discoverable through search engines to maximise visibility and impact. The service can provide you with usage statistics so you know when your data has been downloaded.</a:t>
-            </a:r>
-          </a:p>
-          <a:p>
-            <a:pPr marL="285750" indent="-285750">
-              <a:lnSpc>
-                <a:spcPct val="150000"/>
-              </a:lnSpc>
-              <a:buFont typeface="Arial" panose="020B0604020202020204" pitchFamily="34" charset="0"/>
-              <a:buChar char="•"/>
-            </a:pPr>
-            <a:r>
-              <a:rPr lang="en-GB" dirty="0"/>
-              <a:t>You do not need to maintain your own website to deliver your data; once deposited, management of your data is assured by Research Data Service staff.</a:t>
-            </a:r>
-          </a:p>
-        </p:txBody>
-      </p:sp>
-      <p:sp>
-        <p:nvSpPr>
-          <p:cNvPr id="10" name="TextBox 9">
-            <a:extLst>
-              <a:ext uri="{FF2B5EF4-FFF2-40B4-BE49-F238E27FC236}">
-                <a16:creationId xmlns:a16="http://schemas.microsoft.com/office/drawing/2014/main" id="{47A48DBD-FA5E-435D-A04A-1F30835CBD23}"/>
-              </a:ext>
-            </a:extLst>
-          </p:cNvPr>
-          <p:cNvSpPr txBox="1"/>
-          <p:nvPr/>
-        </p:nvSpPr>
-        <p:spPr>
-          <a:xfrm>
-            <a:off x="807624" y="5260725"/>
-            <a:ext cx="10123485" cy="646331"/>
-          </a:xfrm>
-          <a:prstGeom prst="rect">
-            <a:avLst/>
-          </a:prstGeom>
-          <a:noFill/>
-        </p:spPr>
-        <p:txBody>
-          <a:bodyPr wrap="square">
-            <a:spAutoFit/>
-          </a:bodyPr>
-          <a:lstStyle/>
-          <a:p>
-            <a:r>
-              <a:rPr lang="en-GB" dirty="0">
-                <a:hlinkClick r:id="rId3"/>
-              </a:rPr>
-              <a:t>https://www.wiki.ed.ac.uk/x/XbRVHQ</a:t>
-            </a:r>
-            <a:endParaRPr lang="pl-PL" dirty="0">
-              <a:hlinkClick r:id="rId3"/>
-            </a:endParaRPr>
-          </a:p>
-          <a:p>
-            <a:r>
-              <a:rPr lang="en-GB" dirty="0">
-                <a:hlinkClick r:id="rId3"/>
-              </a:rPr>
-              <a:t>https://www.ed.ac.uk/information-services/research-support/research-data-service/after/data-repository</a:t>
-            </a:r>
-            <a:r>
-              <a:rPr lang="en-GB" dirty="0"/>
-              <a:t> </a:t>
-            </a:r>
-          </a:p>
-        </p:txBody>
-      </p:sp>
     </p:spTree>
     <p:extLst>
       <p:ext uri="{BB962C8B-B14F-4D97-AF65-F5344CB8AC3E}">
-        <p14:creationId xmlns:p14="http://schemas.microsoft.com/office/powerpoint/2010/main" val="996093614"/>
+        <p14:creationId xmlns:p14="http://schemas.microsoft.com/office/powerpoint/2010/main" val="462202419"/>
       </p:ext>
     </p:extLst>
   </p:cSld>
@@ -5501,14 +5381,14 @@
           </a:ln>
           <a:extLst>
             <a:ext uri="{909E8E84-426E-40dd-AFC4-6F175D3DCCD1}">
-              <a14:hiddenFill xmlns="" xmlns:a14="http://schemas.microsoft.com/office/drawing/2010/main">
+              <a14:hiddenFill xmlns:a14="http://schemas.microsoft.com/office/drawing/2010/main" xmlns="">
                 <a:solidFill>
                   <a:srgbClr val="FFFFFF"/>
                 </a:solidFill>
               </a14:hiddenFill>
             </a:ext>
             <a:ext uri="{91240B29-F687-4f45-9708-019B960494DF}">
-              <a14:hiddenLine xmlns="" xmlns:a14="http://schemas.microsoft.com/office/drawing/2010/main" w="9525">
+              <a14:hiddenLine xmlns:a14="http://schemas.microsoft.com/office/drawing/2010/main" xmlns="" w="9525">
                 <a:solidFill>
                   <a:srgbClr val="000000"/>
                 </a:solidFill>
@@ -5830,7 +5710,7 @@
                   <a:srgbClr val="0070C0"/>
                 </a:solidFill>
               </a:rPr>
-              <a:t>After: SBS Public </a:t>
+              <a:t>After: UoE </a:t>
             </a:r>
             <a:r>
               <a:rPr lang="en-GB" sz="3600" dirty="0" err="1">
@@ -5838,7 +5718,7 @@
                   <a:srgbClr val="0070C0"/>
                 </a:solidFill>
               </a:rPr>
-              <a:t>Omero</a:t>
+              <a:t>DataShare</a:t>
             </a:r>
             <a:endParaRPr lang="en-GB" sz="3600" dirty="0">
               <a:solidFill>
@@ -5848,42 +5728,58 @@
           </a:p>
         </p:txBody>
       </p:sp>
-      <p:pic>
-        <p:nvPicPr>
-          <p:cNvPr id="11" name="Picture 10">
-            <a:extLst>
-              <a:ext uri="{FF2B5EF4-FFF2-40B4-BE49-F238E27FC236}">
-                <a16:creationId xmlns:a16="http://schemas.microsoft.com/office/drawing/2014/main" id="{F091F10E-860C-4540-B4B1-315A37893979}"/>
-              </a:ext>
-            </a:extLst>
-          </p:cNvPr>
-          <p:cNvPicPr>
-            <a:picLocks noChangeAspect="1"/>
-          </p:cNvPicPr>
+      <p:sp>
+        <p:nvSpPr>
+          <p:cNvPr id="19" name="Arrow: Down 18">
+            <a:extLst>
+              <a:ext uri="{FF2B5EF4-FFF2-40B4-BE49-F238E27FC236}">
+                <a16:creationId xmlns:a16="http://schemas.microsoft.com/office/drawing/2014/main" id="{A2186F0E-0C8E-4E20-8320-4482DEA668F0}"/>
+              </a:ext>
+            </a:extLst>
+          </p:cNvPr>
+          <p:cNvSpPr/>
           <p:nvPr/>
-        </p:nvPicPr>
-        <p:blipFill>
-          <a:blip r:embed="rId3"/>
-          <a:stretch>
-            <a:fillRect/>
-          </a:stretch>
-        </p:blipFill>
+        </p:nvSpPr>
         <p:spPr>
           <a:xfrm>
-            <a:off x="2305715" y="1153525"/>
-            <a:ext cx="7415365" cy="4327170"/>
+            <a:off x="5162422" y="4383372"/>
+            <a:ext cx="781934" cy="806248"/>
           </a:xfrm>
-          <a:prstGeom prst="rect">
+          <a:prstGeom prst="downArrow">
             <a:avLst/>
           </a:prstGeom>
         </p:spPr>
-      </p:pic>
-      <p:sp>
-        <p:nvSpPr>
-          <p:cNvPr id="12" name="TextBox 11">
-            <a:extLst>
-              <a:ext uri="{FF2B5EF4-FFF2-40B4-BE49-F238E27FC236}">
-                <a16:creationId xmlns:a16="http://schemas.microsoft.com/office/drawing/2014/main" id="{877571C0-0152-498A-AF09-7D556DF114DE}"/>
+        <p:style>
+          <a:lnRef idx="2">
+            <a:schemeClr val="accent1">
+              <a:shade val="50000"/>
+            </a:schemeClr>
+          </a:lnRef>
+          <a:fillRef idx="1">
+            <a:schemeClr val="accent1"/>
+          </a:fillRef>
+          <a:effectRef idx="0">
+            <a:schemeClr val="accent1"/>
+          </a:effectRef>
+          <a:fontRef idx="minor">
+            <a:schemeClr val="lt1"/>
+          </a:fontRef>
+        </p:style>
+        <p:txBody>
+          <a:bodyPr rtlCol="0" anchor="ctr"/>
+          <a:lstStyle/>
+          <a:p>
+            <a:pPr algn="ctr"/>
+            <a:endParaRPr lang="en-GB"/>
+          </a:p>
+        </p:txBody>
+      </p:sp>
+      <p:sp>
+        <p:nvSpPr>
+          <p:cNvPr id="20" name="TextBox 19">
+            <a:extLst>
+              <a:ext uri="{FF2B5EF4-FFF2-40B4-BE49-F238E27FC236}">
+                <a16:creationId xmlns:a16="http://schemas.microsoft.com/office/drawing/2014/main" id="{5FBF0767-F103-4FC1-BDDF-531007A5F7D3}"/>
               </a:ext>
             </a:extLst>
           </p:cNvPr>
@@ -5892,8 +5788,8 @@
         </p:nvSpPr>
         <p:spPr>
           <a:xfrm>
-            <a:off x="4478105" y="5499465"/>
-            <a:ext cx="4572000" cy="369332"/>
+            <a:off x="6078063" y="4659763"/>
+            <a:ext cx="4199996" cy="369332"/>
           </a:xfrm>
           <a:prstGeom prst="rect">
             <a:avLst/>
@@ -5901,30 +5797,32 @@
           <a:noFill/>
         </p:spPr>
         <p:txBody>
-          <a:bodyPr wrap="square">
+          <a:bodyPr wrap="none" rtlCol="0">
             <a:spAutoFit/>
           </a:bodyPr>
           <a:lstStyle/>
           <a:p>
             <a:r>
-              <a:rPr lang="en-GB" dirty="0">
-                <a:hlinkClick r:id="rId4"/>
-              </a:rPr>
-              <a:t>https://publicomero.bio.ed.ac.uk/</a:t>
-            </a:r>
-            <a:r>
               <a:rPr lang="en-GB" dirty="0"/>
-              <a:t> </a:t>
-            </a:r>
-          </a:p>
-        </p:txBody>
-      </p:sp>
-      <p:sp>
-        <p:nvSpPr>
-          <p:cNvPr id="13" name="TextBox 12">
-            <a:extLst>
-              <a:ext uri="{FF2B5EF4-FFF2-40B4-BE49-F238E27FC236}">
-                <a16:creationId xmlns:a16="http://schemas.microsoft.com/office/drawing/2014/main" id="{4681D1EB-D7D2-4AD0-8273-66F6628859B3}"/>
+              <a:t>For more information, visit the link</a:t>
+            </a:r>
+            <a:r>
+              <a:rPr lang="pl-PL" dirty="0"/>
+              <a:t>s</a:t>
+            </a:r>
+            <a:r>
+              <a:rPr lang="en-GB" dirty="0"/>
+              <a:t> below.</a:t>
+            </a:r>
+          </a:p>
+        </p:txBody>
+      </p:sp>
+      <p:sp>
+        <p:nvSpPr>
+          <p:cNvPr id="9" name="TextBox 8">
+            <a:extLst>
+              <a:ext uri="{FF2B5EF4-FFF2-40B4-BE49-F238E27FC236}">
+                <a16:creationId xmlns:a16="http://schemas.microsoft.com/office/drawing/2014/main" id="{DBC65D3C-A2FF-4BD0-B253-B03D3D508145}"/>
               </a:ext>
             </a:extLst>
           </p:cNvPr>
@@ -5933,8 +5831,8 @@
         </p:nvSpPr>
         <p:spPr>
           <a:xfrm>
-            <a:off x="2681662" y="6339559"/>
-            <a:ext cx="7415365" cy="369332"/>
+            <a:off x="807624" y="1274109"/>
+            <a:ext cx="10576753" cy="2957861"/>
           </a:xfrm>
           <a:prstGeom prst="rect">
             <a:avLst/>
@@ -5942,34 +5840,70 @@
           <a:noFill/>
         </p:spPr>
         <p:txBody>
-          <a:bodyPr wrap="square">
+          <a:bodyPr wrap="square" rtlCol="0">
             <a:spAutoFit/>
           </a:bodyPr>
           <a:lstStyle/>
           <a:p>
             <a:pPr marL="285750" indent="-285750">
+              <a:lnSpc>
+                <a:spcPct val="150000"/>
+              </a:lnSpc>
               <a:buFont typeface="Arial" panose="020B0604020202020204" pitchFamily="34" charset="0"/>
               <a:buChar char="•"/>
             </a:pPr>
             <a:r>
-              <a:rPr lang="en-GB" dirty="0">
-                <a:hlinkClick r:id="rId5"/>
-              </a:rPr>
-              <a:t>https://www.wiki.ed.ac.uk/display/RDMS/Suggested+data+repositories</a:t>
-            </a:r>
-            <a:r>
               <a:rPr lang="en-GB" dirty="0"/>
-              <a:t> </a:t>
-            </a:r>
-          </a:p>
-        </p:txBody>
-      </p:sp>
-      <p:sp>
-        <p:nvSpPr>
-          <p:cNvPr id="14" name="TextBox 13">
-            <a:extLst>
-              <a:ext uri="{FF2B5EF4-FFF2-40B4-BE49-F238E27FC236}">
-                <a16:creationId xmlns:a16="http://schemas.microsoft.com/office/drawing/2014/main" id="{311F5080-30CE-4A99-86A9-1EA8A607775E}"/>
+              <a:t>A big advantage of depositing your data is that they will be preserved - even for your own future use.</a:t>
+            </a:r>
+          </a:p>
+          <a:p>
+            <a:pPr marL="285750" indent="-285750">
+              <a:lnSpc>
+                <a:spcPct val="150000"/>
+              </a:lnSpc>
+              <a:buFont typeface="Arial" panose="020B0604020202020204" pitchFamily="34" charset="0"/>
+              <a:buChar char="•"/>
+            </a:pPr>
+            <a:r>
+              <a:rPr lang="en-GB" dirty="0"/>
+              <a:t>The data submission process creates a permanent record, a persistent identifier (DOI), and a suggested citation, so that your work can be formally attributed when re-analysed by others.</a:t>
+            </a:r>
+          </a:p>
+          <a:p>
+            <a:pPr marL="285750" indent="-285750">
+              <a:lnSpc>
+                <a:spcPct val="150000"/>
+              </a:lnSpc>
+              <a:buFont typeface="Arial" panose="020B0604020202020204" pitchFamily="34" charset="0"/>
+              <a:buChar char="•"/>
+            </a:pPr>
+            <a:r>
+              <a:rPr lang="en-GB" dirty="0"/>
+              <a:t>Your data will be discoverable through search engines to maximise visibility and impact. The service can provide you with usage statistics so you know when your data has been downloaded.</a:t>
+            </a:r>
+          </a:p>
+          <a:p>
+            <a:pPr marL="285750" indent="-285750">
+              <a:lnSpc>
+                <a:spcPct val="150000"/>
+              </a:lnSpc>
+              <a:buFont typeface="Arial" panose="020B0604020202020204" pitchFamily="34" charset="0"/>
+              <a:buChar char="•"/>
+            </a:pPr>
+            <a:r>
+              <a:rPr lang="en-GB" dirty="0"/>
+              <a:t>You do not need to maintain your own website to deliver your data; once deposited, management of your data is assured by Research Data Service staff.</a:t>
+            </a:r>
+          </a:p>
+        </p:txBody>
+      </p:sp>
+      <p:sp>
+        <p:nvSpPr>
+          <p:cNvPr id="10" name="TextBox 9">
+            <a:extLst>
+              <a:ext uri="{FF2B5EF4-FFF2-40B4-BE49-F238E27FC236}">
+                <a16:creationId xmlns:a16="http://schemas.microsoft.com/office/drawing/2014/main" id="{47A48DBD-FA5E-435D-A04A-1F30835CBD23}"/>
               </a:ext>
             </a:extLst>
           </p:cNvPr>
@@ -5978,8 +5912,8 @@
         </p:nvSpPr>
         <p:spPr>
           <a:xfrm>
-            <a:off x="133326" y="5970227"/>
-            <a:ext cx="4344779" cy="369332"/>
+            <a:off x="807624" y="5260725"/>
+            <a:ext cx="10123485" cy="646331"/>
           </a:xfrm>
           <a:prstGeom prst="rect">
             <a:avLst/>
@@ -5987,61 +5921,31 @@
           <a:noFill/>
         </p:spPr>
         <p:txBody>
-          <a:bodyPr wrap="none" rtlCol="0">
+          <a:bodyPr wrap="square">
             <a:spAutoFit/>
           </a:bodyPr>
           <a:lstStyle/>
           <a:p>
             <a:r>
-              <a:rPr lang="en-GB" dirty="0" err="1">
-                <a:solidFill>
-                  <a:srgbClr val="002060"/>
-                </a:solidFill>
-              </a:rPr>
-              <a:t>BioRDM’s</a:t>
-            </a:r>
-            <a:r>
               <a:rPr lang="en-GB" dirty="0">
-                <a:solidFill>
-                  <a:srgbClr val="002060"/>
-                </a:solidFill>
-              </a:rPr>
-              <a:t> list of suggested data repositories:</a:t>
-            </a:r>
-          </a:p>
-        </p:txBody>
-      </p:sp>
-      <p:sp>
-        <p:nvSpPr>
-          <p:cNvPr id="17" name="TextBox 16">
-            <a:extLst>
-              <a:ext uri="{FF2B5EF4-FFF2-40B4-BE49-F238E27FC236}">
-                <a16:creationId xmlns:a16="http://schemas.microsoft.com/office/drawing/2014/main" id="{34933852-3D7C-4365-8439-AB672A92D767}"/>
-              </a:ext>
-            </a:extLst>
-          </p:cNvPr>
-          <p:cNvSpPr txBox="1"/>
-          <p:nvPr/>
-        </p:nvSpPr>
-        <p:spPr>
-          <a:xfrm>
-            <a:off x="0" y="6653304"/>
-            <a:ext cx="2647314" cy="261610"/>
-          </a:xfrm>
-          <a:prstGeom prst="rect">
-            <a:avLst/>
-          </a:prstGeom>
-          <a:noFill/>
-        </p:spPr>
-        <p:txBody>
-          <a:bodyPr wrap="square" rtlCol="0">
-            <a:spAutoFit/>
-          </a:bodyPr>
-          <a:lstStyle/>
-          <a:p>
-            <a:r>
-              <a:rPr lang="en-GB" sz="1100" dirty="0"/>
-              <a:t>Image credit: Dr Andrés Romanowski</a:t>
+                <a:hlinkClick r:id="rId3"/>
+              </a:rPr>
+              <a:t>https://www.wiki.ed.ac.uk/x/XbRVHQ</a:t>
+            </a:r>
+            <a:endParaRPr lang="pl-PL" dirty="0">
+              <a:hlinkClick r:id="rId3"/>
+            </a:endParaRPr>
+          </a:p>
+          <a:p>
+            <a:r>
+              <a:rPr lang="en-GB" dirty="0">
+                <a:hlinkClick r:id="rId3"/>
+              </a:rPr>
+              <a:t>https://www.ed.ac.uk/information-services/research-support/research-data-service/after/data-repository</a:t>
+            </a:r>
+            <a:r>
+              <a:rPr lang="en-GB" dirty="0"/>
+              <a:t> </a:t>
             </a:r>
           </a:p>
         </p:txBody>
@@ -6049,7 +5953,7 @@
     </p:spTree>
     <p:extLst>
       <p:ext uri="{BB962C8B-B14F-4D97-AF65-F5344CB8AC3E}">
-        <p14:creationId xmlns:p14="http://schemas.microsoft.com/office/powerpoint/2010/main" val="3358587853"/>
+        <p14:creationId xmlns:p14="http://schemas.microsoft.com/office/powerpoint/2010/main" val="996093614"/>
       </p:ext>
     </p:extLst>
   </p:cSld>
@@ -6104,14 +6008,14 @@
           </a:ln>
           <a:extLst>
             <a:ext uri="{909E8E84-426E-40dd-AFC4-6F175D3DCCD1}">
-              <a14:hiddenFill xmlns="" xmlns:a14="http://schemas.microsoft.com/office/drawing/2010/main">
+              <a14:hiddenFill xmlns:a14="http://schemas.microsoft.com/office/drawing/2010/main" xmlns="">
                 <a:solidFill>
                   <a:srgbClr val="FFFFFF"/>
                 </a:solidFill>
               </a14:hiddenFill>
             </a:ext>
             <a:ext uri="{91240B29-F687-4f45-9708-019B960494DF}">
-              <a14:hiddenLine xmlns="" xmlns:a14="http://schemas.microsoft.com/office/drawing/2010/main" w="9525">
+              <a14:hiddenLine xmlns:a14="http://schemas.microsoft.com/office/drawing/2010/main" xmlns="" w="9525">
                 <a:solidFill>
                   <a:srgbClr val="000000"/>
                 </a:solidFill>
@@ -6433,17 +6337,60 @@
                   <a:srgbClr val="0070C0"/>
                 </a:solidFill>
               </a:rPr>
-              <a:t>Is this all for free?</a:t>
-            </a:r>
-          </a:p>
-        </p:txBody>
-      </p:sp>
-      <p:sp>
-        <p:nvSpPr>
-          <p:cNvPr id="10" name="TextBox 9">
-            <a:extLst>
-              <a:ext uri="{FF2B5EF4-FFF2-40B4-BE49-F238E27FC236}">
-                <a16:creationId xmlns:a16="http://schemas.microsoft.com/office/drawing/2014/main" id="{EEA3DADF-9B9A-4084-A973-9CDEB37FB1A7}"/>
+              <a:t>After: SBS Public </a:t>
+            </a:r>
+            <a:r>
+              <a:rPr lang="en-GB" sz="3600" dirty="0" err="1">
+                <a:solidFill>
+                  <a:srgbClr val="0070C0"/>
+                </a:solidFill>
+              </a:rPr>
+              <a:t>Omero</a:t>
+            </a:r>
+            <a:endParaRPr lang="en-GB" sz="3600" dirty="0">
+              <a:solidFill>
+                <a:srgbClr val="0070C0"/>
+              </a:solidFill>
+            </a:endParaRPr>
+          </a:p>
+        </p:txBody>
+      </p:sp>
+      <p:pic>
+        <p:nvPicPr>
+          <p:cNvPr id="11" name="Picture 10">
+            <a:extLst>
+              <a:ext uri="{FF2B5EF4-FFF2-40B4-BE49-F238E27FC236}">
+                <a16:creationId xmlns:a16="http://schemas.microsoft.com/office/drawing/2014/main" id="{F091F10E-860C-4540-B4B1-315A37893979}"/>
+              </a:ext>
+            </a:extLst>
+          </p:cNvPr>
+          <p:cNvPicPr>
+            <a:picLocks noChangeAspect="1"/>
+          </p:cNvPicPr>
+          <p:nvPr/>
+        </p:nvPicPr>
+        <p:blipFill>
+          <a:blip r:embed="rId3"/>
+          <a:stretch>
+            <a:fillRect/>
+          </a:stretch>
+        </p:blipFill>
+        <p:spPr>
+          <a:xfrm>
+            <a:off x="2305715" y="1153525"/>
+            <a:ext cx="7415365" cy="4327170"/>
+          </a:xfrm>
+          <a:prstGeom prst="rect">
+            <a:avLst/>
+          </a:prstGeom>
+        </p:spPr>
+      </p:pic>
+      <p:sp>
+        <p:nvSpPr>
+          <p:cNvPr id="12" name="TextBox 11">
+            <a:extLst>
+              <a:ext uri="{FF2B5EF4-FFF2-40B4-BE49-F238E27FC236}">
+                <a16:creationId xmlns:a16="http://schemas.microsoft.com/office/drawing/2014/main" id="{877571C0-0152-498A-AF09-7D556DF114DE}"/>
               </a:ext>
             </a:extLst>
           </p:cNvPr>
@@ -6452,8 +6399,8 @@
         </p:nvSpPr>
         <p:spPr>
           <a:xfrm>
-            <a:off x="515880" y="1134756"/>
-            <a:ext cx="11594004" cy="5262979"/>
+            <a:off x="4478105" y="5499465"/>
+            <a:ext cx="4572000" cy="369332"/>
           </a:xfrm>
           <a:prstGeom prst="rect">
             <a:avLst/>
@@ -6466,546 +6413,150 @@
           </a:bodyPr>
           <a:lstStyle/>
           <a:p>
-            <a:pPr algn="l"/>
-            <a:r>
-              <a:rPr lang="en-GB" sz="1600" b="1" i="0" dirty="0">
-                <a:solidFill>
-                  <a:srgbClr val="172B4D"/>
-                </a:solidFill>
-                <a:effectLst/>
-                <a:latin typeface="-apple-system"/>
-              </a:rPr>
-              <a:t>Some RDS costs</a:t>
-            </a:r>
-            <a:endParaRPr lang="en-GB" sz="1600" b="0" i="0" dirty="0">
-              <a:solidFill>
-                <a:srgbClr val="172B4D"/>
-              </a:solidFill>
-              <a:effectLst/>
-              <a:latin typeface="-apple-system"/>
-            </a:endParaRPr>
-          </a:p>
-          <a:p>
-            <a:r>
-              <a:rPr lang="en-GB" sz="1600" b="0" i="0" dirty="0" err="1">
-                <a:solidFill>
-                  <a:srgbClr val="172B4D"/>
-                </a:solidFill>
-                <a:effectLst/>
-                <a:latin typeface="-apple-system"/>
-              </a:rPr>
-              <a:t>DataStore</a:t>
-            </a:r>
-            <a:r>
-              <a:rPr lang="en-GB" sz="1600" b="0" i="0" dirty="0">
-                <a:solidFill>
-                  <a:srgbClr val="172B4D"/>
-                </a:solidFill>
-                <a:effectLst/>
-                <a:latin typeface="-apple-system"/>
-              </a:rPr>
-              <a:t> 500Gb default free storage space, then storage per TB/year - £175 </a:t>
-            </a:r>
-          </a:p>
-          <a:p>
-            <a:r>
-              <a:rPr lang="en-GB" sz="1600" b="0" i="0" dirty="0" err="1">
-                <a:solidFill>
-                  <a:srgbClr val="172B4D"/>
-                </a:solidFill>
-                <a:effectLst/>
-                <a:latin typeface="-apple-system"/>
-              </a:rPr>
-              <a:t>DataVault</a:t>
-            </a:r>
-            <a:r>
-              <a:rPr lang="en-GB" sz="1600" b="0" i="0" dirty="0">
-                <a:solidFill>
-                  <a:srgbClr val="172B4D"/>
-                </a:solidFill>
-                <a:effectLst/>
-                <a:latin typeface="-apple-system"/>
-              </a:rPr>
-              <a:t> storage per TB for 10 years  - £500</a:t>
-            </a:r>
-          </a:p>
-          <a:p>
-            <a:pPr algn="l"/>
-            <a:r>
-              <a:rPr lang="en-GB" sz="1600" b="0" i="0" dirty="0">
-                <a:solidFill>
-                  <a:srgbClr val="172B4D"/>
-                </a:solidFill>
-                <a:effectLst/>
-                <a:latin typeface="-apple-system"/>
-              </a:rPr>
-              <a:t>Eddie storage per TB/year - £400</a:t>
-            </a:r>
-          </a:p>
-          <a:p>
-            <a:pPr algn="l"/>
-            <a:r>
-              <a:rPr lang="en-GB" sz="1600" b="0" i="0" dirty="0" err="1">
-                <a:solidFill>
-                  <a:srgbClr val="172B4D"/>
-                </a:solidFill>
-                <a:effectLst/>
-                <a:latin typeface="-apple-system"/>
-              </a:rPr>
-              <a:t>DataShare</a:t>
-            </a:r>
-            <a:r>
-              <a:rPr lang="en-GB" sz="1600" b="0" i="0" dirty="0">
-                <a:solidFill>
-                  <a:srgbClr val="172B4D"/>
-                </a:solidFill>
-                <a:effectLst/>
-                <a:latin typeface="-apple-system"/>
-              </a:rPr>
-              <a:t> – free</a:t>
-            </a:r>
-          </a:p>
-          <a:p>
-            <a:pPr algn="l"/>
-            <a:r>
-              <a:rPr lang="en-GB" sz="1600" dirty="0" err="1">
-                <a:solidFill>
-                  <a:srgbClr val="172B4D"/>
-                </a:solidFill>
-                <a:latin typeface="-apple-system"/>
-              </a:rPr>
-              <a:t>DataSync</a:t>
-            </a:r>
-            <a:r>
-              <a:rPr lang="en-GB" sz="1600" dirty="0">
-                <a:solidFill>
-                  <a:srgbClr val="172B4D"/>
-                </a:solidFill>
-                <a:latin typeface="-apple-system"/>
-              </a:rPr>
-              <a:t> – free (20Gb default quota + </a:t>
-            </a:r>
-            <a:r>
-              <a:rPr lang="en-GB" sz="1600" dirty="0" err="1">
-                <a:solidFill>
-                  <a:srgbClr val="172B4D"/>
-                </a:solidFill>
-                <a:latin typeface="-apple-system"/>
-              </a:rPr>
-              <a:t>DataStore</a:t>
-            </a:r>
-            <a:r>
-              <a:rPr lang="en-GB" sz="1600" dirty="0">
-                <a:solidFill>
-                  <a:srgbClr val="172B4D"/>
-                </a:solidFill>
-                <a:latin typeface="-apple-system"/>
-              </a:rPr>
-              <a:t> space)</a:t>
-            </a:r>
-            <a:endParaRPr lang="en-GB" sz="1600" b="0" i="0" dirty="0">
-              <a:solidFill>
-                <a:srgbClr val="172B4D"/>
-              </a:solidFill>
-              <a:effectLst/>
-              <a:latin typeface="-apple-system"/>
-            </a:endParaRPr>
-          </a:p>
-          <a:p>
-            <a:pPr algn="l"/>
-            <a:r>
-              <a:rPr lang="en-GB" sz="1600" b="0" i="0" dirty="0">
-                <a:solidFill>
-                  <a:srgbClr val="172B4D"/>
-                </a:solidFill>
-                <a:effectLst/>
-                <a:latin typeface="-apple-system"/>
-              </a:rPr>
-              <a:t>GitLab - free (50Mb default quota)</a:t>
-            </a:r>
-          </a:p>
-          <a:p>
-            <a:pPr algn="l"/>
-            <a:r>
-              <a:rPr lang="en-GB" sz="1600" b="0" i="0" dirty="0">
-                <a:solidFill>
-                  <a:srgbClr val="172B4D"/>
-                </a:solidFill>
-                <a:effectLst/>
-                <a:latin typeface="-apple-system"/>
-              </a:rPr>
-              <a:t>Subversion - No charge up to 10GB &gt;10 GB by arrangement</a:t>
-            </a:r>
-          </a:p>
-          <a:p>
-            <a:pPr algn="l"/>
-            <a:endParaRPr lang="en-GB" sz="1600" b="0" i="0" dirty="0">
-              <a:solidFill>
-                <a:srgbClr val="172B4D"/>
-              </a:solidFill>
-              <a:effectLst/>
-              <a:latin typeface="-apple-system"/>
-            </a:endParaRPr>
-          </a:p>
-          <a:p>
-            <a:pPr algn="l"/>
-            <a:r>
-              <a:rPr lang="en-GB" sz="1600" b="1" i="0" dirty="0">
-                <a:solidFill>
-                  <a:srgbClr val="172B4D"/>
-                </a:solidFill>
-                <a:effectLst/>
-                <a:latin typeface="-apple-system"/>
-              </a:rPr>
-              <a:t>Note/disclaimer:</a:t>
-            </a:r>
-            <a:r>
-              <a:rPr lang="en-GB" sz="1600" b="0" i="0" dirty="0">
-                <a:solidFill>
-                  <a:srgbClr val="172B4D"/>
-                </a:solidFill>
-                <a:effectLst/>
-                <a:latin typeface="-apple-system"/>
-              </a:rPr>
-              <a:t> These prices </a:t>
-            </a:r>
-            <a:r>
-              <a:rPr lang="en-GB" sz="1600" b="0" i="1" dirty="0">
-                <a:solidFill>
-                  <a:srgbClr val="172B4D"/>
-                </a:solidFill>
-                <a:effectLst/>
-                <a:latin typeface="-apple-system"/>
-              </a:rPr>
-              <a:t>might not reflect current pricing </a:t>
-            </a:r>
-            <a:r>
-              <a:rPr lang="en-GB" sz="1600" b="0" i="0" dirty="0">
-                <a:solidFill>
-                  <a:srgbClr val="172B4D"/>
-                </a:solidFill>
-                <a:effectLst/>
-                <a:latin typeface="-apple-system"/>
-              </a:rPr>
-              <a:t>and are present here to give you a ballpark estimate (last checked: Sept 2020). Check current values through this link or contact RDS: </a:t>
-            </a:r>
-            <a:r>
-              <a:rPr lang="en-GB" sz="1600" b="0" i="0" u="none" strike="noStrike" dirty="0">
-                <a:solidFill>
-                  <a:srgbClr val="0052CC"/>
-                </a:solidFill>
-                <a:effectLst/>
-                <a:latin typeface="-apple-system"/>
-                <a:hlinkClick r:id="rId3"/>
-              </a:rPr>
-              <a:t>more information on these charges</a:t>
-            </a:r>
-            <a:endParaRPr lang="en-GB" sz="1600" b="0" i="0" dirty="0">
-              <a:solidFill>
-                <a:srgbClr val="172B4D"/>
-              </a:solidFill>
-              <a:effectLst/>
-              <a:latin typeface="-apple-system"/>
-            </a:endParaRPr>
-          </a:p>
-          <a:p>
-            <a:pPr algn="l"/>
-            <a:r>
-              <a:rPr lang="en-GB" sz="1600" b="0" i="0" dirty="0">
-                <a:solidFill>
-                  <a:srgbClr val="172B4D"/>
-                </a:solidFill>
-                <a:effectLst/>
-                <a:latin typeface="-apple-system"/>
-              </a:rPr>
-              <a:t>Version control services description and cost: </a:t>
-            </a:r>
-            <a:r>
-              <a:rPr lang="en-GB" sz="1600" b="0" i="0" u="none" strike="noStrike" dirty="0">
-                <a:solidFill>
-                  <a:srgbClr val="0052CC"/>
-                </a:solidFill>
-                <a:effectLst/>
-                <a:latin typeface="-apple-system"/>
+            <a:r>
+              <a:rPr lang="en-GB" dirty="0">
                 <a:hlinkClick r:id="rId4"/>
               </a:rPr>
-              <a:t>Version Control Services</a:t>
-            </a:r>
-            <a:r>
-              <a:rPr lang="en-GB" sz="1600" b="0" i="0" u="none" strike="noStrike" dirty="0">
-                <a:solidFill>
-                  <a:srgbClr val="0052CC"/>
-                </a:solidFill>
-                <a:effectLst/>
-                <a:latin typeface="-apple-system"/>
-              </a:rPr>
-              <a:t>.</a:t>
-            </a:r>
-            <a:endParaRPr lang="en-GB" sz="1600" b="0" i="0" dirty="0">
-              <a:solidFill>
-                <a:srgbClr val="172B4D"/>
-              </a:solidFill>
-              <a:effectLst/>
-              <a:latin typeface="-apple-system"/>
-            </a:endParaRPr>
-          </a:p>
-          <a:p>
-            <a:pPr algn="l"/>
-            <a:r>
-              <a:rPr lang="en-GB" sz="1600" b="0" i="0" dirty="0">
-                <a:solidFill>
-                  <a:srgbClr val="172B4D"/>
-                </a:solidFill>
-                <a:effectLst/>
-                <a:latin typeface="-apple-system"/>
-              </a:rPr>
-              <a:t>More info on </a:t>
-            </a:r>
-            <a:r>
-              <a:rPr lang="en-GB" sz="1600" b="0" i="0" dirty="0" err="1">
-                <a:solidFill>
-                  <a:srgbClr val="172B4D"/>
-                </a:solidFill>
-                <a:effectLst/>
-                <a:latin typeface="-apple-system"/>
-              </a:rPr>
-              <a:t>DataVault</a:t>
-            </a:r>
-            <a:r>
-              <a:rPr lang="en-GB" sz="1600" b="0" i="0" dirty="0">
-                <a:solidFill>
-                  <a:srgbClr val="172B4D"/>
-                </a:solidFill>
-                <a:effectLst/>
-                <a:latin typeface="-apple-system"/>
-              </a:rPr>
-              <a:t>: </a:t>
-            </a:r>
-            <a:r>
-              <a:rPr lang="en-GB" sz="1600" b="0" i="0" u="none" strike="noStrike" dirty="0">
-                <a:solidFill>
-                  <a:srgbClr val="0052CC"/>
-                </a:solidFill>
-                <a:effectLst/>
-                <a:latin typeface="-apple-system"/>
+              <a:t>https://publicomero.bio.ed.ac.uk/</a:t>
+            </a:r>
+            <a:r>
+              <a:rPr lang="en-GB" dirty="0"/>
+              <a:t> </a:t>
+            </a:r>
+          </a:p>
+        </p:txBody>
+      </p:sp>
+      <p:sp>
+        <p:nvSpPr>
+          <p:cNvPr id="13" name="TextBox 12">
+            <a:extLst>
+              <a:ext uri="{FF2B5EF4-FFF2-40B4-BE49-F238E27FC236}">
+                <a16:creationId xmlns:a16="http://schemas.microsoft.com/office/drawing/2014/main" id="{4681D1EB-D7D2-4AD0-8273-66F6628859B3}"/>
+              </a:ext>
+            </a:extLst>
+          </p:cNvPr>
+          <p:cNvSpPr txBox="1"/>
+          <p:nvPr/>
+        </p:nvSpPr>
+        <p:spPr>
+          <a:xfrm>
+            <a:off x="2681662" y="6339559"/>
+            <a:ext cx="7415365" cy="369332"/>
+          </a:xfrm>
+          <a:prstGeom prst="rect">
+            <a:avLst/>
+          </a:prstGeom>
+          <a:noFill/>
+        </p:spPr>
+        <p:txBody>
+          <a:bodyPr wrap="square">
+            <a:spAutoFit/>
+          </a:bodyPr>
+          <a:lstStyle/>
+          <a:p>
+            <a:pPr marL="285750" indent="-285750">
+              <a:buFont typeface="Arial" panose="020B0604020202020204" pitchFamily="34" charset="0"/>
+              <a:buChar char="•"/>
+            </a:pPr>
+            <a:r>
+              <a:rPr lang="en-GB" dirty="0">
                 <a:hlinkClick r:id="rId5"/>
               </a:rPr>
-              <a:t>https://www.ed.ac.uk/information-services/research-support/research-data-service/after/datavault/cost</a:t>
-            </a:r>
-            <a:r>
-              <a:rPr lang="en-GB" sz="1600" b="0" i="0" u="none" strike="noStrike" dirty="0">
-                <a:solidFill>
-                  <a:srgbClr val="0052CC"/>
-                </a:solidFill>
-                <a:effectLst/>
-                <a:latin typeface="-apple-system"/>
-              </a:rPr>
-              <a:t>.</a:t>
-            </a:r>
-            <a:endParaRPr lang="en-GB" sz="1600" b="0" i="0" dirty="0">
-              <a:solidFill>
-                <a:srgbClr val="172B4D"/>
-              </a:solidFill>
-              <a:effectLst/>
-              <a:latin typeface="-apple-system"/>
-            </a:endParaRPr>
-          </a:p>
-          <a:p>
-            <a:pPr algn="l"/>
-            <a:br>
-              <a:rPr lang="en-GB" sz="1600" b="0" i="0" dirty="0">
-                <a:solidFill>
-                  <a:srgbClr val="172B4D"/>
-                </a:solidFill>
-                <a:effectLst/>
-                <a:latin typeface="-apple-system"/>
-              </a:rPr>
-            </a:br>
-            <a:r>
-              <a:rPr lang="en-GB" sz="1600" b="1" i="0" dirty="0">
-                <a:solidFill>
-                  <a:srgbClr val="172B4D"/>
-                </a:solidFill>
-                <a:effectLst/>
-                <a:latin typeface="-apple-system"/>
-              </a:rPr>
-              <a:t>BioRDM costs</a:t>
-            </a:r>
-            <a:endParaRPr lang="en-GB" sz="1600" b="0" i="0" dirty="0">
-              <a:solidFill>
-                <a:srgbClr val="172B4D"/>
-              </a:solidFill>
-              <a:effectLst/>
-              <a:latin typeface="-apple-system"/>
-            </a:endParaRPr>
-          </a:p>
-          <a:p>
-            <a:pPr algn="l"/>
-            <a:r>
-              <a:rPr lang="en-GB" sz="1600" b="0" i="0" dirty="0">
-                <a:solidFill>
-                  <a:srgbClr val="172B4D"/>
-                </a:solidFill>
-                <a:effectLst/>
-                <a:latin typeface="-apple-system"/>
-              </a:rPr>
-              <a:t>Professional Data Curation Services: for more information and an up to date quote e-mail the BioRDM team.</a:t>
-            </a:r>
-          </a:p>
-          <a:p>
-            <a:pPr algn="l"/>
-            <a:r>
-              <a:rPr lang="en-GB" sz="1600" dirty="0">
-                <a:solidFill>
-                  <a:srgbClr val="172B4D"/>
-                </a:solidFill>
-                <a:latin typeface="-apple-system"/>
-              </a:rPr>
-              <a:t>SBS Public </a:t>
-            </a:r>
-            <a:r>
-              <a:rPr lang="en-GB" sz="1600" dirty="0" err="1">
-                <a:solidFill>
-                  <a:srgbClr val="172B4D"/>
-                </a:solidFill>
-                <a:latin typeface="-apple-system"/>
-              </a:rPr>
-              <a:t>Omero</a:t>
-            </a:r>
-            <a:r>
-              <a:rPr lang="en-GB" sz="1600" dirty="0">
-                <a:solidFill>
-                  <a:srgbClr val="172B4D"/>
-                </a:solidFill>
-                <a:latin typeface="-apple-system"/>
-              </a:rPr>
-              <a:t>: Free for SBS researchers.</a:t>
-            </a:r>
-            <a:endParaRPr lang="en-GB" sz="1600" b="0" i="0" dirty="0">
-              <a:solidFill>
-                <a:srgbClr val="172B4D"/>
-              </a:solidFill>
-              <a:effectLst/>
-              <a:latin typeface="-apple-system"/>
-            </a:endParaRPr>
-          </a:p>
-          <a:p>
-            <a:pPr algn="l"/>
-            <a:br>
-              <a:rPr lang="en-GB" sz="1600" b="0" i="0" dirty="0">
-                <a:solidFill>
-                  <a:srgbClr val="172B4D"/>
-                </a:solidFill>
-                <a:effectLst/>
-                <a:latin typeface="-apple-system"/>
-              </a:rPr>
-            </a:br>
-            <a:r>
-              <a:rPr lang="en-GB" sz="1600" b="1" i="0" dirty="0">
-                <a:solidFill>
-                  <a:srgbClr val="172B4D"/>
-                </a:solidFill>
-                <a:effectLst/>
-                <a:latin typeface="-apple-system"/>
-              </a:rPr>
-              <a:t>More info and other costs</a:t>
-            </a:r>
-            <a:endParaRPr lang="en-GB" sz="1600" b="0" i="0" dirty="0">
-              <a:solidFill>
-                <a:srgbClr val="172B4D"/>
-              </a:solidFill>
-              <a:effectLst/>
-              <a:latin typeface="-apple-system"/>
-            </a:endParaRPr>
-          </a:p>
-          <a:p>
-            <a:pPr algn="l"/>
-            <a:r>
-              <a:rPr lang="en-GB" sz="1600" b="0" i="0" dirty="0">
-                <a:solidFill>
-                  <a:srgbClr val="172B4D"/>
-                </a:solidFill>
-                <a:effectLst/>
-                <a:latin typeface="-apple-system"/>
-              </a:rPr>
-              <a:t>Web Hosting: </a:t>
-            </a:r>
-            <a:r>
-              <a:rPr lang="en-GB" sz="1600" b="0" i="0" u="none" strike="noStrike" dirty="0">
-                <a:solidFill>
-                  <a:srgbClr val="0052CC"/>
-                </a:solidFill>
-                <a:effectLst/>
-                <a:latin typeface="-apple-system"/>
-                <a:hlinkClick r:id="rId6"/>
-              </a:rPr>
-              <a:t>https://www.ed.ac.uk/information-services/computing/audio-visual-multi-media/web-hosting/hosting-service-options</a:t>
-            </a:r>
-            <a:r>
-              <a:rPr lang="en-GB" sz="1600" b="0" i="0" u="none" strike="noStrike" dirty="0">
-                <a:solidFill>
-                  <a:srgbClr val="0052CC"/>
-                </a:solidFill>
-                <a:effectLst/>
-                <a:latin typeface="-apple-system"/>
-              </a:rPr>
-              <a:t>.</a:t>
-            </a:r>
-            <a:endParaRPr lang="en-GB" sz="1600" b="0" i="0" dirty="0">
-              <a:solidFill>
-                <a:srgbClr val="172B4D"/>
-              </a:solidFill>
-              <a:effectLst/>
-              <a:latin typeface="-apple-system"/>
-            </a:endParaRPr>
-          </a:p>
-          <a:p>
-            <a:pPr algn="l"/>
-            <a:r>
-              <a:rPr lang="en-GB" sz="1600" b="0" i="0" dirty="0">
-                <a:solidFill>
-                  <a:srgbClr val="172B4D"/>
-                </a:solidFill>
-                <a:effectLst/>
-                <a:latin typeface="-apple-system"/>
-              </a:rPr>
-              <a:t>VM: </a:t>
-            </a:r>
-            <a:r>
-              <a:rPr lang="en-GB" sz="1600" b="0" i="0" u="none" strike="noStrike" dirty="0">
-                <a:solidFill>
-                  <a:srgbClr val="0052CC"/>
-                </a:solidFill>
-                <a:effectLst/>
-                <a:latin typeface="-apple-system"/>
-                <a:hlinkClick r:id="rId7"/>
-              </a:rPr>
-              <a:t>https://www.ed.ac.uk/information-services/computing/computing-infrastructure/virtual-hosting/availability</a:t>
-            </a:r>
-            <a:r>
-              <a:rPr lang="en-GB" sz="1600" b="0" i="0" u="none" strike="noStrike" dirty="0">
-                <a:solidFill>
-                  <a:srgbClr val="0052CC"/>
-                </a:solidFill>
-                <a:effectLst/>
-                <a:latin typeface="-apple-system"/>
-              </a:rPr>
-              <a:t>.</a:t>
-            </a:r>
-            <a:endParaRPr lang="en-GB" sz="1600" b="0" i="0" dirty="0">
-              <a:solidFill>
-                <a:srgbClr val="172B4D"/>
-              </a:solidFill>
-              <a:effectLst/>
-              <a:latin typeface="-apple-system"/>
-            </a:endParaRPr>
+              <a:t>https://www.wiki.ed.ac.uk/display/RDMS/Suggested+data+repositories</a:t>
+            </a:r>
+            <a:r>
+              <a:rPr lang="en-GB" dirty="0"/>
+              <a:t> </a:t>
+            </a:r>
+          </a:p>
+        </p:txBody>
+      </p:sp>
+      <p:sp>
+        <p:nvSpPr>
+          <p:cNvPr id="14" name="TextBox 13">
+            <a:extLst>
+              <a:ext uri="{FF2B5EF4-FFF2-40B4-BE49-F238E27FC236}">
+                <a16:creationId xmlns:a16="http://schemas.microsoft.com/office/drawing/2014/main" id="{311F5080-30CE-4A99-86A9-1EA8A607775E}"/>
+              </a:ext>
+            </a:extLst>
+          </p:cNvPr>
+          <p:cNvSpPr txBox="1"/>
+          <p:nvPr/>
+        </p:nvSpPr>
+        <p:spPr>
+          <a:xfrm>
+            <a:off x="133326" y="5970227"/>
+            <a:ext cx="4344779" cy="369332"/>
+          </a:xfrm>
+          <a:prstGeom prst="rect">
+            <a:avLst/>
+          </a:prstGeom>
+          <a:noFill/>
+        </p:spPr>
+        <p:txBody>
+          <a:bodyPr wrap="none" rtlCol="0">
+            <a:spAutoFit/>
+          </a:bodyPr>
+          <a:lstStyle/>
+          <a:p>
+            <a:r>
+              <a:rPr lang="en-GB" dirty="0" err="1">
+                <a:solidFill>
+                  <a:srgbClr val="002060"/>
+                </a:solidFill>
+              </a:rPr>
+              <a:t>BioRDM’s</a:t>
+            </a:r>
+            <a:r>
+              <a:rPr lang="en-GB" dirty="0">
+                <a:solidFill>
+                  <a:srgbClr val="002060"/>
+                </a:solidFill>
+              </a:rPr>
+              <a:t> list of suggested data repositories:</a:t>
+            </a:r>
+          </a:p>
+        </p:txBody>
+      </p:sp>
+      <p:sp>
+        <p:nvSpPr>
+          <p:cNvPr id="17" name="TextBox 16">
+            <a:extLst>
+              <a:ext uri="{FF2B5EF4-FFF2-40B4-BE49-F238E27FC236}">
+                <a16:creationId xmlns:a16="http://schemas.microsoft.com/office/drawing/2014/main" id="{34933852-3D7C-4365-8439-AB672A92D767}"/>
+              </a:ext>
+            </a:extLst>
+          </p:cNvPr>
+          <p:cNvSpPr txBox="1"/>
+          <p:nvPr/>
+        </p:nvSpPr>
+        <p:spPr>
+          <a:xfrm>
+            <a:off x="0" y="6653304"/>
+            <a:ext cx="2647314" cy="261610"/>
+          </a:xfrm>
+          <a:prstGeom prst="rect">
+            <a:avLst/>
+          </a:prstGeom>
+          <a:noFill/>
+        </p:spPr>
+        <p:txBody>
+          <a:bodyPr wrap="square" rtlCol="0">
+            <a:spAutoFit/>
+          </a:bodyPr>
+          <a:lstStyle/>
+          <a:p>
+            <a:r>
+              <a:rPr lang="en-GB" sz="1100" dirty="0"/>
+              <a:t>Image credit: Dr Andrés Romanowski</a:t>
+            </a:r>
           </a:p>
         </p:txBody>
       </p:sp>
     </p:spTree>
     <p:extLst>
       <p:ext uri="{BB962C8B-B14F-4D97-AF65-F5344CB8AC3E}">
-        <p14:creationId xmlns:p14="http://schemas.microsoft.com/office/powerpoint/2010/main" val="4122250833"/>
+        <p14:creationId xmlns:p14="http://schemas.microsoft.com/office/powerpoint/2010/main" val="3358587853"/>
       </p:ext>
     </p:extLst>
   </p:cSld>
@@ -7034,103 +6585,286 @@
       </p:grpSpPr>
       <p:sp>
         <p:nvSpPr>
-          <p:cNvPr id="5" name="TextBox 4">
-            <a:extLst>
-              <a:ext uri="{FF2B5EF4-FFF2-40B4-BE49-F238E27FC236}">
-                <a16:creationId xmlns:a16="http://schemas.microsoft.com/office/drawing/2014/main" id="{3A7A1F5C-9C70-4DE3-BA39-7835B2935EB3}"/>
-              </a:ext>
-            </a:extLst>
-          </p:cNvPr>
-          <p:cNvSpPr txBox="1"/>
+          <p:cNvPr id="4" name="Title 1">
+            <a:extLst>
+              <a:ext uri="{FF2B5EF4-FFF2-40B4-BE49-F238E27FC236}">
+                <a16:creationId xmlns:a16="http://schemas.microsoft.com/office/drawing/2014/main" id="{B7C65D11-187F-415C-B5B7-D269A1D22511}"/>
+              </a:ext>
+            </a:extLst>
+          </p:cNvPr>
+          <p:cNvSpPr txBox="1">
+            <a:spLocks/>
+          </p:cNvSpPr>
           <p:nvPr/>
         </p:nvSpPr>
-        <p:spPr>
+        <p:spPr bwMode="auto">
           <a:xfrm>
-            <a:off x="1363735" y="1129464"/>
-            <a:ext cx="9464530" cy="2677656"/>
+            <a:off x="3604261" y="193664"/>
+            <a:ext cx="6097088" cy="607448"/>
           </a:xfrm>
           <a:prstGeom prst="rect">
             <a:avLst/>
           </a:prstGeom>
           <a:noFill/>
+          <a:ln>
+            <a:noFill/>
+          </a:ln>
+          <a:extLst>
+            <a:ext uri="{909E8E84-426E-40dd-AFC4-6F175D3DCCD1}">
+              <a14:hiddenFill xmlns:a14="http://schemas.microsoft.com/office/drawing/2010/main" xmlns="">
+                <a:solidFill>
+                  <a:srgbClr val="FFFFFF"/>
+                </a:solidFill>
+              </a14:hiddenFill>
+            </a:ext>
+            <a:ext uri="{91240B29-F687-4f45-9708-019B960494DF}">
+              <a14:hiddenLine xmlns:a14="http://schemas.microsoft.com/office/drawing/2010/main" xmlns="" w="9525">
+                <a:solidFill>
+                  <a:srgbClr val="000000"/>
+                </a:solidFill>
+                <a:miter lim="800000"/>
+                <a:headEnd/>
+                <a:tailEnd/>
+              </a14:hiddenLine>
+            </a:ext>
+          </a:extLst>
         </p:spPr>
         <p:txBody>
-          <a:bodyPr wrap="square">
-            <a:spAutoFit/>
+          <a:bodyPr vert="horz" wrap="square" lIns="91440" tIns="45720" rIns="91440" bIns="45720" numCol="1" anchor="ctr" anchorCtr="0" compatLnSpc="1">
+            <a:prstTxWarp prst="textNoShape">
+              <a:avLst/>
+            </a:prstTxWarp>
           </a:bodyPr>
-          <a:lstStyle/>
+          <a:lstStyle>
+            <a:lvl1pPr algn="l" rtl="0" eaLnBrk="1" fontAlgn="base" hangingPunct="1">
+              <a:lnSpc>
+                <a:spcPct val="90000"/>
+              </a:lnSpc>
+              <a:spcBef>
+                <a:spcPct val="0"/>
+              </a:spcBef>
+              <a:spcAft>
+                <a:spcPct val="0"/>
+              </a:spcAft>
+              <a:defRPr lang="en-GB" sz="3200" kern="1200" dirty="0">
+                <a:solidFill>
+                  <a:schemeClr val="tx1"/>
+                </a:solidFill>
+                <a:latin typeface="+mj-lt"/>
+                <a:ea typeface="ＭＳ Ｐゴシック" charset="-128"/>
+                <a:cs typeface="ＭＳ Ｐゴシック" charset="-128"/>
+              </a:defRPr>
+            </a:lvl1pPr>
+            <a:lvl2pPr algn="l" rtl="0" eaLnBrk="1" fontAlgn="base" hangingPunct="1">
+              <a:lnSpc>
+                <a:spcPct val="90000"/>
+              </a:lnSpc>
+              <a:spcBef>
+                <a:spcPct val="0"/>
+              </a:spcBef>
+              <a:spcAft>
+                <a:spcPct val="0"/>
+              </a:spcAft>
+              <a:defRPr sz="4400">
+                <a:solidFill>
+                  <a:schemeClr val="tx1"/>
+                </a:solidFill>
+                <a:latin typeface="Calibri Light" charset="0"/>
+                <a:ea typeface="ＭＳ Ｐゴシック" charset="-128"/>
+                <a:cs typeface="ＭＳ Ｐゴシック" charset="-128"/>
+              </a:defRPr>
+            </a:lvl2pPr>
+            <a:lvl3pPr algn="l" rtl="0" eaLnBrk="1" fontAlgn="base" hangingPunct="1">
+              <a:lnSpc>
+                <a:spcPct val="90000"/>
+              </a:lnSpc>
+              <a:spcBef>
+                <a:spcPct val="0"/>
+              </a:spcBef>
+              <a:spcAft>
+                <a:spcPct val="0"/>
+              </a:spcAft>
+              <a:defRPr sz="4400">
+                <a:solidFill>
+                  <a:schemeClr val="tx1"/>
+                </a:solidFill>
+                <a:latin typeface="Calibri Light" charset="0"/>
+                <a:ea typeface="ＭＳ Ｐゴシック" charset="-128"/>
+                <a:cs typeface="ＭＳ Ｐゴシック" charset="-128"/>
+              </a:defRPr>
+            </a:lvl3pPr>
+            <a:lvl4pPr algn="l" rtl="0" eaLnBrk="1" fontAlgn="base" hangingPunct="1">
+              <a:lnSpc>
+                <a:spcPct val="90000"/>
+              </a:lnSpc>
+              <a:spcBef>
+                <a:spcPct val="0"/>
+              </a:spcBef>
+              <a:spcAft>
+                <a:spcPct val="0"/>
+              </a:spcAft>
+              <a:defRPr sz="4400">
+                <a:solidFill>
+                  <a:schemeClr val="tx1"/>
+                </a:solidFill>
+                <a:latin typeface="Calibri Light" charset="0"/>
+                <a:ea typeface="ＭＳ Ｐゴシック" charset="-128"/>
+                <a:cs typeface="ＭＳ Ｐゴシック" charset="-128"/>
+              </a:defRPr>
+            </a:lvl4pPr>
+            <a:lvl5pPr algn="l" rtl="0" eaLnBrk="1" fontAlgn="base" hangingPunct="1">
+              <a:lnSpc>
+                <a:spcPct val="90000"/>
+              </a:lnSpc>
+              <a:spcBef>
+                <a:spcPct val="0"/>
+              </a:spcBef>
+              <a:spcAft>
+                <a:spcPct val="0"/>
+              </a:spcAft>
+              <a:defRPr sz="4400">
+                <a:solidFill>
+                  <a:schemeClr val="tx1"/>
+                </a:solidFill>
+                <a:latin typeface="Calibri Light" charset="0"/>
+                <a:ea typeface="ＭＳ Ｐゴシック" charset="-128"/>
+                <a:cs typeface="ＭＳ Ｐゴシック" charset="-128"/>
+              </a:defRPr>
+            </a:lvl5pPr>
+            <a:lvl6pPr marL="457200" algn="l" rtl="0" eaLnBrk="1" fontAlgn="base" hangingPunct="1">
+              <a:lnSpc>
+                <a:spcPct val="90000"/>
+              </a:lnSpc>
+              <a:spcBef>
+                <a:spcPct val="0"/>
+              </a:spcBef>
+              <a:spcAft>
+                <a:spcPct val="0"/>
+              </a:spcAft>
+              <a:defRPr sz="4400">
+                <a:solidFill>
+                  <a:schemeClr val="tx1"/>
+                </a:solidFill>
+                <a:latin typeface="Calibri Light" charset="0"/>
+                <a:ea typeface="ＭＳ Ｐゴシック" charset="-128"/>
+                <a:cs typeface="ＭＳ Ｐゴシック" charset="-128"/>
+              </a:defRPr>
+            </a:lvl6pPr>
+            <a:lvl7pPr marL="914400" algn="l" rtl="0" eaLnBrk="1" fontAlgn="base" hangingPunct="1">
+              <a:lnSpc>
+                <a:spcPct val="90000"/>
+              </a:lnSpc>
+              <a:spcBef>
+                <a:spcPct val="0"/>
+              </a:spcBef>
+              <a:spcAft>
+                <a:spcPct val="0"/>
+              </a:spcAft>
+              <a:defRPr sz="4400">
+                <a:solidFill>
+                  <a:schemeClr val="tx1"/>
+                </a:solidFill>
+                <a:latin typeface="Calibri Light" charset="0"/>
+                <a:ea typeface="ＭＳ Ｐゴシック" charset="-128"/>
+                <a:cs typeface="ＭＳ Ｐゴシック" charset="-128"/>
+              </a:defRPr>
+            </a:lvl7pPr>
+            <a:lvl8pPr marL="1371600" algn="l" rtl="0" eaLnBrk="1" fontAlgn="base" hangingPunct="1">
+              <a:lnSpc>
+                <a:spcPct val="90000"/>
+              </a:lnSpc>
+              <a:spcBef>
+                <a:spcPct val="0"/>
+              </a:spcBef>
+              <a:spcAft>
+                <a:spcPct val="0"/>
+              </a:spcAft>
+              <a:defRPr sz="4400">
+                <a:solidFill>
+                  <a:schemeClr val="tx1"/>
+                </a:solidFill>
+                <a:latin typeface="Calibri Light" charset="0"/>
+                <a:ea typeface="ＭＳ Ｐゴシック" charset="-128"/>
+                <a:cs typeface="ＭＳ Ｐゴシック" charset="-128"/>
+              </a:defRPr>
+            </a:lvl8pPr>
+            <a:lvl9pPr marL="1828800" algn="l" rtl="0" eaLnBrk="1" fontAlgn="base" hangingPunct="1">
+              <a:lnSpc>
+                <a:spcPct val="90000"/>
+              </a:lnSpc>
+              <a:spcBef>
+                <a:spcPct val="0"/>
+              </a:spcBef>
+              <a:spcAft>
+                <a:spcPct val="0"/>
+              </a:spcAft>
+              <a:defRPr sz="4400">
+                <a:solidFill>
+                  <a:schemeClr val="tx1"/>
+                </a:solidFill>
+                <a:latin typeface="Calibri Light" charset="0"/>
+                <a:ea typeface="ＭＳ Ｐゴシック" charset="-128"/>
+                <a:cs typeface="ＭＳ Ｐゴシック" charset="-128"/>
+              </a:defRPr>
+            </a:lvl9pPr>
+          </a:lstStyle>
           <a:p>
             <a:r>
               <a:rPr lang="en-GB" sz="2800" dirty="0">
                 <a:solidFill>
-                  <a:srgbClr val="0070C0"/>
-                </a:solidFill>
-              </a:rPr>
-              <a:t>Exercise/challenge 2: </a:t>
-            </a:r>
-          </a:p>
-          <a:p>
-            <a:pPr algn="ctr"/>
-            <a:endParaRPr lang="en-GB" sz="2800" dirty="0">
+                  <a:schemeClr val="bg1"/>
+                </a:solidFill>
+                <a:latin typeface="Arial" panose="020B0604020202020204" pitchFamily="34" charset="0"/>
+                <a:cs typeface="Arial" panose="020B0604020202020204" pitchFamily="34" charset="0"/>
+              </a:rPr>
+              <a:t>RDM </a:t>
+            </a:r>
+            <a:r>
+              <a:rPr lang="pl-PL" sz="2800" dirty="0">
+                <a:solidFill>
+                  <a:schemeClr val="bg1"/>
+                </a:solidFill>
+                <a:latin typeface="Arial" panose="020B0604020202020204" pitchFamily="34" charset="0"/>
+                <a:cs typeface="Arial" panose="020B0604020202020204" pitchFamily="34" charset="0"/>
+              </a:rPr>
+              <a:t>as part of </a:t>
+            </a:r>
+            <a:r>
+              <a:rPr lang="en-GB" sz="2800" dirty="0">
+                <a:solidFill>
+                  <a:schemeClr val="bg1"/>
+                </a:solidFill>
+                <a:latin typeface="Arial" panose="020B0604020202020204" pitchFamily="34" charset="0"/>
+                <a:cs typeface="Arial" panose="020B0604020202020204" pitchFamily="34" charset="0"/>
+              </a:rPr>
+              <a:t>the </a:t>
+            </a:r>
+            <a:r>
+              <a:rPr lang="pl-PL" sz="2800" dirty="0">
+                <a:solidFill>
+                  <a:schemeClr val="bg1"/>
+                </a:solidFill>
+                <a:latin typeface="Arial" panose="020B0604020202020204" pitchFamily="34" charset="0"/>
+                <a:cs typeface="Arial" panose="020B0604020202020204" pitchFamily="34" charset="0"/>
+              </a:rPr>
+              <a:t>workflow</a:t>
+            </a:r>
+            <a:endParaRPr lang="en-GB" sz="2800" kern="0" dirty="0">
               <a:solidFill>
-                <a:srgbClr val="0070C0"/>
+                <a:schemeClr val="bg1"/>
               </a:solidFill>
+              <a:latin typeface="Arial" panose="020B0604020202020204" pitchFamily="34" charset="0"/>
+              <a:cs typeface="Arial" panose="020B0604020202020204" pitchFamily="34" charset="0"/>
             </a:endParaRPr>
-          </a:p>
-          <a:p>
-            <a:pPr algn="ctr"/>
-            <a:r>
-              <a:rPr lang="en-GB" sz="2800" dirty="0">
-                <a:solidFill>
-                  <a:srgbClr val="0070C0"/>
-                </a:solidFill>
-              </a:rPr>
-              <a:t>Working in pairs, think of your last paper (or project). Write a short DMP for this </a:t>
-            </a:r>
-            <a:r>
-              <a:rPr lang="en-GB" sz="2800" b="1" dirty="0">
-                <a:solidFill>
-                  <a:srgbClr val="0070C0"/>
-                </a:solidFill>
-              </a:rPr>
-              <a:t>joined project</a:t>
-            </a:r>
-            <a:r>
-              <a:rPr lang="en-GB" sz="2800" dirty="0">
-                <a:solidFill>
-                  <a:srgbClr val="0070C0"/>
-                </a:solidFill>
-              </a:rPr>
-              <a:t>.</a:t>
-            </a:r>
-          </a:p>
-          <a:p>
-            <a:pPr algn="ctr"/>
-            <a:endParaRPr lang="en-GB" sz="2800" dirty="0">
-              <a:solidFill>
-                <a:srgbClr val="0070C0"/>
-              </a:solidFill>
-            </a:endParaRPr>
-          </a:p>
-          <a:p>
-            <a:pPr algn="ctr"/>
-            <a:r>
-              <a:rPr lang="en-GB" sz="2800" dirty="0">
-                <a:solidFill>
-                  <a:srgbClr val="0070C0"/>
-                </a:solidFill>
-              </a:rPr>
-              <a:t>Starts in this session &amp; continues as homework.</a:t>
-            </a:r>
           </a:p>
         </p:txBody>
       </p:sp>
       <p:pic>
         <p:nvPicPr>
-          <p:cNvPr id="4" name="Picture 2" descr="Ed_DaSH">
-            <a:extLst>
-              <a:ext uri="{FF2B5EF4-FFF2-40B4-BE49-F238E27FC236}">
-                <a16:creationId xmlns:a16="http://schemas.microsoft.com/office/drawing/2014/main" id="{A783256F-E39E-4712-96B0-240BD611CFEB}"/>
+          <p:cNvPr id="15" name="Picture 2" descr="Ed_DaSH">
+            <a:extLst>
+              <a:ext uri="{FF2B5EF4-FFF2-40B4-BE49-F238E27FC236}">
+                <a16:creationId xmlns:a16="http://schemas.microsoft.com/office/drawing/2014/main" id="{C3A7EB11-F737-4E59-98C0-89D512297C46}"/>
               </a:ext>
             </a:extLst>
           </p:cNvPr>
@@ -7172,10 +6906,613 @@
           </a:extLst>
         </p:spPr>
       </p:pic>
+      <p:sp>
+        <p:nvSpPr>
+          <p:cNvPr id="16" name="TextBox 15">
+            <a:extLst>
+              <a:ext uri="{FF2B5EF4-FFF2-40B4-BE49-F238E27FC236}">
+                <a16:creationId xmlns:a16="http://schemas.microsoft.com/office/drawing/2014/main" id="{9EEED67F-1E1B-4255-ACD6-15E77A5FB269}"/>
+              </a:ext>
+            </a:extLst>
+          </p:cNvPr>
+          <p:cNvSpPr txBox="1"/>
+          <p:nvPr/>
+        </p:nvSpPr>
+        <p:spPr>
+          <a:xfrm>
+            <a:off x="515880" y="488425"/>
+            <a:ext cx="9464530" cy="646331"/>
+          </a:xfrm>
+          <a:prstGeom prst="rect">
+            <a:avLst/>
+          </a:prstGeom>
+          <a:noFill/>
+        </p:spPr>
+        <p:txBody>
+          <a:bodyPr wrap="square">
+            <a:spAutoFit/>
+          </a:bodyPr>
+          <a:lstStyle/>
+          <a:p>
+            <a:r>
+              <a:rPr lang="en-GB" sz="3600" dirty="0">
+                <a:solidFill>
+                  <a:srgbClr val="0070C0"/>
+                </a:solidFill>
+              </a:rPr>
+              <a:t>Is this all for free?</a:t>
+            </a:r>
+          </a:p>
+        </p:txBody>
+      </p:sp>
+      <p:sp>
+        <p:nvSpPr>
+          <p:cNvPr id="10" name="TextBox 9">
+            <a:extLst>
+              <a:ext uri="{FF2B5EF4-FFF2-40B4-BE49-F238E27FC236}">
+                <a16:creationId xmlns:a16="http://schemas.microsoft.com/office/drawing/2014/main" id="{EEA3DADF-9B9A-4084-A973-9CDEB37FB1A7}"/>
+              </a:ext>
+            </a:extLst>
+          </p:cNvPr>
+          <p:cNvSpPr txBox="1"/>
+          <p:nvPr/>
+        </p:nvSpPr>
+        <p:spPr>
+          <a:xfrm>
+            <a:off x="515880" y="1134756"/>
+            <a:ext cx="11594004" cy="5262979"/>
+          </a:xfrm>
+          <a:prstGeom prst="rect">
+            <a:avLst/>
+          </a:prstGeom>
+          <a:noFill/>
+        </p:spPr>
+        <p:txBody>
+          <a:bodyPr wrap="square">
+            <a:spAutoFit/>
+          </a:bodyPr>
+          <a:lstStyle/>
+          <a:p>
+            <a:pPr algn="l"/>
+            <a:r>
+              <a:rPr lang="en-GB" sz="1600" b="1" i="0" dirty="0">
+                <a:solidFill>
+                  <a:srgbClr val="172B4D"/>
+                </a:solidFill>
+                <a:effectLst/>
+                <a:latin typeface="-apple-system"/>
+              </a:rPr>
+              <a:t>Some RDS costs</a:t>
+            </a:r>
+            <a:endParaRPr lang="en-GB" sz="1600" b="0" i="0" dirty="0">
+              <a:solidFill>
+                <a:srgbClr val="172B4D"/>
+              </a:solidFill>
+              <a:effectLst/>
+              <a:latin typeface="-apple-system"/>
+            </a:endParaRPr>
+          </a:p>
+          <a:p>
+            <a:r>
+              <a:rPr lang="en-GB" sz="1600" b="0" i="0" dirty="0" err="1">
+                <a:solidFill>
+                  <a:srgbClr val="172B4D"/>
+                </a:solidFill>
+                <a:effectLst/>
+                <a:latin typeface="-apple-system"/>
+              </a:rPr>
+              <a:t>DataStore</a:t>
+            </a:r>
+            <a:r>
+              <a:rPr lang="en-GB" sz="1600" b="0" i="0" dirty="0">
+                <a:solidFill>
+                  <a:srgbClr val="172B4D"/>
+                </a:solidFill>
+                <a:effectLst/>
+                <a:latin typeface="-apple-system"/>
+              </a:rPr>
+              <a:t> 500Gb default free storage space, then storage per TB/year - £175 </a:t>
+            </a:r>
+          </a:p>
+          <a:p>
+            <a:r>
+              <a:rPr lang="en-GB" sz="1600" b="0" i="0" dirty="0" err="1">
+                <a:solidFill>
+                  <a:srgbClr val="172B4D"/>
+                </a:solidFill>
+                <a:effectLst/>
+                <a:latin typeface="-apple-system"/>
+              </a:rPr>
+              <a:t>DataVault</a:t>
+            </a:r>
+            <a:r>
+              <a:rPr lang="en-GB" sz="1600" b="0" i="0" dirty="0">
+                <a:solidFill>
+                  <a:srgbClr val="172B4D"/>
+                </a:solidFill>
+                <a:effectLst/>
+                <a:latin typeface="-apple-system"/>
+              </a:rPr>
+              <a:t> storage per TB for 10 years  - £500</a:t>
+            </a:r>
+          </a:p>
+          <a:p>
+            <a:pPr algn="l"/>
+            <a:r>
+              <a:rPr lang="en-GB" sz="1600" b="0" i="0" dirty="0">
+                <a:solidFill>
+                  <a:srgbClr val="172B4D"/>
+                </a:solidFill>
+                <a:effectLst/>
+                <a:latin typeface="-apple-system"/>
+              </a:rPr>
+              <a:t>Eddie storage per TB/year - £400</a:t>
+            </a:r>
+          </a:p>
+          <a:p>
+            <a:pPr algn="l"/>
+            <a:r>
+              <a:rPr lang="en-GB" sz="1600" b="0" i="0" dirty="0" err="1">
+                <a:solidFill>
+                  <a:srgbClr val="172B4D"/>
+                </a:solidFill>
+                <a:effectLst/>
+                <a:latin typeface="-apple-system"/>
+              </a:rPr>
+              <a:t>DataShare</a:t>
+            </a:r>
+            <a:r>
+              <a:rPr lang="en-GB" sz="1600" b="0" i="0" dirty="0">
+                <a:solidFill>
+                  <a:srgbClr val="172B4D"/>
+                </a:solidFill>
+                <a:effectLst/>
+                <a:latin typeface="-apple-system"/>
+              </a:rPr>
+              <a:t> – free</a:t>
+            </a:r>
+          </a:p>
+          <a:p>
+            <a:pPr algn="l"/>
+            <a:r>
+              <a:rPr lang="en-GB" sz="1600" dirty="0" err="1">
+                <a:solidFill>
+                  <a:srgbClr val="172B4D"/>
+                </a:solidFill>
+                <a:latin typeface="-apple-system"/>
+              </a:rPr>
+              <a:t>DataSync</a:t>
+            </a:r>
+            <a:r>
+              <a:rPr lang="en-GB" sz="1600" dirty="0">
+                <a:solidFill>
+                  <a:srgbClr val="172B4D"/>
+                </a:solidFill>
+                <a:latin typeface="-apple-system"/>
+              </a:rPr>
+              <a:t> – free (20Gb default quota + </a:t>
+            </a:r>
+            <a:r>
+              <a:rPr lang="en-GB" sz="1600" dirty="0" err="1">
+                <a:solidFill>
+                  <a:srgbClr val="172B4D"/>
+                </a:solidFill>
+                <a:latin typeface="-apple-system"/>
+              </a:rPr>
+              <a:t>DataStore</a:t>
+            </a:r>
+            <a:r>
+              <a:rPr lang="en-GB" sz="1600" dirty="0">
+                <a:solidFill>
+                  <a:srgbClr val="172B4D"/>
+                </a:solidFill>
+                <a:latin typeface="-apple-system"/>
+              </a:rPr>
+              <a:t> space)</a:t>
+            </a:r>
+            <a:endParaRPr lang="en-GB" sz="1600" b="0" i="0" dirty="0">
+              <a:solidFill>
+                <a:srgbClr val="172B4D"/>
+              </a:solidFill>
+              <a:effectLst/>
+              <a:latin typeface="-apple-system"/>
+            </a:endParaRPr>
+          </a:p>
+          <a:p>
+            <a:pPr algn="l"/>
+            <a:r>
+              <a:rPr lang="en-GB" sz="1600" b="0" i="0" dirty="0">
+                <a:solidFill>
+                  <a:srgbClr val="172B4D"/>
+                </a:solidFill>
+                <a:effectLst/>
+                <a:latin typeface="-apple-system"/>
+              </a:rPr>
+              <a:t>GitLab - free (50Mb default quota)</a:t>
+            </a:r>
+          </a:p>
+          <a:p>
+            <a:pPr algn="l"/>
+            <a:r>
+              <a:rPr lang="en-GB" sz="1600" b="0" i="0" dirty="0">
+                <a:solidFill>
+                  <a:srgbClr val="172B4D"/>
+                </a:solidFill>
+                <a:effectLst/>
+                <a:latin typeface="-apple-system"/>
+              </a:rPr>
+              <a:t>Subversion - No charge up to 10GB &gt;10 GB by arrangement</a:t>
+            </a:r>
+          </a:p>
+          <a:p>
+            <a:pPr algn="l"/>
+            <a:endParaRPr lang="en-GB" sz="1600" b="0" i="0" dirty="0">
+              <a:solidFill>
+                <a:srgbClr val="172B4D"/>
+              </a:solidFill>
+              <a:effectLst/>
+              <a:latin typeface="-apple-system"/>
+            </a:endParaRPr>
+          </a:p>
+          <a:p>
+            <a:pPr algn="l"/>
+            <a:r>
+              <a:rPr lang="en-GB" sz="1600" b="1" i="0" dirty="0">
+                <a:solidFill>
+                  <a:srgbClr val="172B4D"/>
+                </a:solidFill>
+                <a:effectLst/>
+                <a:latin typeface="-apple-system"/>
+              </a:rPr>
+              <a:t>Note/disclaimer:</a:t>
+            </a:r>
+            <a:r>
+              <a:rPr lang="en-GB" sz="1600" b="0" i="0" dirty="0">
+                <a:solidFill>
+                  <a:srgbClr val="172B4D"/>
+                </a:solidFill>
+                <a:effectLst/>
+                <a:latin typeface="-apple-system"/>
+              </a:rPr>
+              <a:t> These prices </a:t>
+            </a:r>
+            <a:r>
+              <a:rPr lang="en-GB" sz="1600" b="0" i="1" dirty="0">
+                <a:solidFill>
+                  <a:srgbClr val="172B4D"/>
+                </a:solidFill>
+                <a:effectLst/>
+                <a:latin typeface="-apple-system"/>
+              </a:rPr>
+              <a:t>might not reflect current pricing </a:t>
+            </a:r>
+            <a:r>
+              <a:rPr lang="en-GB" sz="1600" b="0" i="0" dirty="0">
+                <a:solidFill>
+                  <a:srgbClr val="172B4D"/>
+                </a:solidFill>
+                <a:effectLst/>
+                <a:latin typeface="-apple-system"/>
+              </a:rPr>
+              <a:t>and are present here to give you a ballpark estimate (last checked: Sept 2020). Check current values through this link or contact RDS: </a:t>
+            </a:r>
+            <a:r>
+              <a:rPr lang="en-GB" sz="1600" b="0" i="0" u="none" strike="noStrike" dirty="0">
+                <a:solidFill>
+                  <a:srgbClr val="0052CC"/>
+                </a:solidFill>
+                <a:effectLst/>
+                <a:latin typeface="-apple-system"/>
+                <a:hlinkClick r:id="rId3"/>
+              </a:rPr>
+              <a:t>more information on these charges</a:t>
+            </a:r>
+            <a:endParaRPr lang="en-GB" sz="1600" b="0" i="0" dirty="0">
+              <a:solidFill>
+                <a:srgbClr val="172B4D"/>
+              </a:solidFill>
+              <a:effectLst/>
+              <a:latin typeface="-apple-system"/>
+            </a:endParaRPr>
+          </a:p>
+          <a:p>
+            <a:pPr algn="l"/>
+            <a:r>
+              <a:rPr lang="en-GB" sz="1600" b="0" i="0" dirty="0">
+                <a:solidFill>
+                  <a:srgbClr val="172B4D"/>
+                </a:solidFill>
+                <a:effectLst/>
+                <a:latin typeface="-apple-system"/>
+              </a:rPr>
+              <a:t>Version control services description and cost: </a:t>
+            </a:r>
+            <a:r>
+              <a:rPr lang="en-GB" sz="1600" b="0" i="0" u="none" strike="noStrike" dirty="0">
+                <a:solidFill>
+                  <a:srgbClr val="0052CC"/>
+                </a:solidFill>
+                <a:effectLst/>
+                <a:latin typeface="-apple-system"/>
+                <a:hlinkClick r:id="rId4"/>
+              </a:rPr>
+              <a:t>Version Control Services</a:t>
+            </a:r>
+            <a:r>
+              <a:rPr lang="en-GB" sz="1600" b="0" i="0" u="none" strike="noStrike" dirty="0">
+                <a:solidFill>
+                  <a:srgbClr val="0052CC"/>
+                </a:solidFill>
+                <a:effectLst/>
+                <a:latin typeface="-apple-system"/>
+              </a:rPr>
+              <a:t>.</a:t>
+            </a:r>
+            <a:endParaRPr lang="en-GB" sz="1600" b="0" i="0" dirty="0">
+              <a:solidFill>
+                <a:srgbClr val="172B4D"/>
+              </a:solidFill>
+              <a:effectLst/>
+              <a:latin typeface="-apple-system"/>
+            </a:endParaRPr>
+          </a:p>
+          <a:p>
+            <a:pPr algn="l"/>
+            <a:r>
+              <a:rPr lang="en-GB" sz="1600" b="0" i="0" dirty="0">
+                <a:solidFill>
+                  <a:srgbClr val="172B4D"/>
+                </a:solidFill>
+                <a:effectLst/>
+                <a:latin typeface="-apple-system"/>
+              </a:rPr>
+              <a:t>More info on </a:t>
+            </a:r>
+            <a:r>
+              <a:rPr lang="en-GB" sz="1600" b="0" i="0" dirty="0" err="1">
+                <a:solidFill>
+                  <a:srgbClr val="172B4D"/>
+                </a:solidFill>
+                <a:effectLst/>
+                <a:latin typeface="-apple-system"/>
+              </a:rPr>
+              <a:t>DataVault</a:t>
+            </a:r>
+            <a:r>
+              <a:rPr lang="en-GB" sz="1600" b="0" i="0" dirty="0">
+                <a:solidFill>
+                  <a:srgbClr val="172B4D"/>
+                </a:solidFill>
+                <a:effectLst/>
+                <a:latin typeface="-apple-system"/>
+              </a:rPr>
+              <a:t>: </a:t>
+            </a:r>
+            <a:r>
+              <a:rPr lang="en-GB" sz="1600" b="0" i="0" u="none" strike="noStrike" dirty="0">
+                <a:solidFill>
+                  <a:srgbClr val="0052CC"/>
+                </a:solidFill>
+                <a:effectLst/>
+                <a:latin typeface="-apple-system"/>
+                <a:hlinkClick r:id="rId5"/>
+              </a:rPr>
+              <a:t>https://www.ed.ac.uk/information-services/research-support/research-data-service/after/datavault/cost</a:t>
+            </a:r>
+            <a:r>
+              <a:rPr lang="en-GB" sz="1600" b="0" i="0" u="none" strike="noStrike" dirty="0">
+                <a:solidFill>
+                  <a:srgbClr val="0052CC"/>
+                </a:solidFill>
+                <a:effectLst/>
+                <a:latin typeface="-apple-system"/>
+              </a:rPr>
+              <a:t>.</a:t>
+            </a:r>
+            <a:endParaRPr lang="en-GB" sz="1600" b="0" i="0" dirty="0">
+              <a:solidFill>
+                <a:srgbClr val="172B4D"/>
+              </a:solidFill>
+              <a:effectLst/>
+              <a:latin typeface="-apple-system"/>
+            </a:endParaRPr>
+          </a:p>
+          <a:p>
+            <a:pPr algn="l"/>
+            <a:br>
+              <a:rPr lang="en-GB" sz="1600" b="0" i="0" dirty="0">
+                <a:solidFill>
+                  <a:srgbClr val="172B4D"/>
+                </a:solidFill>
+                <a:effectLst/>
+                <a:latin typeface="-apple-system"/>
+              </a:rPr>
+            </a:br>
+            <a:r>
+              <a:rPr lang="en-GB" sz="1600" b="1" i="0" dirty="0">
+                <a:solidFill>
+                  <a:srgbClr val="172B4D"/>
+                </a:solidFill>
+                <a:effectLst/>
+                <a:latin typeface="-apple-system"/>
+              </a:rPr>
+              <a:t>BioRDM costs</a:t>
+            </a:r>
+            <a:endParaRPr lang="en-GB" sz="1600" b="0" i="0" dirty="0">
+              <a:solidFill>
+                <a:srgbClr val="172B4D"/>
+              </a:solidFill>
+              <a:effectLst/>
+              <a:latin typeface="-apple-system"/>
+            </a:endParaRPr>
+          </a:p>
+          <a:p>
+            <a:pPr algn="l"/>
+            <a:r>
+              <a:rPr lang="en-GB" sz="1600" b="0" i="0" dirty="0">
+                <a:solidFill>
+                  <a:srgbClr val="172B4D"/>
+                </a:solidFill>
+                <a:effectLst/>
+                <a:latin typeface="-apple-system"/>
+              </a:rPr>
+              <a:t>Professional Data Curation Services: for more information and an up to date quote e-mail the BioRDM team.</a:t>
+            </a:r>
+          </a:p>
+          <a:p>
+            <a:pPr algn="l"/>
+            <a:r>
+              <a:rPr lang="en-GB" sz="1600" dirty="0">
+                <a:solidFill>
+                  <a:srgbClr val="172B4D"/>
+                </a:solidFill>
+                <a:latin typeface="-apple-system"/>
+              </a:rPr>
+              <a:t>SBS Public </a:t>
+            </a:r>
+            <a:r>
+              <a:rPr lang="en-GB" sz="1600" dirty="0" err="1">
+                <a:solidFill>
+                  <a:srgbClr val="172B4D"/>
+                </a:solidFill>
+                <a:latin typeface="-apple-system"/>
+              </a:rPr>
+              <a:t>Omero</a:t>
+            </a:r>
+            <a:r>
+              <a:rPr lang="en-GB" sz="1600" dirty="0">
+                <a:solidFill>
+                  <a:srgbClr val="172B4D"/>
+                </a:solidFill>
+                <a:latin typeface="-apple-system"/>
+              </a:rPr>
+              <a:t>: Free for SBS researchers.</a:t>
+            </a:r>
+            <a:endParaRPr lang="en-GB" sz="1600" b="0" i="0" dirty="0">
+              <a:solidFill>
+                <a:srgbClr val="172B4D"/>
+              </a:solidFill>
+              <a:effectLst/>
+              <a:latin typeface="-apple-system"/>
+            </a:endParaRPr>
+          </a:p>
+          <a:p>
+            <a:pPr algn="l"/>
+            <a:br>
+              <a:rPr lang="en-GB" sz="1600" b="0" i="0" dirty="0">
+                <a:solidFill>
+                  <a:srgbClr val="172B4D"/>
+                </a:solidFill>
+                <a:effectLst/>
+                <a:latin typeface="-apple-system"/>
+              </a:rPr>
+            </a:br>
+            <a:r>
+              <a:rPr lang="en-GB" sz="1600" b="1" i="0" dirty="0">
+                <a:solidFill>
+                  <a:srgbClr val="172B4D"/>
+                </a:solidFill>
+                <a:effectLst/>
+                <a:latin typeface="-apple-system"/>
+              </a:rPr>
+              <a:t>More info and other costs</a:t>
+            </a:r>
+            <a:endParaRPr lang="en-GB" sz="1600" b="0" i="0" dirty="0">
+              <a:solidFill>
+                <a:srgbClr val="172B4D"/>
+              </a:solidFill>
+              <a:effectLst/>
+              <a:latin typeface="-apple-system"/>
+            </a:endParaRPr>
+          </a:p>
+          <a:p>
+            <a:pPr algn="l"/>
+            <a:r>
+              <a:rPr lang="en-GB" sz="1600" b="0" i="0" dirty="0">
+                <a:solidFill>
+                  <a:srgbClr val="172B4D"/>
+                </a:solidFill>
+                <a:effectLst/>
+                <a:latin typeface="-apple-system"/>
+              </a:rPr>
+              <a:t>Web Hosting: </a:t>
+            </a:r>
+            <a:r>
+              <a:rPr lang="en-GB" sz="1600" b="0" i="0" u="none" strike="noStrike" dirty="0">
+                <a:solidFill>
+                  <a:srgbClr val="0052CC"/>
+                </a:solidFill>
+                <a:effectLst/>
+                <a:latin typeface="-apple-system"/>
+                <a:hlinkClick r:id="rId6"/>
+              </a:rPr>
+              <a:t>https://www.ed.ac.uk/information-services/computing/audio-visual-multi-media/web-hosting/hosting-service-options</a:t>
+            </a:r>
+            <a:r>
+              <a:rPr lang="en-GB" sz="1600" b="0" i="0" u="none" strike="noStrike" dirty="0">
+                <a:solidFill>
+                  <a:srgbClr val="0052CC"/>
+                </a:solidFill>
+                <a:effectLst/>
+                <a:latin typeface="-apple-system"/>
+              </a:rPr>
+              <a:t>.</a:t>
+            </a:r>
+            <a:endParaRPr lang="en-GB" sz="1600" b="0" i="0" dirty="0">
+              <a:solidFill>
+                <a:srgbClr val="172B4D"/>
+              </a:solidFill>
+              <a:effectLst/>
+              <a:latin typeface="-apple-system"/>
+            </a:endParaRPr>
+          </a:p>
+          <a:p>
+            <a:pPr algn="l"/>
+            <a:r>
+              <a:rPr lang="en-GB" sz="1600" b="0" i="0" dirty="0">
+                <a:solidFill>
+                  <a:srgbClr val="172B4D"/>
+                </a:solidFill>
+                <a:effectLst/>
+                <a:latin typeface="-apple-system"/>
+              </a:rPr>
+              <a:t>VM: </a:t>
+            </a:r>
+            <a:r>
+              <a:rPr lang="en-GB" sz="1600" b="0" i="0" u="none" strike="noStrike" dirty="0">
+                <a:solidFill>
+                  <a:srgbClr val="0052CC"/>
+                </a:solidFill>
+                <a:effectLst/>
+                <a:latin typeface="-apple-system"/>
+                <a:hlinkClick r:id="rId7"/>
+              </a:rPr>
+              <a:t>https://www.ed.ac.uk/information-services/computing/computing-infrastructure/virtual-hosting/availability</a:t>
+            </a:r>
+            <a:r>
+              <a:rPr lang="en-GB" sz="1600" b="0" i="0" u="none" strike="noStrike" dirty="0">
+                <a:solidFill>
+                  <a:srgbClr val="0052CC"/>
+                </a:solidFill>
+                <a:effectLst/>
+                <a:latin typeface="-apple-system"/>
+              </a:rPr>
+              <a:t>.</a:t>
+            </a:r>
+            <a:endParaRPr lang="en-GB" sz="1600" b="0" i="0" dirty="0">
+              <a:solidFill>
+                <a:srgbClr val="172B4D"/>
+              </a:solidFill>
+              <a:effectLst/>
+              <a:latin typeface="-apple-system"/>
+            </a:endParaRPr>
+          </a:p>
+        </p:txBody>
+      </p:sp>
     </p:spTree>
     <p:extLst>
       <p:ext uri="{BB962C8B-B14F-4D97-AF65-F5344CB8AC3E}">
-        <p14:creationId xmlns:p14="http://schemas.microsoft.com/office/powerpoint/2010/main" val="1908239480"/>
+        <p14:creationId xmlns:p14="http://schemas.microsoft.com/office/powerpoint/2010/main" val="4122250833"/>
       </p:ext>
     </p:extLst>
   </p:cSld>
@@ -9398,52 +9735,22 @@
           <a:chExt cx="0" cy="0"/>
         </a:xfrm>
       </p:grpSpPr>
-      <p:pic>
-        <p:nvPicPr>
-          <p:cNvPr id="4" name="Picture 3">
-            <a:extLst>
-              <a:ext uri="{FF2B5EF4-FFF2-40B4-BE49-F238E27FC236}">
-                <a16:creationId xmlns:a16="http://schemas.microsoft.com/office/drawing/2014/main" id="{57662C7D-199F-4A2B-A8DD-BFF75BA7C9A1}"/>
-              </a:ext>
-            </a:extLst>
-          </p:cNvPr>
-          <p:cNvPicPr>
-            <a:picLocks noChangeAspect="1"/>
-          </p:cNvPicPr>
+      <p:sp>
+        <p:nvSpPr>
+          <p:cNvPr id="5" name="TextBox 4">
+            <a:extLst>
+              <a:ext uri="{FF2B5EF4-FFF2-40B4-BE49-F238E27FC236}">
+                <a16:creationId xmlns:a16="http://schemas.microsoft.com/office/drawing/2014/main" id="{3A7A1F5C-9C70-4DE3-BA39-7835B2935EB3}"/>
+              </a:ext>
+            </a:extLst>
+          </p:cNvPr>
+          <p:cNvSpPr txBox="1"/>
           <p:nvPr/>
-        </p:nvPicPr>
-        <p:blipFill>
-          <a:blip r:embed="rId2"/>
-          <a:stretch>
-            <a:fillRect/>
-          </a:stretch>
-        </p:blipFill>
+        </p:nvSpPr>
         <p:spPr>
           <a:xfrm>
-            <a:off x="3449943" y="1420622"/>
-            <a:ext cx="5471652" cy="2432356"/>
-          </a:xfrm>
-          <a:prstGeom prst="rect">
-            <a:avLst/>
-          </a:prstGeom>
-        </p:spPr>
-      </p:pic>
-      <p:sp>
-        <p:nvSpPr>
-          <p:cNvPr id="5" name="TextBox 4">
-            <a:extLst>
-              <a:ext uri="{FF2B5EF4-FFF2-40B4-BE49-F238E27FC236}">
-                <a16:creationId xmlns:a16="http://schemas.microsoft.com/office/drawing/2014/main" id="{17119242-ADF9-43B9-9FA6-E1B9ED7EA046}"/>
-              </a:ext>
-            </a:extLst>
-          </p:cNvPr>
-          <p:cNvSpPr txBox="1"/>
-          <p:nvPr/>
-        </p:nvSpPr>
-        <p:spPr>
-          <a:xfrm>
-            <a:off x="8806679" y="2452135"/>
-            <a:ext cx="1585883" cy="369332"/>
+            <a:off x="1363735" y="1129464"/>
+            <a:ext cx="9464530" cy="2677656"/>
           </a:xfrm>
           <a:prstGeom prst="rect">
             <a:avLst/>
@@ -9451,380 +9758,82 @@
           <a:noFill/>
         </p:spPr>
         <p:txBody>
-          <a:bodyPr wrap="none" rtlCol="0">
-            <a:spAutoFit/>
-          </a:bodyPr>
-          <a:lstStyle/>
-          <a:p>
-            <a:r>
-              <a:rPr lang="en-GB" dirty="0"/>
-              <a:t>Lab Notebooks</a:t>
-            </a:r>
-          </a:p>
-        </p:txBody>
-      </p:sp>
-      <p:sp>
-        <p:nvSpPr>
-          <p:cNvPr id="6" name="TextBox 5">
-            <a:extLst>
-              <a:ext uri="{FF2B5EF4-FFF2-40B4-BE49-F238E27FC236}">
-                <a16:creationId xmlns:a16="http://schemas.microsoft.com/office/drawing/2014/main" id="{9E5EF0E2-C2E0-4C70-B7D6-26FE7C79C77D}"/>
-              </a:ext>
-            </a:extLst>
-          </p:cNvPr>
-          <p:cNvSpPr txBox="1"/>
-          <p:nvPr/>
-        </p:nvSpPr>
-        <p:spPr>
-          <a:xfrm>
-            <a:off x="4421309" y="3852978"/>
-            <a:ext cx="3387787" cy="646331"/>
-          </a:xfrm>
-          <a:prstGeom prst="rect">
-            <a:avLst/>
-          </a:prstGeom>
-          <a:noFill/>
-        </p:spPr>
-        <p:txBody>
-          <a:bodyPr wrap="none" rtlCol="0">
-            <a:spAutoFit/>
-          </a:bodyPr>
-          <a:lstStyle/>
-          <a:p>
-            <a:r>
-              <a:rPr lang="en-GB" dirty="0"/>
-              <a:t>UoE </a:t>
-            </a:r>
-            <a:r>
-              <a:rPr lang="en-GB" dirty="0" err="1"/>
-              <a:t>DataVault</a:t>
-            </a:r>
-            <a:r>
-              <a:rPr lang="en-GB" dirty="0"/>
-              <a:t> (long term storage)</a:t>
-            </a:r>
-          </a:p>
-          <a:p>
-            <a:r>
-              <a:rPr lang="en-GB" dirty="0"/>
-              <a:t>UoE </a:t>
-            </a:r>
-            <a:r>
-              <a:rPr lang="en-GB" dirty="0" err="1"/>
-              <a:t>DataStore</a:t>
-            </a:r>
-            <a:r>
-              <a:rPr lang="en-GB" dirty="0"/>
-              <a:t> (active storage)</a:t>
-            </a:r>
-          </a:p>
-        </p:txBody>
-      </p:sp>
-      <p:sp>
-        <p:nvSpPr>
-          <p:cNvPr id="7" name="TextBox 6">
-            <a:extLst>
-              <a:ext uri="{FF2B5EF4-FFF2-40B4-BE49-F238E27FC236}">
-                <a16:creationId xmlns:a16="http://schemas.microsoft.com/office/drawing/2014/main" id="{43BDAD79-BE35-46D8-9D5D-67FC4C00013E}"/>
-              </a:ext>
-            </a:extLst>
-          </p:cNvPr>
-          <p:cNvSpPr txBox="1"/>
-          <p:nvPr/>
-        </p:nvSpPr>
-        <p:spPr>
-          <a:xfrm>
-            <a:off x="1657524" y="2313634"/>
-            <a:ext cx="1960921" cy="646331"/>
-          </a:xfrm>
-          <a:prstGeom prst="rect">
-            <a:avLst/>
-          </a:prstGeom>
-          <a:noFill/>
-        </p:spPr>
-        <p:txBody>
-          <a:bodyPr wrap="none" rtlCol="0">
-            <a:spAutoFit/>
-          </a:bodyPr>
-          <a:lstStyle/>
-          <a:p>
-            <a:r>
-              <a:rPr lang="en-GB" dirty="0"/>
-              <a:t>UoE </a:t>
-            </a:r>
-            <a:r>
-              <a:rPr lang="en-GB" dirty="0" err="1"/>
-              <a:t>DataShare</a:t>
-            </a:r>
-            <a:endParaRPr lang="en-GB" dirty="0"/>
-          </a:p>
-          <a:p>
-            <a:r>
-              <a:rPr lang="en-GB" dirty="0"/>
-              <a:t>Public Repositories</a:t>
-            </a:r>
-          </a:p>
-        </p:txBody>
-      </p:sp>
-      <p:sp>
-        <p:nvSpPr>
-          <p:cNvPr id="8" name="TextBox 7">
-            <a:extLst>
-              <a:ext uri="{FF2B5EF4-FFF2-40B4-BE49-F238E27FC236}">
-                <a16:creationId xmlns:a16="http://schemas.microsoft.com/office/drawing/2014/main" id="{66BE6C16-E6BD-46E3-A3FA-67691C457D23}"/>
-              </a:ext>
-            </a:extLst>
-          </p:cNvPr>
-          <p:cNvSpPr txBox="1"/>
-          <p:nvPr/>
-        </p:nvSpPr>
-        <p:spPr>
-          <a:xfrm>
-            <a:off x="2414305" y="4717107"/>
-            <a:ext cx="7732881" cy="923330"/>
-          </a:xfrm>
-          <a:prstGeom prst="rect">
-            <a:avLst/>
-          </a:prstGeom>
-          <a:noFill/>
-        </p:spPr>
-        <p:txBody>
-          <a:bodyPr wrap="square" numCol="3">
-            <a:spAutoFit/>
-          </a:bodyPr>
-          <a:lstStyle/>
-          <a:p>
-            <a:pPr marL="285750" indent="-285750">
-              <a:buFont typeface="Arial" panose="020B0604020202020204" pitchFamily="34" charset="0"/>
-              <a:buChar char="•"/>
-            </a:pPr>
-            <a:r>
-              <a:rPr lang="en-GB" dirty="0"/>
-              <a:t>UoE Data </a:t>
-            </a:r>
-            <a:r>
-              <a:rPr lang="en-GB" dirty="0" err="1"/>
-              <a:t>SafeHaven</a:t>
-            </a:r>
-            <a:endParaRPr lang="en-GB" dirty="0"/>
-          </a:p>
-          <a:p>
-            <a:pPr marL="285750" indent="-285750">
-              <a:buFont typeface="Arial" panose="020B0604020202020204" pitchFamily="34" charset="0"/>
-              <a:buChar char="•"/>
-            </a:pPr>
-            <a:r>
-              <a:rPr lang="en-GB" dirty="0"/>
-              <a:t>UoE </a:t>
-            </a:r>
-            <a:r>
-              <a:rPr lang="en-GB" dirty="0" err="1"/>
-              <a:t>DataSync</a:t>
-            </a:r>
-            <a:endParaRPr lang="en-GB" dirty="0"/>
-          </a:p>
-          <a:p>
-            <a:pPr marL="285750" indent="-285750">
-              <a:buFont typeface="Arial" panose="020B0604020202020204" pitchFamily="34" charset="0"/>
-              <a:buChar char="•"/>
-            </a:pPr>
-            <a:r>
-              <a:rPr lang="en-GB" dirty="0"/>
-              <a:t>UoE Wiki</a:t>
-            </a:r>
-          </a:p>
-          <a:p>
-            <a:pPr marL="285750" indent="-285750">
-              <a:buFont typeface="Arial" panose="020B0604020202020204" pitchFamily="34" charset="0"/>
-              <a:buChar char="•"/>
-            </a:pPr>
-            <a:r>
-              <a:rPr lang="en-GB" dirty="0"/>
-              <a:t>UoE SharePoint</a:t>
-            </a:r>
-          </a:p>
-          <a:p>
-            <a:pPr marL="285750" indent="-285750">
-              <a:buFont typeface="Arial" panose="020B0604020202020204" pitchFamily="34" charset="0"/>
-              <a:buChar char="•"/>
-            </a:pPr>
-            <a:r>
-              <a:rPr lang="en-GB" dirty="0"/>
-              <a:t>UoE ECDF</a:t>
-            </a:r>
-          </a:p>
-          <a:p>
-            <a:pPr marL="285750" indent="-285750">
-              <a:buFont typeface="Arial" panose="020B0604020202020204" pitchFamily="34" charset="0"/>
-              <a:buChar char="•"/>
-            </a:pPr>
-            <a:r>
-              <a:rPr lang="en-GB" dirty="0"/>
-              <a:t>UoE GitLab</a:t>
-            </a:r>
-          </a:p>
-          <a:p>
-            <a:pPr marL="285750" indent="-285750">
-              <a:buFont typeface="Arial" panose="020B0604020202020204" pitchFamily="34" charset="0"/>
-              <a:buChar char="•"/>
-            </a:pPr>
-            <a:r>
-              <a:rPr lang="en-GB" dirty="0"/>
-              <a:t>UoE Subversion</a:t>
-            </a:r>
-          </a:p>
-          <a:p>
-            <a:pPr marL="285750" indent="-285750">
-              <a:buFont typeface="Arial" panose="020B0604020202020204" pitchFamily="34" charset="0"/>
-              <a:buChar char="•"/>
-            </a:pPr>
-            <a:r>
-              <a:rPr lang="en-GB" dirty="0"/>
-              <a:t>UoE PURE records</a:t>
-            </a:r>
-          </a:p>
-        </p:txBody>
-      </p:sp>
-      <p:sp>
-        <p:nvSpPr>
-          <p:cNvPr id="9" name="TextBox 8">
-            <a:extLst>
-              <a:ext uri="{FF2B5EF4-FFF2-40B4-BE49-F238E27FC236}">
-                <a16:creationId xmlns:a16="http://schemas.microsoft.com/office/drawing/2014/main" id="{0FBDB07D-F1BF-4016-B329-9B2CC297B1CE}"/>
-              </a:ext>
-            </a:extLst>
-          </p:cNvPr>
-          <p:cNvSpPr txBox="1"/>
-          <p:nvPr/>
-        </p:nvSpPr>
-        <p:spPr>
-          <a:xfrm>
-            <a:off x="2168568" y="5664619"/>
-            <a:ext cx="8034402" cy="646331"/>
-          </a:xfrm>
-          <a:prstGeom prst="rect">
-            <a:avLst/>
-          </a:prstGeom>
-          <a:noFill/>
-        </p:spPr>
-        <p:txBody>
           <a:bodyPr wrap="square">
             <a:spAutoFit/>
           </a:bodyPr>
           <a:lstStyle/>
           <a:p>
             <a:r>
-              <a:rPr lang="en-GB" dirty="0">
-                <a:hlinkClick r:id="rId3"/>
-              </a:rPr>
-              <a:t>https://www.wiki.ed.ac.uk/x/2MmBGQ</a:t>
-            </a:r>
-            <a:endParaRPr lang="pl-PL" dirty="0">
-              <a:hlinkClick r:id="rId3"/>
-            </a:endParaRPr>
-          </a:p>
-          <a:p>
-            <a:r>
-              <a:rPr lang="en-GB" dirty="0">
-                <a:hlinkClick r:id="rId3"/>
-              </a:rPr>
-              <a:t>https://www.ed.ac.uk/information-services/research-support/research-data-service</a:t>
-            </a:r>
-            <a:r>
-              <a:rPr lang="en-GB" dirty="0"/>
-              <a:t> </a:t>
-            </a:r>
-          </a:p>
-        </p:txBody>
-      </p:sp>
-      <p:sp>
-        <p:nvSpPr>
-          <p:cNvPr id="10" name="TextBox 9">
-            <a:extLst>
-              <a:ext uri="{FF2B5EF4-FFF2-40B4-BE49-F238E27FC236}">
-                <a16:creationId xmlns:a16="http://schemas.microsoft.com/office/drawing/2014/main" id="{357E7BA8-174D-4235-A9F7-B8A0B32FCAC7}"/>
-              </a:ext>
-            </a:extLst>
-          </p:cNvPr>
-          <p:cNvSpPr txBox="1"/>
-          <p:nvPr/>
-        </p:nvSpPr>
-        <p:spPr>
-          <a:xfrm>
-            <a:off x="0" y="6596390"/>
-            <a:ext cx="6914514" cy="261610"/>
-          </a:xfrm>
-          <a:prstGeom prst="rect">
-            <a:avLst/>
-          </a:prstGeom>
-          <a:noFill/>
-        </p:spPr>
-        <p:txBody>
-          <a:bodyPr wrap="square" rtlCol="0">
-            <a:spAutoFit/>
-          </a:bodyPr>
-          <a:lstStyle/>
-          <a:p>
-            <a:r>
-              <a:rPr lang="en-GB" sz="1100" dirty="0"/>
-              <a:t>Image credit: RDS (UoE)</a:t>
-            </a:r>
-          </a:p>
-        </p:txBody>
-      </p:sp>
-      <p:sp>
-        <p:nvSpPr>
-          <p:cNvPr id="11" name="TextBox 10">
-            <a:extLst>
-              <a:ext uri="{FF2B5EF4-FFF2-40B4-BE49-F238E27FC236}">
-                <a16:creationId xmlns:a16="http://schemas.microsoft.com/office/drawing/2014/main" id="{93D3547E-34D1-413F-A44C-BFD411491CB3}"/>
-              </a:ext>
-            </a:extLst>
-          </p:cNvPr>
-          <p:cNvSpPr txBox="1"/>
-          <p:nvPr/>
-        </p:nvSpPr>
-        <p:spPr>
-          <a:xfrm>
-            <a:off x="515880" y="488425"/>
-            <a:ext cx="9464530" cy="1200329"/>
-          </a:xfrm>
-          <a:prstGeom prst="rect">
-            <a:avLst/>
-          </a:prstGeom>
-          <a:noFill/>
-        </p:spPr>
-        <p:txBody>
-          <a:bodyPr wrap="square">
-            <a:spAutoFit/>
-          </a:bodyPr>
-          <a:lstStyle/>
-          <a:p>
-            <a:r>
-              <a:rPr lang="en-GB" sz="3600" dirty="0">
+              <a:rPr lang="en-GB" sz="2800" dirty="0">
                 <a:solidFill>
                   <a:srgbClr val="0070C0"/>
                 </a:solidFill>
               </a:rPr>
-              <a:t>How do we manage our data at Edinburgh?</a:t>
+              <a:t>Exercise/challenge 2: </a:t>
             </a:r>
           </a:p>
           <a:p>
             <a:pPr algn="ctr"/>
-            <a:endParaRPr lang="en-GB" sz="3600" dirty="0">
+            <a:endParaRPr lang="en-GB" sz="2800" dirty="0">
               <a:solidFill>
                 <a:srgbClr val="0070C0"/>
               </a:solidFill>
             </a:endParaRPr>
           </a:p>
+          <a:p>
+            <a:pPr algn="ctr"/>
+            <a:r>
+              <a:rPr lang="en-GB" sz="2800" dirty="0">
+                <a:solidFill>
+                  <a:srgbClr val="0070C0"/>
+                </a:solidFill>
+              </a:rPr>
+              <a:t>Working in pairs, think of your last paper (or project). Write a short DMP for this </a:t>
+            </a:r>
+            <a:r>
+              <a:rPr lang="en-GB" sz="2800" b="1" dirty="0">
+                <a:solidFill>
+                  <a:srgbClr val="0070C0"/>
+                </a:solidFill>
+              </a:rPr>
+              <a:t>joined project</a:t>
+            </a:r>
+            <a:r>
+              <a:rPr lang="en-GB" sz="2800" dirty="0">
+                <a:solidFill>
+                  <a:srgbClr val="0070C0"/>
+                </a:solidFill>
+              </a:rPr>
+              <a:t>.</a:t>
+            </a:r>
+          </a:p>
+          <a:p>
+            <a:pPr algn="ctr"/>
+            <a:endParaRPr lang="en-GB" sz="2800" dirty="0">
+              <a:solidFill>
+                <a:srgbClr val="0070C0"/>
+              </a:solidFill>
+            </a:endParaRPr>
+          </a:p>
+          <a:p>
+            <a:pPr algn="ctr"/>
+            <a:r>
+              <a:rPr lang="en-GB" sz="2800" dirty="0">
+                <a:solidFill>
+                  <a:srgbClr val="0070C0"/>
+                </a:solidFill>
+              </a:rPr>
+              <a:t>Starts in this session &amp; continues as homework.</a:t>
+            </a:r>
+          </a:p>
         </p:txBody>
       </p:sp>
       <p:pic>
         <p:nvPicPr>
-          <p:cNvPr id="12" name="Picture 2" descr="Ed_DaSH">
-            <a:extLst>
-              <a:ext uri="{FF2B5EF4-FFF2-40B4-BE49-F238E27FC236}">
-                <a16:creationId xmlns:a16="http://schemas.microsoft.com/office/drawing/2014/main" id="{7A149EBA-17D1-4724-ADA1-0DEBE3AF8E02}"/>
+          <p:cNvPr id="4" name="Picture 2" descr="Ed_DaSH">
+            <a:extLst>
+              <a:ext uri="{FF2B5EF4-FFF2-40B4-BE49-F238E27FC236}">
+                <a16:creationId xmlns:a16="http://schemas.microsoft.com/office/drawing/2014/main" id="{A783256F-E39E-4712-96B0-240BD611CFEB}"/>
               </a:ext>
             </a:extLst>
           </p:cNvPr>
@@ -9834,7 +9843,7 @@
           <p:nvPr/>
         </p:nvPicPr>
         <p:blipFill>
-          <a:blip r:embed="rId4">
+          <a:blip r:embed="rId2">
             <a:extLst>
               <a:ext uri="{28A0092B-C50C-407E-A947-70E740481C1C}">
                 <a14:useLocalDpi xmlns:a14="http://schemas.microsoft.com/office/drawing/2010/main" val="0"/>
@@ -9869,7 +9878,7 @@
     </p:spTree>
     <p:extLst>
       <p:ext uri="{BB962C8B-B14F-4D97-AF65-F5344CB8AC3E}">
-        <p14:creationId xmlns:p14="http://schemas.microsoft.com/office/powerpoint/2010/main" val="2539673267"/>
+        <p14:creationId xmlns:p14="http://schemas.microsoft.com/office/powerpoint/2010/main" val="1908239480"/>
       </p:ext>
     </p:extLst>
   </p:cSld>
@@ -9898,10 +9907,431 @@
       </p:grpSpPr>
       <p:pic>
         <p:nvPicPr>
-          <p:cNvPr id="4" name="Picture 2" descr="Ed_DaSH">
-            <a:extLst>
-              <a:ext uri="{FF2B5EF4-FFF2-40B4-BE49-F238E27FC236}">
-                <a16:creationId xmlns:a16="http://schemas.microsoft.com/office/drawing/2014/main" id="{268E435B-ABCF-4E47-99FC-7B83F9E83698}"/>
+          <p:cNvPr id="4" name="Picture 3">
+            <a:extLst>
+              <a:ext uri="{FF2B5EF4-FFF2-40B4-BE49-F238E27FC236}">
+                <a16:creationId xmlns:a16="http://schemas.microsoft.com/office/drawing/2014/main" id="{57662C7D-199F-4A2B-A8DD-BFF75BA7C9A1}"/>
+              </a:ext>
+            </a:extLst>
+          </p:cNvPr>
+          <p:cNvPicPr>
+            <a:picLocks noChangeAspect="1"/>
+          </p:cNvPicPr>
+          <p:nvPr/>
+        </p:nvPicPr>
+        <p:blipFill>
+          <a:blip r:embed="rId2"/>
+          <a:stretch>
+            <a:fillRect/>
+          </a:stretch>
+        </p:blipFill>
+        <p:spPr>
+          <a:xfrm>
+            <a:off x="3449943" y="1420622"/>
+            <a:ext cx="5471652" cy="2432356"/>
+          </a:xfrm>
+          <a:prstGeom prst="rect">
+            <a:avLst/>
+          </a:prstGeom>
+        </p:spPr>
+      </p:pic>
+      <p:sp>
+        <p:nvSpPr>
+          <p:cNvPr id="5" name="TextBox 4">
+            <a:extLst>
+              <a:ext uri="{FF2B5EF4-FFF2-40B4-BE49-F238E27FC236}">
+                <a16:creationId xmlns:a16="http://schemas.microsoft.com/office/drawing/2014/main" id="{17119242-ADF9-43B9-9FA6-E1B9ED7EA046}"/>
+              </a:ext>
+            </a:extLst>
+          </p:cNvPr>
+          <p:cNvSpPr txBox="1"/>
+          <p:nvPr/>
+        </p:nvSpPr>
+        <p:spPr>
+          <a:xfrm>
+            <a:off x="8806679" y="2452135"/>
+            <a:ext cx="1585883" cy="369332"/>
+          </a:xfrm>
+          <a:prstGeom prst="rect">
+            <a:avLst/>
+          </a:prstGeom>
+          <a:noFill/>
+        </p:spPr>
+        <p:txBody>
+          <a:bodyPr wrap="none" rtlCol="0">
+            <a:spAutoFit/>
+          </a:bodyPr>
+          <a:lstStyle/>
+          <a:p>
+            <a:r>
+              <a:rPr lang="en-GB" dirty="0"/>
+              <a:t>Lab Notebooks</a:t>
+            </a:r>
+          </a:p>
+        </p:txBody>
+      </p:sp>
+      <p:sp>
+        <p:nvSpPr>
+          <p:cNvPr id="6" name="TextBox 5">
+            <a:extLst>
+              <a:ext uri="{FF2B5EF4-FFF2-40B4-BE49-F238E27FC236}">
+                <a16:creationId xmlns:a16="http://schemas.microsoft.com/office/drawing/2014/main" id="{9E5EF0E2-C2E0-4C70-B7D6-26FE7C79C77D}"/>
+              </a:ext>
+            </a:extLst>
+          </p:cNvPr>
+          <p:cNvSpPr txBox="1"/>
+          <p:nvPr/>
+        </p:nvSpPr>
+        <p:spPr>
+          <a:xfrm>
+            <a:off x="4421309" y="3852978"/>
+            <a:ext cx="3387787" cy="646331"/>
+          </a:xfrm>
+          <a:prstGeom prst="rect">
+            <a:avLst/>
+          </a:prstGeom>
+          <a:noFill/>
+        </p:spPr>
+        <p:txBody>
+          <a:bodyPr wrap="none" rtlCol="0">
+            <a:spAutoFit/>
+          </a:bodyPr>
+          <a:lstStyle/>
+          <a:p>
+            <a:r>
+              <a:rPr lang="en-GB" dirty="0"/>
+              <a:t>UoE </a:t>
+            </a:r>
+            <a:r>
+              <a:rPr lang="en-GB" dirty="0" err="1"/>
+              <a:t>DataVault</a:t>
+            </a:r>
+            <a:r>
+              <a:rPr lang="en-GB" dirty="0"/>
+              <a:t> (long term storage)</a:t>
+            </a:r>
+          </a:p>
+          <a:p>
+            <a:r>
+              <a:rPr lang="en-GB" dirty="0"/>
+              <a:t>UoE </a:t>
+            </a:r>
+            <a:r>
+              <a:rPr lang="en-GB" dirty="0" err="1"/>
+              <a:t>DataStore</a:t>
+            </a:r>
+            <a:r>
+              <a:rPr lang="en-GB" dirty="0"/>
+              <a:t> (active storage)</a:t>
+            </a:r>
+          </a:p>
+        </p:txBody>
+      </p:sp>
+      <p:sp>
+        <p:nvSpPr>
+          <p:cNvPr id="7" name="TextBox 6">
+            <a:extLst>
+              <a:ext uri="{FF2B5EF4-FFF2-40B4-BE49-F238E27FC236}">
+                <a16:creationId xmlns:a16="http://schemas.microsoft.com/office/drawing/2014/main" id="{43BDAD79-BE35-46D8-9D5D-67FC4C00013E}"/>
+              </a:ext>
+            </a:extLst>
+          </p:cNvPr>
+          <p:cNvSpPr txBox="1"/>
+          <p:nvPr/>
+        </p:nvSpPr>
+        <p:spPr>
+          <a:xfrm>
+            <a:off x="1657524" y="2313634"/>
+            <a:ext cx="1960921" cy="646331"/>
+          </a:xfrm>
+          <a:prstGeom prst="rect">
+            <a:avLst/>
+          </a:prstGeom>
+          <a:noFill/>
+        </p:spPr>
+        <p:txBody>
+          <a:bodyPr wrap="none" rtlCol="0">
+            <a:spAutoFit/>
+          </a:bodyPr>
+          <a:lstStyle/>
+          <a:p>
+            <a:r>
+              <a:rPr lang="en-GB" dirty="0"/>
+              <a:t>UoE </a:t>
+            </a:r>
+            <a:r>
+              <a:rPr lang="en-GB" dirty="0" err="1"/>
+              <a:t>DataShare</a:t>
+            </a:r>
+            <a:endParaRPr lang="en-GB" dirty="0"/>
+          </a:p>
+          <a:p>
+            <a:r>
+              <a:rPr lang="en-GB" dirty="0"/>
+              <a:t>Public Repositories</a:t>
+            </a:r>
+          </a:p>
+        </p:txBody>
+      </p:sp>
+      <p:sp>
+        <p:nvSpPr>
+          <p:cNvPr id="8" name="TextBox 7">
+            <a:extLst>
+              <a:ext uri="{FF2B5EF4-FFF2-40B4-BE49-F238E27FC236}">
+                <a16:creationId xmlns:a16="http://schemas.microsoft.com/office/drawing/2014/main" id="{66BE6C16-E6BD-46E3-A3FA-67691C457D23}"/>
+              </a:ext>
+            </a:extLst>
+          </p:cNvPr>
+          <p:cNvSpPr txBox="1"/>
+          <p:nvPr/>
+        </p:nvSpPr>
+        <p:spPr>
+          <a:xfrm>
+            <a:off x="2414305" y="4717107"/>
+            <a:ext cx="7732881" cy="923330"/>
+          </a:xfrm>
+          <a:prstGeom prst="rect">
+            <a:avLst/>
+          </a:prstGeom>
+          <a:noFill/>
+        </p:spPr>
+        <p:txBody>
+          <a:bodyPr wrap="square" numCol="3">
+            <a:spAutoFit/>
+          </a:bodyPr>
+          <a:lstStyle/>
+          <a:p>
+            <a:pPr marL="285750" indent="-285750">
+              <a:buFont typeface="Arial" panose="020B0604020202020204" pitchFamily="34" charset="0"/>
+              <a:buChar char="•"/>
+            </a:pPr>
+            <a:r>
+              <a:rPr lang="en-GB" dirty="0"/>
+              <a:t>UoE Data </a:t>
+            </a:r>
+            <a:r>
+              <a:rPr lang="en-GB" dirty="0" err="1"/>
+              <a:t>SafeHaven</a:t>
+            </a:r>
+            <a:endParaRPr lang="en-GB" dirty="0"/>
+          </a:p>
+          <a:p>
+            <a:pPr marL="285750" indent="-285750">
+              <a:buFont typeface="Arial" panose="020B0604020202020204" pitchFamily="34" charset="0"/>
+              <a:buChar char="•"/>
+            </a:pPr>
+            <a:r>
+              <a:rPr lang="en-GB" dirty="0"/>
+              <a:t>UoE </a:t>
+            </a:r>
+            <a:r>
+              <a:rPr lang="en-GB" dirty="0" err="1"/>
+              <a:t>DataSync</a:t>
+            </a:r>
+            <a:endParaRPr lang="en-GB" dirty="0"/>
+          </a:p>
+          <a:p>
+            <a:pPr marL="285750" indent="-285750">
+              <a:buFont typeface="Arial" panose="020B0604020202020204" pitchFamily="34" charset="0"/>
+              <a:buChar char="•"/>
+            </a:pPr>
+            <a:r>
+              <a:rPr lang="en-GB" dirty="0"/>
+              <a:t>UoE Wiki</a:t>
+            </a:r>
+          </a:p>
+          <a:p>
+            <a:pPr marL="285750" indent="-285750">
+              <a:buFont typeface="Arial" panose="020B0604020202020204" pitchFamily="34" charset="0"/>
+              <a:buChar char="•"/>
+            </a:pPr>
+            <a:r>
+              <a:rPr lang="en-GB" dirty="0"/>
+              <a:t>UoE SharePoint</a:t>
+            </a:r>
+          </a:p>
+          <a:p>
+            <a:pPr marL="285750" indent="-285750">
+              <a:buFont typeface="Arial" panose="020B0604020202020204" pitchFamily="34" charset="0"/>
+              <a:buChar char="•"/>
+            </a:pPr>
+            <a:r>
+              <a:rPr lang="en-GB" dirty="0"/>
+              <a:t>UoE ECDF</a:t>
+            </a:r>
+          </a:p>
+          <a:p>
+            <a:pPr marL="285750" indent="-285750">
+              <a:buFont typeface="Arial" panose="020B0604020202020204" pitchFamily="34" charset="0"/>
+              <a:buChar char="•"/>
+            </a:pPr>
+            <a:r>
+              <a:rPr lang="en-GB" dirty="0"/>
+              <a:t>UoE GitLab</a:t>
+            </a:r>
+          </a:p>
+          <a:p>
+            <a:pPr marL="285750" indent="-285750">
+              <a:buFont typeface="Arial" panose="020B0604020202020204" pitchFamily="34" charset="0"/>
+              <a:buChar char="•"/>
+            </a:pPr>
+            <a:r>
+              <a:rPr lang="en-GB" dirty="0"/>
+              <a:t>UoE Subversion</a:t>
+            </a:r>
+          </a:p>
+          <a:p>
+            <a:pPr marL="285750" indent="-285750">
+              <a:buFont typeface="Arial" panose="020B0604020202020204" pitchFamily="34" charset="0"/>
+              <a:buChar char="•"/>
+            </a:pPr>
+            <a:r>
+              <a:rPr lang="en-GB" dirty="0"/>
+              <a:t>UoE PURE records</a:t>
+            </a:r>
+          </a:p>
+        </p:txBody>
+      </p:sp>
+      <p:sp>
+        <p:nvSpPr>
+          <p:cNvPr id="9" name="TextBox 8">
+            <a:extLst>
+              <a:ext uri="{FF2B5EF4-FFF2-40B4-BE49-F238E27FC236}">
+                <a16:creationId xmlns:a16="http://schemas.microsoft.com/office/drawing/2014/main" id="{0FBDB07D-F1BF-4016-B329-9B2CC297B1CE}"/>
+              </a:ext>
+            </a:extLst>
+          </p:cNvPr>
+          <p:cNvSpPr txBox="1"/>
+          <p:nvPr/>
+        </p:nvSpPr>
+        <p:spPr>
+          <a:xfrm>
+            <a:off x="2168568" y="5664619"/>
+            <a:ext cx="8034402" cy="646331"/>
+          </a:xfrm>
+          <a:prstGeom prst="rect">
+            <a:avLst/>
+          </a:prstGeom>
+          <a:noFill/>
+        </p:spPr>
+        <p:txBody>
+          <a:bodyPr wrap="square">
+            <a:spAutoFit/>
+          </a:bodyPr>
+          <a:lstStyle/>
+          <a:p>
+            <a:r>
+              <a:rPr lang="en-GB" dirty="0">
+                <a:hlinkClick r:id="rId3"/>
+              </a:rPr>
+              <a:t>https://www.wiki.ed.ac.uk/x/2MmBGQ</a:t>
+            </a:r>
+            <a:endParaRPr lang="pl-PL" dirty="0">
+              <a:hlinkClick r:id="rId3"/>
+            </a:endParaRPr>
+          </a:p>
+          <a:p>
+            <a:r>
+              <a:rPr lang="en-GB" dirty="0">
+                <a:hlinkClick r:id="rId3"/>
+              </a:rPr>
+              <a:t>https://www.ed.ac.uk/information-services/research-support/research-data-service</a:t>
+            </a:r>
+            <a:r>
+              <a:rPr lang="en-GB" dirty="0"/>
+              <a:t> </a:t>
+            </a:r>
+          </a:p>
+        </p:txBody>
+      </p:sp>
+      <p:sp>
+        <p:nvSpPr>
+          <p:cNvPr id="10" name="TextBox 9">
+            <a:extLst>
+              <a:ext uri="{FF2B5EF4-FFF2-40B4-BE49-F238E27FC236}">
+                <a16:creationId xmlns:a16="http://schemas.microsoft.com/office/drawing/2014/main" id="{357E7BA8-174D-4235-A9F7-B8A0B32FCAC7}"/>
+              </a:ext>
+            </a:extLst>
+          </p:cNvPr>
+          <p:cNvSpPr txBox="1"/>
+          <p:nvPr/>
+        </p:nvSpPr>
+        <p:spPr>
+          <a:xfrm>
+            <a:off x="0" y="6596390"/>
+            <a:ext cx="6914514" cy="261610"/>
+          </a:xfrm>
+          <a:prstGeom prst="rect">
+            <a:avLst/>
+          </a:prstGeom>
+          <a:noFill/>
+        </p:spPr>
+        <p:txBody>
+          <a:bodyPr wrap="square" rtlCol="0">
+            <a:spAutoFit/>
+          </a:bodyPr>
+          <a:lstStyle/>
+          <a:p>
+            <a:r>
+              <a:rPr lang="en-GB" sz="1100" dirty="0"/>
+              <a:t>Image credit: RDS (UoE)</a:t>
+            </a:r>
+          </a:p>
+        </p:txBody>
+      </p:sp>
+      <p:sp>
+        <p:nvSpPr>
+          <p:cNvPr id="11" name="TextBox 10">
+            <a:extLst>
+              <a:ext uri="{FF2B5EF4-FFF2-40B4-BE49-F238E27FC236}">
+                <a16:creationId xmlns:a16="http://schemas.microsoft.com/office/drawing/2014/main" id="{93D3547E-34D1-413F-A44C-BFD411491CB3}"/>
+              </a:ext>
+            </a:extLst>
+          </p:cNvPr>
+          <p:cNvSpPr txBox="1"/>
+          <p:nvPr/>
+        </p:nvSpPr>
+        <p:spPr>
+          <a:xfrm>
+            <a:off x="515880" y="488425"/>
+            <a:ext cx="9464530" cy="1200329"/>
+          </a:xfrm>
+          <a:prstGeom prst="rect">
+            <a:avLst/>
+          </a:prstGeom>
+          <a:noFill/>
+        </p:spPr>
+        <p:txBody>
+          <a:bodyPr wrap="square">
+            <a:spAutoFit/>
+          </a:bodyPr>
+          <a:lstStyle/>
+          <a:p>
+            <a:r>
+              <a:rPr lang="en-GB" sz="3600" dirty="0">
+                <a:solidFill>
+                  <a:srgbClr val="0070C0"/>
+                </a:solidFill>
+              </a:rPr>
+              <a:t>How do we manage our data at Edinburgh?</a:t>
+            </a:r>
+          </a:p>
+          <a:p>
+            <a:pPr algn="ctr"/>
+            <a:endParaRPr lang="en-GB" sz="3600" dirty="0">
+              <a:solidFill>
+                <a:srgbClr val="0070C0"/>
+              </a:solidFill>
+            </a:endParaRPr>
+          </a:p>
+        </p:txBody>
+      </p:sp>
+      <p:pic>
+        <p:nvPicPr>
+          <p:cNvPr id="12" name="Picture 2" descr="Ed_DaSH">
+            <a:extLst>
+              <a:ext uri="{FF2B5EF4-FFF2-40B4-BE49-F238E27FC236}">
+                <a16:creationId xmlns:a16="http://schemas.microsoft.com/office/drawing/2014/main" id="{7A149EBA-17D1-4724-ADA1-0DEBE3AF8E02}"/>
               </a:ext>
             </a:extLst>
           </p:cNvPr>
@@ -9911,7 +10341,7 @@
           <p:nvPr/>
         </p:nvPicPr>
         <p:blipFill>
-          <a:blip r:embed="rId2">
+          <a:blip r:embed="rId4">
             <a:extLst>
               <a:ext uri="{28A0092B-C50C-407E-A947-70E740481C1C}">
                 <a14:useLocalDpi xmlns:a14="http://schemas.microsoft.com/office/drawing/2010/main" val="0"/>
@@ -9943,440 +10373,10 @@
           </a:extLst>
         </p:spPr>
       </p:pic>
-      <p:sp>
-        <p:nvSpPr>
-          <p:cNvPr id="5" name="TextBox 4">
-            <a:extLst>
-              <a:ext uri="{FF2B5EF4-FFF2-40B4-BE49-F238E27FC236}">
-                <a16:creationId xmlns:a16="http://schemas.microsoft.com/office/drawing/2014/main" id="{DEF75148-C2ED-43D3-9AFC-0148A8784CF8}"/>
-              </a:ext>
-            </a:extLst>
-          </p:cNvPr>
-          <p:cNvSpPr txBox="1"/>
-          <p:nvPr/>
-        </p:nvSpPr>
-        <p:spPr>
-          <a:xfrm>
-            <a:off x="1956883" y="1152070"/>
-            <a:ext cx="8053760" cy="2126864"/>
-          </a:xfrm>
-          <a:prstGeom prst="rect">
-            <a:avLst/>
-          </a:prstGeom>
-          <a:noFill/>
-        </p:spPr>
-        <p:txBody>
-          <a:bodyPr wrap="square" rtlCol="0">
-            <a:spAutoFit/>
-          </a:bodyPr>
-          <a:lstStyle/>
-          <a:p>
-            <a:pPr marL="285750" indent="-285750">
-              <a:lnSpc>
-                <a:spcPct val="150000"/>
-              </a:lnSpc>
-              <a:buFont typeface="Arial" panose="020B0604020202020204" pitchFamily="34" charset="0"/>
-              <a:buChar char="•"/>
-            </a:pPr>
-            <a:r>
-              <a:rPr lang="en-GB" dirty="0"/>
-              <a:t>It is an active storage solution, which is backed up off site (3 secure locations).</a:t>
-            </a:r>
-          </a:p>
-          <a:p>
-            <a:pPr marL="285750" indent="-285750">
-              <a:lnSpc>
-                <a:spcPct val="150000"/>
-              </a:lnSpc>
-              <a:buFont typeface="Arial" panose="020B0604020202020204" pitchFamily="34" charset="0"/>
-              <a:buChar char="•"/>
-            </a:pPr>
-            <a:r>
-              <a:rPr lang="en-GB" dirty="0"/>
-              <a:t>500 Gb per PhD student of free storage (there is a fee for more space).</a:t>
-            </a:r>
-          </a:p>
-          <a:p>
-            <a:pPr marL="285750" indent="-285750">
-              <a:lnSpc>
-                <a:spcPct val="150000"/>
-              </a:lnSpc>
-              <a:buFont typeface="Arial" panose="020B0604020202020204" pitchFamily="34" charset="0"/>
-              <a:buChar char="•"/>
-            </a:pPr>
-            <a:r>
-              <a:rPr lang="en-GB" dirty="0"/>
-              <a:t>Data can be shared with all lab members or with someone specific within the UoE community.</a:t>
-            </a:r>
-          </a:p>
-          <a:p>
-            <a:pPr marL="285750" indent="-285750">
-              <a:lnSpc>
-                <a:spcPct val="150000"/>
-              </a:lnSpc>
-              <a:buFont typeface="Arial" panose="020B0604020202020204" pitchFamily="34" charset="0"/>
-              <a:buChar char="•"/>
-            </a:pPr>
-            <a:r>
-              <a:rPr lang="en-GB" dirty="0"/>
-              <a:t>Closed when you leave University (there is a small grace period before deletion).</a:t>
-            </a:r>
-          </a:p>
-        </p:txBody>
-      </p:sp>
-      <p:sp>
-        <p:nvSpPr>
-          <p:cNvPr id="6" name="TextBox 5">
-            <a:extLst>
-              <a:ext uri="{FF2B5EF4-FFF2-40B4-BE49-F238E27FC236}">
-                <a16:creationId xmlns:a16="http://schemas.microsoft.com/office/drawing/2014/main" id="{1ACFE7B6-EEC6-491B-8FDB-BDDEC13AB997}"/>
-              </a:ext>
-            </a:extLst>
-          </p:cNvPr>
-          <p:cNvSpPr txBox="1"/>
-          <p:nvPr/>
-        </p:nvSpPr>
-        <p:spPr>
-          <a:xfrm>
-            <a:off x="1125416" y="4361301"/>
-            <a:ext cx="9941168" cy="646331"/>
-          </a:xfrm>
-          <a:prstGeom prst="rect">
-            <a:avLst/>
-          </a:prstGeom>
-          <a:noFill/>
-        </p:spPr>
-        <p:txBody>
-          <a:bodyPr wrap="square">
-            <a:spAutoFit/>
-          </a:bodyPr>
-          <a:lstStyle/>
-          <a:p>
-            <a:r>
-              <a:rPr lang="en-GB" dirty="0">
-                <a:hlinkClick r:id="rId3"/>
-              </a:rPr>
-              <a:t>https://www.ed.ac.uk/information-services/research-support/research-data-service/during/data-storage</a:t>
-            </a:r>
-            <a:endParaRPr lang="en-GB" dirty="0"/>
-          </a:p>
-          <a:p>
-            <a:r>
-              <a:rPr lang="en-GB" dirty="0">
-                <a:hlinkClick r:id="rId4"/>
-              </a:rPr>
-              <a:t>https://www.wiki.ed.ac.uk/x/tet_H</a:t>
-            </a:r>
-            <a:r>
-              <a:rPr lang="en-GB" dirty="0"/>
-              <a:t>  </a:t>
-            </a:r>
-          </a:p>
-        </p:txBody>
-      </p:sp>
-      <p:sp>
-        <p:nvSpPr>
-          <p:cNvPr id="7" name="Arrow: Down 6">
-            <a:extLst>
-              <a:ext uri="{FF2B5EF4-FFF2-40B4-BE49-F238E27FC236}">
-                <a16:creationId xmlns:a16="http://schemas.microsoft.com/office/drawing/2014/main" id="{7FC09654-64CA-4B4E-83DC-39E2EBA03F2A}"/>
-              </a:ext>
-            </a:extLst>
-          </p:cNvPr>
-          <p:cNvSpPr/>
-          <p:nvPr/>
-        </p:nvSpPr>
-        <p:spPr>
-          <a:xfrm>
-            <a:off x="5705033" y="3429000"/>
-            <a:ext cx="781934" cy="806248"/>
-          </a:xfrm>
-          <a:prstGeom prst="downArrow">
-            <a:avLst/>
-          </a:prstGeom>
-        </p:spPr>
-        <p:style>
-          <a:lnRef idx="2">
-            <a:schemeClr val="accent1">
-              <a:shade val="50000"/>
-            </a:schemeClr>
-          </a:lnRef>
-          <a:fillRef idx="1">
-            <a:schemeClr val="accent1"/>
-          </a:fillRef>
-          <a:effectRef idx="0">
-            <a:schemeClr val="accent1"/>
-          </a:effectRef>
-          <a:fontRef idx="minor">
-            <a:schemeClr val="lt1"/>
-          </a:fontRef>
-        </p:style>
-        <p:txBody>
-          <a:bodyPr rtlCol="0" anchor="ctr"/>
-          <a:lstStyle/>
-          <a:p>
-            <a:pPr algn="ctr"/>
-            <a:endParaRPr lang="en-GB"/>
-          </a:p>
-        </p:txBody>
-      </p:sp>
-      <p:sp>
-        <p:nvSpPr>
-          <p:cNvPr id="8" name="TextBox 7">
-            <a:extLst>
-              <a:ext uri="{FF2B5EF4-FFF2-40B4-BE49-F238E27FC236}">
-                <a16:creationId xmlns:a16="http://schemas.microsoft.com/office/drawing/2014/main" id="{0C50DA4B-3502-4997-9D40-09033F3CCC73}"/>
-              </a:ext>
-            </a:extLst>
-          </p:cNvPr>
-          <p:cNvSpPr txBox="1"/>
-          <p:nvPr/>
-        </p:nvSpPr>
-        <p:spPr>
-          <a:xfrm>
-            <a:off x="6620674" y="3595175"/>
-            <a:ext cx="4199996" cy="369332"/>
-          </a:xfrm>
-          <a:prstGeom prst="rect">
-            <a:avLst/>
-          </a:prstGeom>
-          <a:noFill/>
-        </p:spPr>
-        <p:txBody>
-          <a:bodyPr wrap="none" rtlCol="0">
-            <a:spAutoFit/>
-          </a:bodyPr>
-          <a:lstStyle/>
-          <a:p>
-            <a:r>
-              <a:rPr lang="en-GB" dirty="0"/>
-              <a:t>For more information, visit the link</a:t>
-            </a:r>
-            <a:r>
-              <a:rPr lang="pl-PL" dirty="0"/>
-              <a:t>s</a:t>
-            </a:r>
-            <a:r>
-              <a:rPr lang="en-GB" dirty="0"/>
-              <a:t> below.</a:t>
-            </a:r>
-          </a:p>
-        </p:txBody>
-      </p:sp>
-      <p:sp>
-        <p:nvSpPr>
-          <p:cNvPr id="9" name="TextBox 8">
-            <a:extLst>
-              <a:ext uri="{FF2B5EF4-FFF2-40B4-BE49-F238E27FC236}">
-                <a16:creationId xmlns:a16="http://schemas.microsoft.com/office/drawing/2014/main" id="{573716CB-7B45-42F4-BF46-7C09BBFD4156}"/>
-              </a:ext>
-            </a:extLst>
-          </p:cNvPr>
-          <p:cNvSpPr txBox="1"/>
-          <p:nvPr/>
-        </p:nvSpPr>
-        <p:spPr>
-          <a:xfrm>
-            <a:off x="2277762" y="5531795"/>
-            <a:ext cx="7732881" cy="923330"/>
-          </a:xfrm>
-          <a:prstGeom prst="rect">
-            <a:avLst/>
-          </a:prstGeom>
-          <a:noFill/>
-        </p:spPr>
-        <p:txBody>
-          <a:bodyPr wrap="square" numCol="3">
-            <a:spAutoFit/>
-          </a:bodyPr>
-          <a:lstStyle/>
-          <a:p>
-            <a:pPr marL="285750" indent="-285750">
-              <a:buFont typeface="Arial" panose="020B0604020202020204" pitchFamily="34" charset="0"/>
-              <a:buChar char="•"/>
-            </a:pPr>
-            <a:r>
-              <a:rPr lang="en-GB" dirty="0"/>
-              <a:t>ELNs</a:t>
-            </a:r>
-          </a:p>
-          <a:p>
-            <a:pPr marL="285750" indent="-285750">
-              <a:buFont typeface="Arial" panose="020B0604020202020204" pitchFamily="34" charset="0"/>
-              <a:buChar char="•"/>
-            </a:pPr>
-            <a:r>
-              <a:rPr lang="en-GB" dirty="0"/>
-              <a:t>UoE Data </a:t>
-            </a:r>
-            <a:r>
-              <a:rPr lang="en-GB" dirty="0" err="1"/>
-              <a:t>SafeHaven</a:t>
-            </a:r>
-            <a:endParaRPr lang="en-GB" dirty="0"/>
-          </a:p>
-          <a:p>
-            <a:pPr marL="285750" indent="-285750">
-              <a:buFont typeface="Arial" panose="020B0604020202020204" pitchFamily="34" charset="0"/>
-              <a:buChar char="•"/>
-            </a:pPr>
-            <a:r>
-              <a:rPr lang="en-GB" dirty="0"/>
-              <a:t>UoE </a:t>
-            </a:r>
-            <a:r>
-              <a:rPr lang="en-GB" dirty="0" err="1"/>
-              <a:t>DataSync</a:t>
-            </a:r>
-            <a:endParaRPr lang="en-GB" dirty="0"/>
-          </a:p>
-          <a:p>
-            <a:pPr marL="285750" indent="-285750">
-              <a:buFont typeface="Arial" panose="020B0604020202020204" pitchFamily="34" charset="0"/>
-              <a:buChar char="•"/>
-            </a:pPr>
-            <a:r>
-              <a:rPr lang="en-GB" dirty="0"/>
-              <a:t>UoE Wiki</a:t>
-            </a:r>
-          </a:p>
-          <a:p>
-            <a:pPr marL="285750" indent="-285750">
-              <a:buFont typeface="Arial" panose="020B0604020202020204" pitchFamily="34" charset="0"/>
-              <a:buChar char="•"/>
-            </a:pPr>
-            <a:r>
-              <a:rPr lang="en-GB" dirty="0"/>
-              <a:t>UoE SharePoint</a:t>
-            </a:r>
-          </a:p>
-          <a:p>
-            <a:pPr marL="285750" indent="-285750">
-              <a:buFont typeface="Arial" panose="020B0604020202020204" pitchFamily="34" charset="0"/>
-              <a:buChar char="•"/>
-            </a:pPr>
-            <a:r>
-              <a:rPr lang="en-GB" dirty="0"/>
-              <a:t>UoE ECDF</a:t>
-            </a:r>
-          </a:p>
-          <a:p>
-            <a:pPr marL="285750" indent="-285750">
-              <a:buFont typeface="Arial" panose="020B0604020202020204" pitchFamily="34" charset="0"/>
-              <a:buChar char="•"/>
-            </a:pPr>
-            <a:r>
-              <a:rPr lang="en-GB" dirty="0"/>
-              <a:t>UoE GitLab</a:t>
-            </a:r>
-          </a:p>
-          <a:p>
-            <a:pPr marL="285750" indent="-285750">
-              <a:buFont typeface="Arial" panose="020B0604020202020204" pitchFamily="34" charset="0"/>
-              <a:buChar char="•"/>
-            </a:pPr>
-            <a:r>
-              <a:rPr lang="en-GB" dirty="0"/>
-              <a:t>UoE Subversion</a:t>
-            </a:r>
-          </a:p>
-        </p:txBody>
-      </p:sp>
-      <p:sp>
-        <p:nvSpPr>
-          <p:cNvPr id="10" name="TextBox 9">
-            <a:extLst>
-              <a:ext uri="{FF2B5EF4-FFF2-40B4-BE49-F238E27FC236}">
-                <a16:creationId xmlns:a16="http://schemas.microsoft.com/office/drawing/2014/main" id="{2DE95651-93C5-4ACB-9DB8-44BE36B18E3B}"/>
-              </a:ext>
-            </a:extLst>
-          </p:cNvPr>
-          <p:cNvSpPr txBox="1"/>
-          <p:nvPr/>
-        </p:nvSpPr>
-        <p:spPr>
-          <a:xfrm>
-            <a:off x="1854783" y="5162463"/>
-            <a:ext cx="1307730" cy="369332"/>
-          </a:xfrm>
-          <a:prstGeom prst="rect">
-            <a:avLst/>
-          </a:prstGeom>
-          <a:noFill/>
-        </p:spPr>
-        <p:txBody>
-          <a:bodyPr wrap="none" rtlCol="0">
-            <a:spAutoFit/>
-          </a:bodyPr>
-          <a:lstStyle/>
-          <a:p>
-            <a:r>
-              <a:rPr lang="en-GB" dirty="0">
-                <a:solidFill>
-                  <a:srgbClr val="002060"/>
-                </a:solidFill>
-              </a:rPr>
-              <a:t>Other tools:</a:t>
-            </a:r>
-          </a:p>
-        </p:txBody>
-      </p:sp>
-      <p:sp>
-        <p:nvSpPr>
-          <p:cNvPr id="11" name="TextBox 10">
-            <a:extLst>
-              <a:ext uri="{FF2B5EF4-FFF2-40B4-BE49-F238E27FC236}">
-                <a16:creationId xmlns:a16="http://schemas.microsoft.com/office/drawing/2014/main" id="{0B72F59E-464E-4BC5-89A1-053FD5537CF2}"/>
-              </a:ext>
-            </a:extLst>
-          </p:cNvPr>
-          <p:cNvSpPr txBox="1"/>
-          <p:nvPr/>
-        </p:nvSpPr>
-        <p:spPr>
-          <a:xfrm>
-            <a:off x="515880" y="488425"/>
-            <a:ext cx="9464530" cy="646331"/>
-          </a:xfrm>
-          <a:prstGeom prst="rect">
-            <a:avLst/>
-          </a:prstGeom>
-          <a:noFill/>
-        </p:spPr>
-        <p:txBody>
-          <a:bodyPr wrap="square">
-            <a:spAutoFit/>
-          </a:bodyPr>
-          <a:lstStyle/>
-          <a:p>
-            <a:r>
-              <a:rPr lang="en-GB" sz="3600" dirty="0">
-                <a:solidFill>
-                  <a:srgbClr val="0070C0"/>
-                </a:solidFill>
-              </a:rPr>
-              <a:t>During: UoE </a:t>
-            </a:r>
-            <a:r>
-              <a:rPr lang="en-GB" sz="3600" dirty="0" err="1">
-                <a:solidFill>
-                  <a:srgbClr val="0070C0"/>
-                </a:solidFill>
-              </a:rPr>
-              <a:t>DataStore</a:t>
-            </a:r>
-            <a:endParaRPr lang="en-GB" sz="3600" dirty="0">
-              <a:solidFill>
-                <a:srgbClr val="0070C0"/>
-              </a:solidFill>
-            </a:endParaRPr>
-          </a:p>
-        </p:txBody>
-      </p:sp>
     </p:spTree>
     <p:extLst>
       <p:ext uri="{BB962C8B-B14F-4D97-AF65-F5344CB8AC3E}">
-        <p14:creationId xmlns:p14="http://schemas.microsoft.com/office/powerpoint/2010/main" val="3785654337"/>
+        <p14:creationId xmlns:p14="http://schemas.microsoft.com/office/powerpoint/2010/main" val="2539673267"/>
       </p:ext>
     </p:extLst>
   </p:cSld>

</xml_diff>

<commit_message>
added quiz to DMP slides
</commit_message>
<xml_diff>
--- a/instructors/14-data_management_planning_v2.0.pptx
+++ b/instructors/14-data_management_planning_v2.0.pptx
@@ -5,7 +5,7 @@
     <p:sldMasterId id="2147483648" r:id="rId1"/>
   </p:sldMasterIdLst>
   <p:notesMasterIdLst>
-    <p:notesMasterId r:id="rId20"/>
+    <p:notesMasterId r:id="rId22"/>
   </p:notesMasterIdLst>
   <p:sldIdLst>
     <p:sldId id="256" r:id="rId2"/>
@@ -26,6 +26,8 @@
     <p:sldId id="337" r:id="rId17"/>
     <p:sldId id="338" r:id="rId18"/>
     <p:sldId id="268" r:id="rId19"/>
+    <p:sldId id="319" r:id="rId20"/>
+    <p:sldId id="342" r:id="rId21"/>
   </p:sldIdLst>
   <p:sldSz cx="12192000" cy="6858000"/>
   <p:notesSz cx="6858000" cy="9144000"/>
@@ -214,7 +216,7 @@
           <a:p>
             <a:fld id="{585C48AE-4A1E-9A43-835F-510354165F99}" type="datetimeFigureOut">
               <a:rPr lang="en-GB" smtClean="0"/>
-              <a:t>21/10/2021</a:t>
+              <a:t>22/10/2021</a:t>
             </a:fld>
             <a:endParaRPr lang="en-GB"/>
           </a:p>
@@ -655,6 +657,534 @@
 </p:notes>
 </file>
 
+<file path=ppt/notesSlides/notesSlide2.xml><?xml version="1.0" encoding="utf-8"?>
+<p:notes xmlns:a="http://schemas.openxmlformats.org/drawingml/2006/main" xmlns:r="http://schemas.openxmlformats.org/officeDocument/2006/relationships" xmlns:p="http://schemas.openxmlformats.org/presentationml/2006/main">
+  <p:cSld>
+    <p:spTree>
+      <p:nvGrpSpPr>
+        <p:cNvPr id="1" name=""/>
+        <p:cNvGrpSpPr/>
+        <p:nvPr/>
+      </p:nvGrpSpPr>
+      <p:grpSpPr>
+        <a:xfrm>
+          <a:off x="0" y="0"/>
+          <a:ext cx="0" cy="0"/>
+          <a:chOff x="0" y="0"/>
+          <a:chExt cx="0" cy="0"/>
+        </a:xfrm>
+      </p:grpSpPr>
+      <p:sp>
+        <p:nvSpPr>
+          <p:cNvPr id="2" name="Slide Image Placeholder 1"/>
+          <p:cNvSpPr>
+            <a:spLocks noGrp="1" noRot="1" noChangeAspect="1"/>
+          </p:cNvSpPr>
+          <p:nvPr>
+            <p:ph type="sldImg"/>
+          </p:nvPr>
+        </p:nvSpPr>
+        <p:spPr/>
+      </p:sp>
+      <p:sp>
+        <p:nvSpPr>
+          <p:cNvPr id="3" name="Notes Placeholder 2"/>
+          <p:cNvSpPr>
+            <a:spLocks noGrp="1"/>
+          </p:cNvSpPr>
+          <p:nvPr>
+            <p:ph type="body" idx="1"/>
+          </p:nvPr>
+        </p:nvSpPr>
+        <p:spPr/>
+        <p:txBody>
+          <a:bodyPr/>
+          <a:lstStyle/>
+          <a:p>
+            <a:r>
+              <a:rPr lang="de-DE" sz="1800" dirty="0">
+                <a:solidFill>
+                  <a:srgbClr val="000000"/>
+                </a:solidFill>
+                <a:effectLst/>
+                <a:latin typeface="Calibri" panose="020F0502020204030204" pitchFamily="34" charset="0"/>
+                <a:ea typeface="Calibri" panose="020F0502020204030204" pitchFamily="34" charset="0"/>
+              </a:rPr>
+              <a:t>1. F</a:t>
+            </a:r>
+            <a:endParaRPr lang="en-GB" sz="1800" dirty="0">
+              <a:effectLst/>
+              <a:latin typeface="Calibri" panose="020F0502020204030204" pitchFamily="34" charset="0"/>
+              <a:ea typeface="Calibri" panose="020F0502020204030204" pitchFamily="34" charset="0"/>
+            </a:endParaRPr>
+          </a:p>
+          <a:p>
+            <a:r>
+              <a:rPr lang="de-DE" sz="1800" dirty="0">
+                <a:solidFill>
+                  <a:srgbClr val="000000"/>
+                </a:solidFill>
+                <a:effectLst/>
+                <a:latin typeface="Calibri" panose="020F0502020204030204" pitchFamily="34" charset="0"/>
+                <a:ea typeface="Calibri" panose="020F0502020204030204" pitchFamily="34" charset="0"/>
+              </a:rPr>
+              <a:t>2. T</a:t>
+            </a:r>
+            <a:endParaRPr lang="en-GB" sz="1800" dirty="0">
+              <a:effectLst/>
+              <a:latin typeface="Calibri" panose="020F0502020204030204" pitchFamily="34" charset="0"/>
+              <a:ea typeface="Calibri" panose="020F0502020204030204" pitchFamily="34" charset="0"/>
+            </a:endParaRPr>
+          </a:p>
+          <a:p>
+            <a:r>
+              <a:rPr lang="de-DE" sz="1800" dirty="0">
+                <a:solidFill>
+                  <a:srgbClr val="000000"/>
+                </a:solidFill>
+                <a:effectLst/>
+                <a:latin typeface="Calibri" panose="020F0502020204030204" pitchFamily="34" charset="0"/>
+                <a:ea typeface="Calibri" panose="020F0502020204030204" pitchFamily="34" charset="0"/>
+              </a:rPr>
+              <a:t>3. F</a:t>
+            </a:r>
+            <a:endParaRPr lang="en-GB" sz="1800" dirty="0">
+              <a:effectLst/>
+              <a:latin typeface="Calibri" panose="020F0502020204030204" pitchFamily="34" charset="0"/>
+              <a:ea typeface="Calibri" panose="020F0502020204030204" pitchFamily="34" charset="0"/>
+            </a:endParaRPr>
+          </a:p>
+          <a:p>
+            <a:r>
+              <a:rPr lang="de-DE" sz="1800" dirty="0">
+                <a:solidFill>
+                  <a:srgbClr val="000000"/>
+                </a:solidFill>
+                <a:effectLst/>
+                <a:latin typeface="Calibri" panose="020F0502020204030204" pitchFamily="34" charset="0"/>
+                <a:ea typeface="Calibri" panose="020F0502020204030204" pitchFamily="34" charset="0"/>
+              </a:rPr>
+              <a:t>4. F</a:t>
+            </a:r>
+            <a:endParaRPr lang="en-GB" sz="1800" dirty="0">
+              <a:effectLst/>
+              <a:latin typeface="Calibri" panose="020F0502020204030204" pitchFamily="34" charset="0"/>
+              <a:ea typeface="Calibri" panose="020F0502020204030204" pitchFamily="34" charset="0"/>
+            </a:endParaRPr>
+          </a:p>
+          <a:p>
+            <a:r>
+              <a:rPr lang="de-DE" sz="1800" dirty="0">
+                <a:solidFill>
+                  <a:srgbClr val="000000"/>
+                </a:solidFill>
+                <a:effectLst/>
+                <a:latin typeface="Calibri" panose="020F0502020204030204" pitchFamily="34" charset="0"/>
+                <a:ea typeface="Calibri" panose="020F0502020204030204" pitchFamily="34" charset="0"/>
+              </a:rPr>
+              <a:t>5. T</a:t>
+            </a:r>
+            <a:endParaRPr lang="en-GB" sz="1800" dirty="0">
+              <a:effectLst/>
+              <a:latin typeface="Calibri" panose="020F0502020204030204" pitchFamily="34" charset="0"/>
+              <a:ea typeface="Calibri" panose="020F0502020204030204" pitchFamily="34" charset="0"/>
+            </a:endParaRPr>
+          </a:p>
+          <a:p>
+            <a:r>
+              <a:rPr lang="de-DE" sz="1800" dirty="0">
+                <a:solidFill>
+                  <a:srgbClr val="000000"/>
+                </a:solidFill>
+                <a:effectLst/>
+                <a:latin typeface="Calibri" panose="020F0502020204030204" pitchFamily="34" charset="0"/>
+                <a:ea typeface="Calibri" panose="020F0502020204030204" pitchFamily="34" charset="0"/>
+              </a:rPr>
+              <a:t>6. T</a:t>
+            </a:r>
+            <a:endParaRPr lang="en-GB" sz="1800" dirty="0">
+              <a:effectLst/>
+              <a:latin typeface="Calibri" panose="020F0502020204030204" pitchFamily="34" charset="0"/>
+              <a:ea typeface="Calibri" panose="020F0502020204030204" pitchFamily="34" charset="0"/>
+            </a:endParaRPr>
+          </a:p>
+          <a:p>
+            <a:r>
+              <a:rPr lang="de-DE" sz="1800" dirty="0">
+                <a:solidFill>
+                  <a:srgbClr val="000000"/>
+                </a:solidFill>
+                <a:effectLst/>
+                <a:latin typeface="Calibri" panose="020F0502020204030204" pitchFamily="34" charset="0"/>
+                <a:ea typeface="Calibri" panose="020F0502020204030204" pitchFamily="34" charset="0"/>
+              </a:rPr>
+              <a:t>7. T</a:t>
+            </a:r>
+            <a:endParaRPr lang="en-GB" sz="1800" dirty="0">
+              <a:effectLst/>
+              <a:latin typeface="Calibri" panose="020F0502020204030204" pitchFamily="34" charset="0"/>
+              <a:ea typeface="Calibri" panose="020F0502020204030204" pitchFamily="34" charset="0"/>
+            </a:endParaRPr>
+          </a:p>
+          <a:p>
+            <a:r>
+              <a:rPr lang="de-DE" sz="1800" dirty="0">
+                <a:solidFill>
+                  <a:srgbClr val="000000"/>
+                </a:solidFill>
+                <a:effectLst/>
+                <a:latin typeface="Calibri" panose="020F0502020204030204" pitchFamily="34" charset="0"/>
+                <a:ea typeface="Calibri" panose="020F0502020204030204" pitchFamily="34" charset="0"/>
+              </a:rPr>
+              <a:t>8. F</a:t>
+            </a:r>
+            <a:endParaRPr lang="en-GB" sz="1800" dirty="0">
+              <a:effectLst/>
+              <a:latin typeface="Calibri" panose="020F0502020204030204" pitchFamily="34" charset="0"/>
+              <a:ea typeface="Calibri" panose="020F0502020204030204" pitchFamily="34" charset="0"/>
+            </a:endParaRPr>
+          </a:p>
+          <a:p>
+            <a:r>
+              <a:rPr lang="de-DE" sz="1800" dirty="0">
+                <a:solidFill>
+                  <a:srgbClr val="000000"/>
+                </a:solidFill>
+                <a:effectLst/>
+                <a:latin typeface="Calibri" panose="020F0502020204030204" pitchFamily="34" charset="0"/>
+                <a:ea typeface="Calibri" panose="020F0502020204030204" pitchFamily="34" charset="0"/>
+              </a:rPr>
+              <a:t>9. F</a:t>
+            </a:r>
+            <a:endParaRPr lang="en-GB" sz="1800" dirty="0">
+              <a:effectLst/>
+              <a:latin typeface="Calibri" panose="020F0502020204030204" pitchFamily="34" charset="0"/>
+              <a:ea typeface="Calibri" panose="020F0502020204030204" pitchFamily="34" charset="0"/>
+            </a:endParaRPr>
+          </a:p>
+          <a:p>
+            <a:r>
+              <a:rPr lang="de-DE" sz="1800" dirty="0">
+                <a:solidFill>
+                  <a:srgbClr val="000000"/>
+                </a:solidFill>
+                <a:effectLst/>
+                <a:latin typeface="Calibri" panose="020F0502020204030204" pitchFamily="34" charset="0"/>
+                <a:ea typeface="Calibri" panose="020F0502020204030204" pitchFamily="34" charset="0"/>
+              </a:rPr>
+              <a:t>10. T</a:t>
+            </a:r>
+            <a:endParaRPr lang="en-GB" sz="1800" dirty="0">
+              <a:effectLst/>
+              <a:latin typeface="Calibri" panose="020F0502020204030204" pitchFamily="34" charset="0"/>
+              <a:ea typeface="Calibri" panose="020F0502020204030204" pitchFamily="34" charset="0"/>
+            </a:endParaRPr>
+          </a:p>
+          <a:p>
+            <a:endParaRPr lang="en-GB" dirty="0"/>
+          </a:p>
+        </p:txBody>
+      </p:sp>
+      <p:sp>
+        <p:nvSpPr>
+          <p:cNvPr id="4" name="Slide Number Placeholder 3"/>
+          <p:cNvSpPr>
+            <a:spLocks noGrp="1"/>
+          </p:cNvSpPr>
+          <p:nvPr>
+            <p:ph type="sldNum" sz="quarter" idx="5"/>
+          </p:nvPr>
+        </p:nvSpPr>
+        <p:spPr/>
+        <p:txBody>
+          <a:bodyPr/>
+          <a:lstStyle/>
+          <a:p>
+            <a:fld id="{B361C124-7373-F149-A166-BB8240B9FE77}" type="slidenum">
+              <a:rPr lang="en-GB" smtClean="0"/>
+              <a:t>19</a:t>
+            </a:fld>
+            <a:endParaRPr lang="en-GB"/>
+          </a:p>
+        </p:txBody>
+      </p:sp>
+    </p:spTree>
+    <p:extLst>
+      <p:ext uri="{BB962C8B-B14F-4D97-AF65-F5344CB8AC3E}">
+        <p14:creationId xmlns:p14="http://schemas.microsoft.com/office/powerpoint/2010/main" val="3187225334"/>
+      </p:ext>
+    </p:extLst>
+  </p:cSld>
+  <p:clrMapOvr>
+    <a:masterClrMapping/>
+  </p:clrMapOvr>
+</p:notes>
+</file>
+
+<file path=ppt/notesSlides/notesSlide3.xml><?xml version="1.0" encoding="utf-8"?>
+<p:notes xmlns:a="http://schemas.openxmlformats.org/drawingml/2006/main" xmlns:r="http://schemas.openxmlformats.org/officeDocument/2006/relationships" xmlns:p="http://schemas.openxmlformats.org/presentationml/2006/main">
+  <p:cSld>
+    <p:spTree>
+      <p:nvGrpSpPr>
+        <p:cNvPr id="1" name=""/>
+        <p:cNvGrpSpPr/>
+        <p:nvPr/>
+      </p:nvGrpSpPr>
+      <p:grpSpPr>
+        <a:xfrm>
+          <a:off x="0" y="0"/>
+          <a:ext cx="0" cy="0"/>
+          <a:chOff x="0" y="0"/>
+          <a:chExt cx="0" cy="0"/>
+        </a:xfrm>
+      </p:grpSpPr>
+      <p:sp>
+        <p:nvSpPr>
+          <p:cNvPr id="2" name="Slide Image Placeholder 1"/>
+          <p:cNvSpPr>
+            <a:spLocks noGrp="1" noRot="1" noChangeAspect="1"/>
+          </p:cNvSpPr>
+          <p:nvPr>
+            <p:ph type="sldImg"/>
+          </p:nvPr>
+        </p:nvSpPr>
+        <p:spPr/>
+      </p:sp>
+      <p:sp>
+        <p:nvSpPr>
+          <p:cNvPr id="3" name="Notes Placeholder 2"/>
+          <p:cNvSpPr>
+            <a:spLocks noGrp="1"/>
+          </p:cNvSpPr>
+          <p:nvPr>
+            <p:ph type="body" idx="1"/>
+          </p:nvPr>
+        </p:nvSpPr>
+        <p:spPr/>
+        <p:txBody>
+          <a:bodyPr/>
+          <a:lstStyle/>
+          <a:p>
+            <a:r>
+              <a:rPr lang="de-DE" sz="1800" dirty="0">
+                <a:solidFill>
+                  <a:srgbClr val="000000"/>
+                </a:solidFill>
+                <a:effectLst/>
+                <a:latin typeface="Calibri" panose="020F0502020204030204" pitchFamily="34" charset="0"/>
+                <a:ea typeface="Calibri" panose="020F0502020204030204" pitchFamily="34" charset="0"/>
+              </a:rPr>
+              <a:t>1. F</a:t>
+            </a:r>
+            <a:endParaRPr lang="en-GB" sz="1800" dirty="0">
+              <a:effectLst/>
+              <a:latin typeface="Calibri" panose="020F0502020204030204" pitchFamily="34" charset="0"/>
+              <a:ea typeface="Calibri" panose="020F0502020204030204" pitchFamily="34" charset="0"/>
+            </a:endParaRPr>
+          </a:p>
+          <a:p>
+            <a:r>
+              <a:rPr lang="de-DE" sz="1800" dirty="0">
+                <a:solidFill>
+                  <a:srgbClr val="000000"/>
+                </a:solidFill>
+                <a:effectLst/>
+                <a:latin typeface="Calibri" panose="020F0502020204030204" pitchFamily="34" charset="0"/>
+                <a:ea typeface="Calibri" panose="020F0502020204030204" pitchFamily="34" charset="0"/>
+              </a:rPr>
+              <a:t>2. T</a:t>
+            </a:r>
+            <a:endParaRPr lang="en-GB" sz="1800" dirty="0">
+              <a:effectLst/>
+              <a:latin typeface="Calibri" panose="020F0502020204030204" pitchFamily="34" charset="0"/>
+              <a:ea typeface="Calibri" panose="020F0502020204030204" pitchFamily="34" charset="0"/>
+            </a:endParaRPr>
+          </a:p>
+          <a:p>
+            <a:r>
+              <a:rPr lang="de-DE" sz="1800" dirty="0">
+                <a:solidFill>
+                  <a:srgbClr val="000000"/>
+                </a:solidFill>
+                <a:effectLst/>
+                <a:latin typeface="Calibri" panose="020F0502020204030204" pitchFamily="34" charset="0"/>
+                <a:ea typeface="Calibri" panose="020F0502020204030204" pitchFamily="34" charset="0"/>
+              </a:rPr>
+              <a:t>3. F</a:t>
+            </a:r>
+            <a:endParaRPr lang="en-GB" sz="1800" dirty="0">
+              <a:effectLst/>
+              <a:latin typeface="Calibri" panose="020F0502020204030204" pitchFamily="34" charset="0"/>
+              <a:ea typeface="Calibri" panose="020F0502020204030204" pitchFamily="34" charset="0"/>
+            </a:endParaRPr>
+          </a:p>
+          <a:p>
+            <a:r>
+              <a:rPr lang="de-DE" sz="1800" dirty="0">
+                <a:solidFill>
+                  <a:srgbClr val="000000"/>
+                </a:solidFill>
+                <a:effectLst/>
+                <a:latin typeface="Calibri" panose="020F0502020204030204" pitchFamily="34" charset="0"/>
+                <a:ea typeface="Calibri" panose="020F0502020204030204" pitchFamily="34" charset="0"/>
+              </a:rPr>
+              <a:t>4. F</a:t>
+            </a:r>
+            <a:endParaRPr lang="en-GB" sz="1800" dirty="0">
+              <a:effectLst/>
+              <a:latin typeface="Calibri" panose="020F0502020204030204" pitchFamily="34" charset="0"/>
+              <a:ea typeface="Calibri" panose="020F0502020204030204" pitchFamily="34" charset="0"/>
+            </a:endParaRPr>
+          </a:p>
+          <a:p>
+            <a:r>
+              <a:rPr lang="de-DE" sz="1800" dirty="0">
+                <a:solidFill>
+                  <a:srgbClr val="000000"/>
+                </a:solidFill>
+                <a:effectLst/>
+                <a:latin typeface="Calibri" panose="020F0502020204030204" pitchFamily="34" charset="0"/>
+                <a:ea typeface="Calibri" panose="020F0502020204030204" pitchFamily="34" charset="0"/>
+              </a:rPr>
+              <a:t>5. T</a:t>
+            </a:r>
+            <a:endParaRPr lang="en-GB" sz="1800" dirty="0">
+              <a:effectLst/>
+              <a:latin typeface="Calibri" panose="020F0502020204030204" pitchFamily="34" charset="0"/>
+              <a:ea typeface="Calibri" panose="020F0502020204030204" pitchFamily="34" charset="0"/>
+            </a:endParaRPr>
+          </a:p>
+          <a:p>
+            <a:r>
+              <a:rPr lang="de-DE" sz="1800" dirty="0">
+                <a:solidFill>
+                  <a:srgbClr val="000000"/>
+                </a:solidFill>
+                <a:effectLst/>
+                <a:latin typeface="Calibri" panose="020F0502020204030204" pitchFamily="34" charset="0"/>
+                <a:ea typeface="Calibri" panose="020F0502020204030204" pitchFamily="34" charset="0"/>
+              </a:rPr>
+              <a:t>6. T</a:t>
+            </a:r>
+            <a:endParaRPr lang="en-GB" sz="1800" dirty="0">
+              <a:effectLst/>
+              <a:latin typeface="Calibri" panose="020F0502020204030204" pitchFamily="34" charset="0"/>
+              <a:ea typeface="Calibri" panose="020F0502020204030204" pitchFamily="34" charset="0"/>
+            </a:endParaRPr>
+          </a:p>
+          <a:p>
+            <a:r>
+              <a:rPr lang="de-DE" sz="1800" dirty="0">
+                <a:solidFill>
+                  <a:srgbClr val="000000"/>
+                </a:solidFill>
+                <a:effectLst/>
+                <a:latin typeface="Calibri" panose="020F0502020204030204" pitchFamily="34" charset="0"/>
+                <a:ea typeface="Calibri" panose="020F0502020204030204" pitchFamily="34" charset="0"/>
+              </a:rPr>
+              <a:t>7. T</a:t>
+            </a:r>
+            <a:endParaRPr lang="en-GB" sz="1800" dirty="0">
+              <a:effectLst/>
+              <a:latin typeface="Calibri" panose="020F0502020204030204" pitchFamily="34" charset="0"/>
+              <a:ea typeface="Calibri" panose="020F0502020204030204" pitchFamily="34" charset="0"/>
+            </a:endParaRPr>
+          </a:p>
+          <a:p>
+            <a:r>
+              <a:rPr lang="de-DE" sz="1800" dirty="0">
+                <a:solidFill>
+                  <a:srgbClr val="000000"/>
+                </a:solidFill>
+                <a:effectLst/>
+                <a:latin typeface="Calibri" panose="020F0502020204030204" pitchFamily="34" charset="0"/>
+                <a:ea typeface="Calibri" panose="020F0502020204030204" pitchFamily="34" charset="0"/>
+              </a:rPr>
+              <a:t>8. F</a:t>
+            </a:r>
+            <a:endParaRPr lang="en-GB" sz="1800" dirty="0">
+              <a:effectLst/>
+              <a:latin typeface="Calibri" panose="020F0502020204030204" pitchFamily="34" charset="0"/>
+              <a:ea typeface="Calibri" panose="020F0502020204030204" pitchFamily="34" charset="0"/>
+            </a:endParaRPr>
+          </a:p>
+          <a:p>
+            <a:r>
+              <a:rPr lang="de-DE" sz="1800" dirty="0">
+                <a:solidFill>
+                  <a:srgbClr val="000000"/>
+                </a:solidFill>
+                <a:effectLst/>
+                <a:latin typeface="Calibri" panose="020F0502020204030204" pitchFamily="34" charset="0"/>
+                <a:ea typeface="Calibri" panose="020F0502020204030204" pitchFamily="34" charset="0"/>
+              </a:rPr>
+              <a:t>9. F</a:t>
+            </a:r>
+            <a:endParaRPr lang="en-GB" sz="1800" dirty="0">
+              <a:effectLst/>
+              <a:latin typeface="Calibri" panose="020F0502020204030204" pitchFamily="34" charset="0"/>
+              <a:ea typeface="Calibri" panose="020F0502020204030204" pitchFamily="34" charset="0"/>
+            </a:endParaRPr>
+          </a:p>
+          <a:p>
+            <a:r>
+              <a:rPr lang="de-DE" sz="1800" dirty="0">
+                <a:solidFill>
+                  <a:srgbClr val="000000"/>
+                </a:solidFill>
+                <a:effectLst/>
+                <a:latin typeface="Calibri" panose="020F0502020204030204" pitchFamily="34" charset="0"/>
+                <a:ea typeface="Calibri" panose="020F0502020204030204" pitchFamily="34" charset="0"/>
+              </a:rPr>
+              <a:t>10. T</a:t>
+            </a:r>
+            <a:endParaRPr lang="en-GB" sz="1800" dirty="0">
+              <a:effectLst/>
+              <a:latin typeface="Calibri" panose="020F0502020204030204" pitchFamily="34" charset="0"/>
+              <a:ea typeface="Calibri" panose="020F0502020204030204" pitchFamily="34" charset="0"/>
+            </a:endParaRPr>
+          </a:p>
+          <a:p>
+            <a:endParaRPr lang="en-GB" dirty="0"/>
+          </a:p>
+        </p:txBody>
+      </p:sp>
+      <p:sp>
+        <p:nvSpPr>
+          <p:cNvPr id="4" name="Slide Number Placeholder 3"/>
+          <p:cNvSpPr>
+            <a:spLocks noGrp="1"/>
+          </p:cNvSpPr>
+          <p:nvPr>
+            <p:ph type="sldNum" sz="quarter" idx="5"/>
+          </p:nvPr>
+        </p:nvSpPr>
+        <p:spPr/>
+        <p:txBody>
+          <a:bodyPr/>
+          <a:lstStyle/>
+          <a:p>
+            <a:fld id="{B361C124-7373-F149-A166-BB8240B9FE77}" type="slidenum">
+              <a:rPr lang="en-GB" smtClean="0"/>
+              <a:t>20</a:t>
+            </a:fld>
+            <a:endParaRPr lang="en-GB"/>
+          </a:p>
+        </p:txBody>
+      </p:sp>
+    </p:spTree>
+    <p:extLst>
+      <p:ext uri="{BB962C8B-B14F-4D97-AF65-F5344CB8AC3E}">
+        <p14:creationId xmlns:p14="http://schemas.microsoft.com/office/powerpoint/2010/main" val="2730361236"/>
+      </p:ext>
+    </p:extLst>
+  </p:cSld>
+  <p:clrMapOvr>
+    <a:masterClrMapping/>
+  </p:clrMapOvr>
+</p:notes>
+</file>
+
 <file path=ppt/slideLayouts/slideLayout1.xml><?xml version="1.0" encoding="utf-8"?>
 <p:sldLayout xmlns:a="http://schemas.openxmlformats.org/drawingml/2006/main" xmlns:r="http://schemas.openxmlformats.org/officeDocument/2006/relationships" xmlns:p="http://schemas.openxmlformats.org/presentationml/2006/main" type="title" preserve="1">
   <p:cSld name="Title Slide">
@@ -804,7 +1334,7 @@
           <a:p>
             <a:fld id="{5913FB77-D8DB-4AB9-8EA5-EE8C3B57A5E1}" type="datetimeFigureOut">
               <a:rPr lang="en-GB" smtClean="0"/>
-              <a:t>21/10/2021</a:t>
+              <a:t>22/10/2021</a:t>
             </a:fld>
             <a:endParaRPr lang="en-GB"/>
           </a:p>
@@ -1004,7 +1534,7 @@
           <a:p>
             <a:fld id="{5913FB77-D8DB-4AB9-8EA5-EE8C3B57A5E1}" type="datetimeFigureOut">
               <a:rPr lang="en-GB" smtClean="0"/>
-              <a:t>21/10/2021</a:t>
+              <a:t>22/10/2021</a:t>
             </a:fld>
             <a:endParaRPr lang="en-GB"/>
           </a:p>
@@ -1214,7 +1744,7 @@
           <a:p>
             <a:fld id="{5913FB77-D8DB-4AB9-8EA5-EE8C3B57A5E1}" type="datetimeFigureOut">
               <a:rPr lang="en-GB" smtClean="0"/>
-              <a:t>21/10/2021</a:t>
+              <a:t>22/10/2021</a:t>
             </a:fld>
             <a:endParaRPr lang="en-GB"/>
           </a:p>
@@ -1414,7 +1944,7 @@
           <a:p>
             <a:fld id="{5913FB77-D8DB-4AB9-8EA5-EE8C3B57A5E1}" type="datetimeFigureOut">
               <a:rPr lang="en-GB" smtClean="0"/>
-              <a:t>21/10/2021</a:t>
+              <a:t>22/10/2021</a:t>
             </a:fld>
             <a:endParaRPr lang="en-GB"/>
           </a:p>
@@ -1690,7 +2220,7 @@
           <a:p>
             <a:fld id="{5913FB77-D8DB-4AB9-8EA5-EE8C3B57A5E1}" type="datetimeFigureOut">
               <a:rPr lang="en-GB" smtClean="0"/>
-              <a:t>21/10/2021</a:t>
+              <a:t>22/10/2021</a:t>
             </a:fld>
             <a:endParaRPr lang="en-GB"/>
           </a:p>
@@ -1958,7 +2488,7 @@
           <a:p>
             <a:fld id="{5913FB77-D8DB-4AB9-8EA5-EE8C3B57A5E1}" type="datetimeFigureOut">
               <a:rPr lang="en-GB" smtClean="0"/>
-              <a:t>21/10/2021</a:t>
+              <a:t>22/10/2021</a:t>
             </a:fld>
             <a:endParaRPr lang="en-GB"/>
           </a:p>
@@ -2373,7 +2903,7 @@
           <a:p>
             <a:fld id="{5913FB77-D8DB-4AB9-8EA5-EE8C3B57A5E1}" type="datetimeFigureOut">
               <a:rPr lang="en-GB" smtClean="0"/>
-              <a:t>21/10/2021</a:t>
+              <a:t>22/10/2021</a:t>
             </a:fld>
             <a:endParaRPr lang="en-GB"/>
           </a:p>
@@ -2515,7 +3045,7 @@
           <a:p>
             <a:fld id="{5913FB77-D8DB-4AB9-8EA5-EE8C3B57A5E1}" type="datetimeFigureOut">
               <a:rPr lang="en-GB" smtClean="0"/>
-              <a:t>21/10/2021</a:t>
+              <a:t>22/10/2021</a:t>
             </a:fld>
             <a:endParaRPr lang="en-GB"/>
           </a:p>
@@ -2628,7 +3158,7 @@
           <a:p>
             <a:fld id="{5913FB77-D8DB-4AB9-8EA5-EE8C3B57A5E1}" type="datetimeFigureOut">
               <a:rPr lang="en-GB" smtClean="0"/>
-              <a:t>21/10/2021</a:t>
+              <a:t>22/10/2021</a:t>
             </a:fld>
             <a:endParaRPr lang="en-GB"/>
           </a:p>
@@ -2941,7 +3471,7 @@
           <a:p>
             <a:fld id="{5913FB77-D8DB-4AB9-8EA5-EE8C3B57A5E1}" type="datetimeFigureOut">
               <a:rPr lang="en-GB" smtClean="0"/>
-              <a:t>21/10/2021</a:t>
+              <a:t>22/10/2021</a:t>
             </a:fld>
             <a:endParaRPr lang="en-GB"/>
           </a:p>
@@ -3230,7 +3760,7 @@
           <a:p>
             <a:fld id="{5913FB77-D8DB-4AB9-8EA5-EE8C3B57A5E1}" type="datetimeFigureOut">
               <a:rPr lang="en-GB" smtClean="0"/>
-              <a:t>21/10/2021</a:t>
+              <a:t>22/10/2021</a:t>
             </a:fld>
             <a:endParaRPr lang="en-GB"/>
           </a:p>
@@ -3473,7 +4003,7 @@
           <a:p>
             <a:fld id="{5913FB77-D8DB-4AB9-8EA5-EE8C3B57A5E1}" type="datetimeFigureOut">
               <a:rPr lang="en-GB" smtClean="0"/>
-              <a:t>21/10/2021</a:t>
+              <a:t>22/10/2021</a:t>
             </a:fld>
             <a:endParaRPr lang="en-GB"/>
           </a:p>
@@ -5985,14 +6515,14 @@
           </a:ln>
           <a:extLst>
             <a:ext uri="{909E8E84-426E-40dd-AFC4-6F175D3DCCD1}">
-              <a14:hiddenFill xmlns="" xmlns:a14="http://schemas.microsoft.com/office/drawing/2010/main">
+              <a14:hiddenFill xmlns:a14="http://schemas.microsoft.com/office/drawing/2010/main" xmlns="">
                 <a:solidFill>
                   <a:srgbClr val="FFFFFF"/>
                 </a:solidFill>
               </a14:hiddenFill>
             </a:ext>
             <a:ext uri="{91240B29-F687-4f45-9708-019B960494DF}">
-              <a14:hiddenLine xmlns="" xmlns:a14="http://schemas.microsoft.com/office/drawing/2010/main" w="9525">
+              <a14:hiddenLine xmlns:a14="http://schemas.microsoft.com/office/drawing/2010/main" xmlns="" w="9525">
                 <a:solidFill>
                   <a:srgbClr val="000000"/>
                 </a:solidFill>
@@ -6625,14 +7155,14 @@
           </a:ln>
           <a:extLst>
             <a:ext uri="{909E8E84-426E-40dd-AFC4-6F175D3DCCD1}">
-              <a14:hiddenFill xmlns="" xmlns:a14="http://schemas.microsoft.com/office/drawing/2010/main">
+              <a14:hiddenFill xmlns:a14="http://schemas.microsoft.com/office/drawing/2010/main" xmlns="">
                 <a:solidFill>
                   <a:srgbClr val="FFFFFF"/>
                 </a:solidFill>
               </a14:hiddenFill>
             </a:ext>
             <a:ext uri="{91240B29-F687-4f45-9708-019B960494DF}">
-              <a14:hiddenLine xmlns="" xmlns:a14="http://schemas.microsoft.com/office/drawing/2010/main" w="9525">
+              <a14:hiddenLine xmlns:a14="http://schemas.microsoft.com/office/drawing/2010/main" xmlns="" w="9525">
                 <a:solidFill>
                   <a:srgbClr val="000000"/>
                 </a:solidFill>
@@ -7252,14 +7782,14 @@
           </a:ln>
           <a:extLst>
             <a:ext uri="{909E8E84-426E-40dd-AFC4-6F175D3DCCD1}">
-              <a14:hiddenFill xmlns="" xmlns:a14="http://schemas.microsoft.com/office/drawing/2010/main">
+              <a14:hiddenFill xmlns:a14="http://schemas.microsoft.com/office/drawing/2010/main" xmlns="">
                 <a:solidFill>
                   <a:srgbClr val="FFFFFF"/>
                 </a:solidFill>
               </a14:hiddenFill>
             </a:ext>
             <a:ext uri="{91240B29-F687-4f45-9708-019B960494DF}">
-              <a14:hiddenLine xmlns="" xmlns:a14="http://schemas.microsoft.com/office/drawing/2010/main" w="9525">
+              <a14:hiddenLine xmlns:a14="http://schemas.microsoft.com/office/drawing/2010/main" xmlns="" w="9525">
                 <a:solidFill>
                   <a:srgbClr val="000000"/>
                 </a:solidFill>
@@ -7855,14 +8385,14 @@
           </a:ln>
           <a:extLst>
             <a:ext uri="{909E8E84-426E-40dd-AFC4-6F175D3DCCD1}">
-              <a14:hiddenFill xmlns="" xmlns:a14="http://schemas.microsoft.com/office/drawing/2010/main">
+              <a14:hiddenFill xmlns:a14="http://schemas.microsoft.com/office/drawing/2010/main" xmlns="">
                 <a:solidFill>
                   <a:srgbClr val="FFFFFF"/>
                 </a:solidFill>
               </a14:hiddenFill>
             </a:ext>
             <a:ext uri="{91240B29-F687-4f45-9708-019B960494DF}">
-              <a14:hiddenLine xmlns="" xmlns:a14="http://schemas.microsoft.com/office/drawing/2010/main" w="9525">
+              <a14:hiddenLine xmlns:a14="http://schemas.microsoft.com/office/drawing/2010/main" xmlns="" w="9525">
                 <a:solidFill>
                   <a:srgbClr val="000000"/>
                 </a:solidFill>
@@ -8998,6 +9528,210 @@
 </p:sld>
 </file>
 
+<file path=ppt/slides/slide19.xml><?xml version="1.0" encoding="utf-8"?>
+<p:sld xmlns:a="http://schemas.openxmlformats.org/drawingml/2006/main" xmlns:r="http://schemas.openxmlformats.org/officeDocument/2006/relationships" xmlns:p="http://schemas.openxmlformats.org/presentationml/2006/main">
+  <p:cSld>
+    <p:spTree>
+      <p:nvGrpSpPr>
+        <p:cNvPr id="1" name=""/>
+        <p:cNvGrpSpPr/>
+        <p:nvPr/>
+      </p:nvGrpSpPr>
+      <p:grpSpPr>
+        <a:xfrm>
+          <a:off x="0" y="0"/>
+          <a:ext cx="0" cy="0"/>
+          <a:chOff x="0" y="0"/>
+          <a:chExt cx="0" cy="0"/>
+        </a:xfrm>
+      </p:grpSpPr>
+      <p:sp>
+        <p:nvSpPr>
+          <p:cNvPr id="2" name="Title 1">
+            <a:extLst>
+              <a:ext uri="{FF2B5EF4-FFF2-40B4-BE49-F238E27FC236}">
+                <a16:creationId xmlns:a16="http://schemas.microsoft.com/office/drawing/2014/main" id="{3A5186E0-B0CC-4664-8D5D-FE79BD5CB56F}"/>
+              </a:ext>
+            </a:extLst>
+          </p:cNvPr>
+          <p:cNvSpPr>
+            <a:spLocks noGrp="1"/>
+          </p:cNvSpPr>
+          <p:nvPr>
+            <p:ph type="title"/>
+          </p:nvPr>
+        </p:nvSpPr>
+        <p:spPr>
+          <a:xfrm>
+            <a:off x="965199" y="851517"/>
+            <a:ext cx="6140451" cy="1461778"/>
+          </a:xfrm>
+        </p:spPr>
+        <p:txBody>
+          <a:bodyPr>
+            <a:normAutofit/>
+          </a:bodyPr>
+          <a:lstStyle/>
+          <a:p>
+            <a:r>
+              <a:rPr lang="en-GB" sz="4000" dirty="0">
+                <a:solidFill>
+                  <a:srgbClr val="0070C0"/>
+                </a:solidFill>
+              </a:rPr>
+              <a:t>Data Management Plan Quiz</a:t>
+            </a:r>
+          </a:p>
+        </p:txBody>
+      </p:sp>
+      <p:pic>
+        <p:nvPicPr>
+          <p:cNvPr id="5" name="Graphic 4" descr="Questions with solid fill">
+            <a:extLst>
+              <a:ext uri="{FF2B5EF4-FFF2-40B4-BE49-F238E27FC236}">
+                <a16:creationId xmlns:a16="http://schemas.microsoft.com/office/drawing/2014/main" id="{02CE7069-253F-AF44-8C83-23BBE5DB1723}"/>
+              </a:ext>
+            </a:extLst>
+          </p:cNvPr>
+          <p:cNvPicPr>
+            <a:picLocks noChangeAspect="1"/>
+          </p:cNvPicPr>
+          <p:nvPr/>
+        </p:nvPicPr>
+        <p:blipFill>
+          <a:blip r:embed="rId3">
+            <a:extLst>
+              <a:ext uri="{28A0092B-C50C-407E-A947-70E740481C1C}">
+                <a14:useLocalDpi xmlns:a14="http://schemas.microsoft.com/office/drawing/2010/main" val="0"/>
+              </a:ext>
+              <a:ext uri="{96DAC541-7B7A-43D3-8B79-37D633B846F1}">
+                <asvg:svgBlip xmlns:asvg="http://schemas.microsoft.com/office/drawing/2016/SVG/main" r:embed="rId4"/>
+              </a:ext>
+            </a:extLst>
+          </a:blip>
+          <a:stretch>
+            <a:fillRect/>
+          </a:stretch>
+        </p:blipFill>
+        <p:spPr>
+          <a:xfrm>
+            <a:off x="7535330" y="2105470"/>
+            <a:ext cx="3217333" cy="3217333"/>
+          </a:xfrm>
+          <a:prstGeom prst="rect">
+            <a:avLst/>
+          </a:prstGeom>
+        </p:spPr>
+      </p:pic>
+      <p:sp>
+        <p:nvSpPr>
+          <p:cNvPr id="7" name="TextBox 6">
+            <a:extLst>
+              <a:ext uri="{FF2B5EF4-FFF2-40B4-BE49-F238E27FC236}">
+                <a16:creationId xmlns:a16="http://schemas.microsoft.com/office/drawing/2014/main" id="{4E4F3A1C-D299-4C90-903C-08B2A4E6A071}"/>
+              </a:ext>
+            </a:extLst>
+          </p:cNvPr>
+          <p:cNvSpPr txBox="1"/>
+          <p:nvPr/>
+        </p:nvSpPr>
+        <p:spPr>
+          <a:xfrm>
+            <a:off x="1092764" y="6231018"/>
+            <a:ext cx="7207173" cy="369332"/>
+          </a:xfrm>
+          <a:prstGeom prst="rect">
+            <a:avLst/>
+          </a:prstGeom>
+          <a:noFill/>
+        </p:spPr>
+        <p:txBody>
+          <a:bodyPr wrap="square">
+            <a:spAutoFit/>
+          </a:bodyPr>
+          <a:lstStyle/>
+          <a:p>
+            <a:r>
+              <a:rPr lang="en-GB" dirty="0"/>
+              <a:t>Open </a:t>
+            </a:r>
+            <a:r>
+              <a:rPr lang="en-GB" dirty="0">
+                <a:hlinkClick r:id="rId5"/>
+              </a:rPr>
+              <a:t>https://pad.carpentries.org/2021-10-22_ed-dash_fair-bio-practice</a:t>
+            </a:r>
+            <a:r>
+              <a:rPr lang="en-GB" dirty="0"/>
+              <a:t> </a:t>
+            </a:r>
+            <a:endParaRPr lang="en-GB" dirty="0">
+              <a:highlight>
+                <a:srgbClr val="FFFF00"/>
+              </a:highlight>
+            </a:endParaRPr>
+          </a:p>
+        </p:txBody>
+      </p:sp>
+      <p:sp>
+        <p:nvSpPr>
+          <p:cNvPr id="8" name="Arrow: Down 7">
+            <a:extLst>
+              <a:ext uri="{FF2B5EF4-FFF2-40B4-BE49-F238E27FC236}">
+                <a16:creationId xmlns:a16="http://schemas.microsoft.com/office/drawing/2014/main" id="{F191515C-8821-4EB1-90D1-42A41AD0CA74}"/>
+              </a:ext>
+            </a:extLst>
+          </p:cNvPr>
+          <p:cNvSpPr/>
+          <p:nvPr/>
+        </p:nvSpPr>
+        <p:spPr>
+          <a:xfrm rot="16200000">
+            <a:off x="410999" y="6105291"/>
+            <a:ext cx="469783" cy="620786"/>
+          </a:xfrm>
+          <a:prstGeom prst="downArrow">
+            <a:avLst/>
+          </a:prstGeom>
+        </p:spPr>
+        <p:style>
+          <a:lnRef idx="2">
+            <a:schemeClr val="accent1">
+              <a:shade val="50000"/>
+            </a:schemeClr>
+          </a:lnRef>
+          <a:fillRef idx="1">
+            <a:schemeClr val="accent1"/>
+          </a:fillRef>
+          <a:effectRef idx="0">
+            <a:schemeClr val="accent1"/>
+          </a:effectRef>
+          <a:fontRef idx="minor">
+            <a:schemeClr val="lt1"/>
+          </a:fontRef>
+        </p:style>
+        <p:txBody>
+          <a:bodyPr rtlCol="0" anchor="ctr"/>
+          <a:lstStyle/>
+          <a:p>
+            <a:pPr algn="ctr"/>
+            <a:endParaRPr lang="en-GB"/>
+          </a:p>
+        </p:txBody>
+      </p:sp>
+    </p:spTree>
+    <p:extLst>
+      <p:ext uri="{BB962C8B-B14F-4D97-AF65-F5344CB8AC3E}">
+        <p14:creationId xmlns:p14="http://schemas.microsoft.com/office/powerpoint/2010/main" val="1110405849"/>
+      </p:ext>
+    </p:extLst>
+  </p:cSld>
+  <p:clrMapOvr>
+    <a:masterClrMapping/>
+  </p:clrMapOvr>
+</p:sld>
+</file>
+
 <file path=ppt/slides/slide2.xml><?xml version="1.0" encoding="utf-8"?>
 <p:sld xmlns:a="http://schemas.openxmlformats.org/drawingml/2006/main" xmlns:r="http://schemas.openxmlformats.org/officeDocument/2006/relationships" xmlns:p="http://schemas.openxmlformats.org/presentationml/2006/main">
   <p:cSld>
@@ -9120,10 +9854,562 @@
           </a:extLst>
         </p:spPr>
       </p:pic>
+      <p:sp>
+        <p:nvSpPr>
+          <p:cNvPr id="4" name="TextBox 3">
+            <a:extLst>
+              <a:ext uri="{FF2B5EF4-FFF2-40B4-BE49-F238E27FC236}">
+                <a16:creationId xmlns:a16="http://schemas.microsoft.com/office/drawing/2014/main" id="{C2AE8896-E5A3-4790-9F67-4A2C0091A6E9}"/>
+              </a:ext>
+            </a:extLst>
+          </p:cNvPr>
+          <p:cNvSpPr txBox="1"/>
+          <p:nvPr/>
+        </p:nvSpPr>
+        <p:spPr>
+          <a:xfrm>
+            <a:off x="1092764" y="6231018"/>
+            <a:ext cx="7207173" cy="369332"/>
+          </a:xfrm>
+          <a:prstGeom prst="rect">
+            <a:avLst/>
+          </a:prstGeom>
+          <a:noFill/>
+        </p:spPr>
+        <p:txBody>
+          <a:bodyPr wrap="square">
+            <a:spAutoFit/>
+          </a:bodyPr>
+          <a:lstStyle/>
+          <a:p>
+            <a:r>
+              <a:rPr lang="en-GB" dirty="0"/>
+              <a:t>Open </a:t>
+            </a:r>
+            <a:r>
+              <a:rPr lang="en-GB" dirty="0">
+                <a:hlinkClick r:id="rId3"/>
+              </a:rPr>
+              <a:t>https://pad.carpentries.org/2021-10-22_ed-dash_fair-bio-practice</a:t>
+            </a:r>
+            <a:r>
+              <a:rPr lang="en-GB" dirty="0"/>
+              <a:t> </a:t>
+            </a:r>
+            <a:endParaRPr lang="en-GB" dirty="0">
+              <a:highlight>
+                <a:srgbClr val="FFFF00"/>
+              </a:highlight>
+            </a:endParaRPr>
+          </a:p>
+        </p:txBody>
+      </p:sp>
+      <p:sp>
+        <p:nvSpPr>
+          <p:cNvPr id="7" name="Arrow: Down 6">
+            <a:extLst>
+              <a:ext uri="{FF2B5EF4-FFF2-40B4-BE49-F238E27FC236}">
+                <a16:creationId xmlns:a16="http://schemas.microsoft.com/office/drawing/2014/main" id="{CB1E8065-DB68-4D67-AAEF-E9F39A3AFDD1}"/>
+              </a:ext>
+            </a:extLst>
+          </p:cNvPr>
+          <p:cNvSpPr/>
+          <p:nvPr/>
+        </p:nvSpPr>
+        <p:spPr>
+          <a:xfrm rot="16200000">
+            <a:off x="410999" y="6105291"/>
+            <a:ext cx="469783" cy="620786"/>
+          </a:xfrm>
+          <a:prstGeom prst="downArrow">
+            <a:avLst/>
+          </a:prstGeom>
+        </p:spPr>
+        <p:style>
+          <a:lnRef idx="2">
+            <a:schemeClr val="accent1">
+              <a:shade val="50000"/>
+            </a:schemeClr>
+          </a:lnRef>
+          <a:fillRef idx="1">
+            <a:schemeClr val="accent1"/>
+          </a:fillRef>
+          <a:effectRef idx="0">
+            <a:schemeClr val="accent1"/>
+          </a:effectRef>
+          <a:fontRef idx="minor">
+            <a:schemeClr val="lt1"/>
+          </a:fontRef>
+        </p:style>
+        <p:txBody>
+          <a:bodyPr rtlCol="0" anchor="ctr"/>
+          <a:lstStyle/>
+          <a:p>
+            <a:pPr algn="ctr"/>
+            <a:endParaRPr lang="en-GB"/>
+          </a:p>
+        </p:txBody>
+      </p:sp>
     </p:spTree>
     <p:extLst>
       <p:ext uri="{BB962C8B-B14F-4D97-AF65-F5344CB8AC3E}">
         <p14:creationId xmlns:p14="http://schemas.microsoft.com/office/powerpoint/2010/main" val="4286087962"/>
+      </p:ext>
+    </p:extLst>
+  </p:cSld>
+  <p:clrMapOvr>
+    <a:masterClrMapping/>
+  </p:clrMapOvr>
+</p:sld>
+</file>
+
+<file path=ppt/slides/slide20.xml><?xml version="1.0" encoding="utf-8"?>
+<p:sld xmlns:a="http://schemas.openxmlformats.org/drawingml/2006/main" xmlns:r="http://schemas.openxmlformats.org/officeDocument/2006/relationships" xmlns:p="http://schemas.openxmlformats.org/presentationml/2006/main">
+  <p:cSld>
+    <p:spTree>
+      <p:nvGrpSpPr>
+        <p:cNvPr id="1" name=""/>
+        <p:cNvGrpSpPr/>
+        <p:nvPr/>
+      </p:nvGrpSpPr>
+      <p:grpSpPr>
+        <a:xfrm>
+          <a:off x="0" y="0"/>
+          <a:ext cx="0" cy="0"/>
+          <a:chOff x="0" y="0"/>
+          <a:chExt cx="0" cy="0"/>
+        </a:xfrm>
+      </p:grpSpPr>
+      <p:sp>
+        <p:nvSpPr>
+          <p:cNvPr id="2" name="Title 1">
+            <a:extLst>
+              <a:ext uri="{FF2B5EF4-FFF2-40B4-BE49-F238E27FC236}">
+                <a16:creationId xmlns:a16="http://schemas.microsoft.com/office/drawing/2014/main" id="{3A5186E0-B0CC-4664-8D5D-FE79BD5CB56F}"/>
+              </a:ext>
+            </a:extLst>
+          </p:cNvPr>
+          <p:cNvSpPr>
+            <a:spLocks noGrp="1"/>
+          </p:cNvSpPr>
+          <p:nvPr>
+            <p:ph type="title"/>
+          </p:nvPr>
+        </p:nvSpPr>
+        <p:spPr>
+          <a:xfrm>
+            <a:off x="114300" y="247185"/>
+            <a:ext cx="9267825" cy="789295"/>
+          </a:xfrm>
+        </p:spPr>
+        <p:txBody>
+          <a:bodyPr>
+            <a:normAutofit/>
+          </a:bodyPr>
+          <a:lstStyle/>
+          <a:p>
+            <a:r>
+              <a:rPr lang="en-GB" sz="4000" dirty="0">
+                <a:solidFill>
+                  <a:srgbClr val="0070C0"/>
+                </a:solidFill>
+              </a:rPr>
+              <a:t>Data Management Plan Quiz - Solutions</a:t>
+            </a:r>
+          </a:p>
+        </p:txBody>
+      </p:sp>
+      <p:pic>
+        <p:nvPicPr>
+          <p:cNvPr id="5" name="Graphic 4" descr="Questions with solid fill">
+            <a:extLst>
+              <a:ext uri="{FF2B5EF4-FFF2-40B4-BE49-F238E27FC236}">
+                <a16:creationId xmlns:a16="http://schemas.microsoft.com/office/drawing/2014/main" id="{02CE7069-253F-AF44-8C83-23BBE5DB1723}"/>
+              </a:ext>
+            </a:extLst>
+          </p:cNvPr>
+          <p:cNvPicPr>
+            <a:picLocks noChangeAspect="1"/>
+          </p:cNvPicPr>
+          <p:nvPr/>
+        </p:nvPicPr>
+        <p:blipFill>
+          <a:blip r:embed="rId3">
+            <a:extLst>
+              <a:ext uri="{28A0092B-C50C-407E-A947-70E740481C1C}">
+                <a14:useLocalDpi xmlns:a14="http://schemas.microsoft.com/office/drawing/2010/main" val="0"/>
+              </a:ext>
+              <a:ext uri="{96DAC541-7B7A-43D3-8B79-37D633B846F1}">
+                <asvg:svgBlip xmlns:asvg="http://schemas.microsoft.com/office/drawing/2016/SVG/main" r:embed="rId4"/>
+              </a:ext>
+            </a:extLst>
+          </a:blip>
+          <a:stretch>
+            <a:fillRect/>
+          </a:stretch>
+        </p:blipFill>
+        <p:spPr>
+          <a:xfrm>
+            <a:off x="8906930" y="3428999"/>
+            <a:ext cx="3217333" cy="3217333"/>
+          </a:xfrm>
+          <a:prstGeom prst="rect">
+            <a:avLst/>
+          </a:prstGeom>
+        </p:spPr>
+      </p:pic>
+      <p:sp>
+        <p:nvSpPr>
+          <p:cNvPr id="6" name="TextBox 5">
+            <a:extLst>
+              <a:ext uri="{FF2B5EF4-FFF2-40B4-BE49-F238E27FC236}">
+                <a16:creationId xmlns:a16="http://schemas.microsoft.com/office/drawing/2014/main" id="{096B19E8-A17A-4167-BCEB-313B5DE2C0A9}"/>
+              </a:ext>
+            </a:extLst>
+          </p:cNvPr>
+          <p:cNvSpPr txBox="1"/>
+          <p:nvPr/>
+        </p:nvSpPr>
+        <p:spPr>
+          <a:xfrm>
+            <a:off x="881590" y="1305340"/>
+            <a:ext cx="8424335" cy="4593565"/>
+          </a:xfrm>
+          <a:prstGeom prst="rect">
+            <a:avLst/>
+          </a:prstGeom>
+          <a:noFill/>
+        </p:spPr>
+        <p:txBody>
+          <a:bodyPr wrap="square">
+            <a:spAutoFit/>
+          </a:bodyPr>
+          <a:lstStyle/>
+          <a:p>
+            <a:pPr algn="l">
+              <a:spcAft>
+                <a:spcPts val="300"/>
+              </a:spcAft>
+            </a:pPr>
+            <a:r>
+              <a:rPr lang="en-GB" b="0" i="0" dirty="0">
+                <a:solidFill>
+                  <a:srgbClr val="485365"/>
+                </a:solidFill>
+                <a:effectLst/>
+                <a:latin typeface="Quicksand"/>
+              </a:rPr>
+              <a:t>1. The best time to do data management is at the end of a project, when you've collected all the data you're managing. </a:t>
+            </a:r>
+            <a:r>
+              <a:rPr lang="en-GB" b="0" i="0" dirty="0">
+                <a:solidFill>
+                  <a:srgbClr val="C00000"/>
+                </a:solidFill>
+                <a:effectLst/>
+                <a:latin typeface="Quicksand"/>
+              </a:rPr>
+              <a:t>FALSE</a:t>
+            </a:r>
+          </a:p>
+          <a:p>
+            <a:pPr algn="l">
+              <a:spcAft>
+                <a:spcPts val="300"/>
+              </a:spcAft>
+            </a:pPr>
+            <a:r>
+              <a:rPr lang="en-GB" b="0" i="0" dirty="0">
+                <a:solidFill>
+                  <a:srgbClr val="485365"/>
+                </a:solidFill>
+                <a:effectLst/>
+                <a:latin typeface="Quicksand"/>
+              </a:rPr>
+              <a:t>2. Data management plans (DMPs) detail what will happen to data before collection begins. </a:t>
+            </a:r>
+            <a:r>
+              <a:rPr lang="en-GB" b="0" i="0" dirty="0">
+                <a:solidFill>
+                  <a:srgbClr val="00B050"/>
+                </a:solidFill>
+                <a:effectLst/>
+                <a:latin typeface="Quicksand"/>
+              </a:rPr>
+              <a:t>TRUE</a:t>
+            </a:r>
+          </a:p>
+          <a:p>
+            <a:pPr algn="l">
+              <a:spcAft>
+                <a:spcPts val="300"/>
+              </a:spcAft>
+            </a:pPr>
+            <a:r>
+              <a:rPr lang="en-GB" b="0" i="0" dirty="0">
+                <a:solidFill>
+                  <a:srgbClr val="485365"/>
+                </a:solidFill>
+                <a:effectLst/>
+                <a:latin typeface="Quicksand"/>
+              </a:rPr>
+              <a:t>3. The best storage method for data is multiple backups to USBs. </a:t>
+            </a:r>
+            <a:r>
+              <a:rPr lang="en-GB" b="0" i="0" dirty="0">
+                <a:solidFill>
+                  <a:srgbClr val="C00000"/>
+                </a:solidFill>
+                <a:effectLst/>
+                <a:latin typeface="Quicksand"/>
+              </a:rPr>
+              <a:t>FALSE</a:t>
+            </a:r>
+            <a:endParaRPr lang="en-GB" b="0" i="0" dirty="0">
+              <a:solidFill>
+                <a:srgbClr val="485365"/>
+              </a:solidFill>
+              <a:effectLst/>
+              <a:latin typeface="Quicksand"/>
+            </a:endParaRPr>
+          </a:p>
+          <a:p>
+            <a:pPr algn="l">
+              <a:spcAft>
+                <a:spcPts val="300"/>
+              </a:spcAft>
+            </a:pPr>
+            <a:r>
+              <a:rPr lang="en-GB" b="0" i="0" dirty="0">
+                <a:solidFill>
+                  <a:srgbClr val="485365"/>
+                </a:solidFill>
+                <a:effectLst/>
+                <a:latin typeface="Quicksand"/>
+              </a:rPr>
+              <a:t>4. There is a single best way to manage, organise, and share data. </a:t>
+            </a:r>
+            <a:r>
+              <a:rPr lang="en-GB" b="0" i="0" dirty="0">
+                <a:solidFill>
+                  <a:srgbClr val="C00000"/>
+                </a:solidFill>
+                <a:effectLst/>
+                <a:latin typeface="Quicksand"/>
+              </a:rPr>
+              <a:t>FALSE</a:t>
+            </a:r>
+            <a:endParaRPr lang="en-GB" b="0" i="0" dirty="0">
+              <a:solidFill>
+                <a:srgbClr val="485365"/>
+              </a:solidFill>
+              <a:effectLst/>
+              <a:latin typeface="Quicksand"/>
+            </a:endParaRPr>
+          </a:p>
+          <a:p>
+            <a:pPr>
+              <a:spcAft>
+                <a:spcPts val="300"/>
+              </a:spcAft>
+            </a:pPr>
+            <a:r>
+              <a:rPr lang="en-GB" b="0" i="0" dirty="0">
+                <a:solidFill>
+                  <a:srgbClr val="485365"/>
+                </a:solidFill>
+                <a:effectLst/>
+                <a:latin typeface="Quicksand"/>
+              </a:rPr>
+              <a:t>5. For grant applications, DMPs should mention data preservation, longevity, sharing, discover, and reuse. </a:t>
+            </a:r>
+            <a:r>
+              <a:rPr lang="en-GB" b="0" i="0" dirty="0">
+                <a:solidFill>
+                  <a:srgbClr val="00B050"/>
+                </a:solidFill>
+                <a:effectLst/>
+                <a:latin typeface="Quicksand"/>
+              </a:rPr>
+              <a:t>TRUE</a:t>
+            </a:r>
+            <a:endParaRPr lang="en-GB" b="0" i="0" dirty="0">
+              <a:solidFill>
+                <a:srgbClr val="485365"/>
+              </a:solidFill>
+              <a:effectLst/>
+              <a:latin typeface="Quicksand"/>
+            </a:endParaRPr>
+          </a:p>
+          <a:p>
+            <a:pPr>
+              <a:spcAft>
+                <a:spcPts val="300"/>
+              </a:spcAft>
+            </a:pPr>
+            <a:r>
+              <a:rPr lang="en-GB" b="0" i="0" dirty="0">
+                <a:solidFill>
+                  <a:srgbClr val="485365"/>
+                </a:solidFill>
+                <a:effectLst/>
+                <a:latin typeface="Quicksand"/>
+              </a:rPr>
+              <a:t>6. Your metadata should be standardised and descriptive. </a:t>
+            </a:r>
+            <a:r>
+              <a:rPr lang="en-GB" b="0" i="0" dirty="0">
+                <a:solidFill>
+                  <a:srgbClr val="00B050"/>
+                </a:solidFill>
+                <a:effectLst/>
+                <a:latin typeface="Quicksand"/>
+              </a:rPr>
+              <a:t>TRUE</a:t>
+            </a:r>
+            <a:endParaRPr lang="en-GB" b="0" i="0" dirty="0">
+              <a:solidFill>
+                <a:srgbClr val="485365"/>
+              </a:solidFill>
+              <a:effectLst/>
+              <a:latin typeface="Quicksand"/>
+            </a:endParaRPr>
+          </a:p>
+          <a:p>
+            <a:pPr>
+              <a:spcAft>
+                <a:spcPts val="300"/>
+              </a:spcAft>
+            </a:pPr>
+            <a:r>
+              <a:rPr lang="en-GB" b="0" i="0" dirty="0">
+                <a:solidFill>
+                  <a:srgbClr val="485365"/>
+                </a:solidFill>
+                <a:effectLst/>
+                <a:latin typeface="Quicksand"/>
+              </a:rPr>
+              <a:t>7. Taking the time to plan out what's needed in metadata and your DMP will save you time in the long run and make your data more FAIR. </a:t>
+            </a:r>
+            <a:r>
+              <a:rPr lang="en-GB" b="0" i="0" dirty="0">
+                <a:solidFill>
+                  <a:srgbClr val="00B050"/>
+                </a:solidFill>
+                <a:effectLst/>
+                <a:latin typeface="Quicksand"/>
+              </a:rPr>
+              <a:t>TRUE</a:t>
+            </a:r>
+            <a:endParaRPr lang="en-GB" b="0" i="0" dirty="0">
+              <a:solidFill>
+                <a:srgbClr val="485365"/>
+              </a:solidFill>
+              <a:effectLst/>
+              <a:latin typeface="Quicksand"/>
+            </a:endParaRPr>
+          </a:p>
+          <a:p>
+            <a:pPr algn="l">
+              <a:spcAft>
+                <a:spcPts val="300"/>
+              </a:spcAft>
+            </a:pPr>
+            <a:r>
+              <a:rPr lang="en-GB" b="0" i="0" dirty="0">
+                <a:solidFill>
+                  <a:srgbClr val="485365"/>
+                </a:solidFill>
+                <a:effectLst/>
+                <a:latin typeface="Quicksand"/>
+              </a:rPr>
+              <a:t>8. DMP online is a tool which constructs DMPs for researchers. </a:t>
+            </a:r>
+            <a:r>
+              <a:rPr lang="en-GB" b="0" i="0" dirty="0">
+                <a:solidFill>
+                  <a:srgbClr val="C00000"/>
+                </a:solidFill>
+                <a:effectLst/>
+                <a:latin typeface="Quicksand"/>
+              </a:rPr>
+              <a:t>FALSE</a:t>
+            </a:r>
+            <a:endParaRPr lang="en-GB" b="0" i="0" dirty="0">
+              <a:solidFill>
+                <a:srgbClr val="485365"/>
+              </a:solidFill>
+              <a:effectLst/>
+              <a:latin typeface="Quicksand"/>
+            </a:endParaRPr>
+          </a:p>
+          <a:p>
+            <a:pPr algn="l">
+              <a:spcAft>
+                <a:spcPts val="300"/>
+              </a:spcAft>
+            </a:pPr>
+            <a:r>
+              <a:rPr lang="en-GB" b="0" i="0" dirty="0">
+                <a:solidFill>
+                  <a:srgbClr val="485365"/>
+                </a:solidFill>
+                <a:effectLst/>
+                <a:latin typeface="Quicksand"/>
+              </a:rPr>
+              <a:t>9. Data addressed in a DMP can be freely shared regardless of confidentiality. </a:t>
+            </a:r>
+            <a:r>
+              <a:rPr lang="en-GB" b="0" i="0" dirty="0">
+                <a:solidFill>
+                  <a:srgbClr val="C00000"/>
+                </a:solidFill>
+                <a:effectLst/>
+                <a:latin typeface="Quicksand"/>
+              </a:rPr>
+              <a:t>FALSE</a:t>
+            </a:r>
+            <a:endParaRPr lang="en-GB" b="0" i="0" dirty="0">
+              <a:solidFill>
+                <a:srgbClr val="485365"/>
+              </a:solidFill>
+              <a:effectLst/>
+              <a:latin typeface="Quicksand"/>
+            </a:endParaRPr>
+          </a:p>
+          <a:p>
+            <a:pPr>
+              <a:spcAft>
+                <a:spcPts val="300"/>
+              </a:spcAft>
+            </a:pPr>
+            <a:r>
+              <a:rPr lang="en-GB" b="0" i="0" dirty="0">
+                <a:solidFill>
+                  <a:srgbClr val="485365"/>
+                </a:solidFill>
+                <a:effectLst/>
+                <a:latin typeface="Quicksand"/>
+              </a:rPr>
+              <a:t>10. Data can be given creative commons licenses to dictate how others can and cannot use it. </a:t>
+            </a:r>
+            <a:r>
+              <a:rPr lang="en-GB" b="0" i="0" dirty="0">
+                <a:solidFill>
+                  <a:srgbClr val="00B050"/>
+                </a:solidFill>
+                <a:effectLst/>
+                <a:latin typeface="Quicksand"/>
+              </a:rPr>
+              <a:t>TRUE</a:t>
+            </a:r>
+          </a:p>
+        </p:txBody>
+      </p:sp>
+    </p:spTree>
+    <p:extLst>
+      <p:ext uri="{BB962C8B-B14F-4D97-AF65-F5344CB8AC3E}">
+        <p14:creationId xmlns:p14="http://schemas.microsoft.com/office/powerpoint/2010/main" val="3419029319"/>
       </p:ext>
     </p:extLst>
   </p:cSld>
@@ -11119,6 +12405,102 @@
           </a:extLst>
         </p:spPr>
       </p:pic>
+      <p:sp>
+        <p:nvSpPr>
+          <p:cNvPr id="6" name="TextBox 5">
+            <a:extLst>
+              <a:ext uri="{FF2B5EF4-FFF2-40B4-BE49-F238E27FC236}">
+                <a16:creationId xmlns:a16="http://schemas.microsoft.com/office/drawing/2014/main" id="{5898D60A-D2FF-4D34-AAC5-383D66B6AF44}"/>
+              </a:ext>
+            </a:extLst>
+          </p:cNvPr>
+          <p:cNvSpPr txBox="1"/>
+          <p:nvPr/>
+        </p:nvSpPr>
+        <p:spPr>
+          <a:xfrm>
+            <a:off x="1092764" y="6231018"/>
+            <a:ext cx="7207173" cy="369332"/>
+          </a:xfrm>
+          <a:prstGeom prst="rect">
+            <a:avLst/>
+          </a:prstGeom>
+          <a:noFill/>
+        </p:spPr>
+        <p:txBody>
+          <a:bodyPr wrap="square">
+            <a:spAutoFit/>
+          </a:bodyPr>
+          <a:lstStyle/>
+          <a:p>
+            <a:r>
+              <a:rPr lang="en-GB" dirty="0"/>
+              <a:t>Open </a:t>
+            </a:r>
+            <a:r>
+              <a:rPr lang="en-GB" dirty="0">
+                <a:hlinkClick r:id="rId3"/>
+              </a:rPr>
+              <a:t>https://pad.carpentries.org/2021-10-22_ed-dash_fair-bio-practice</a:t>
+            </a:r>
+            <a:r>
+              <a:rPr lang="en-GB" dirty="0"/>
+              <a:t> </a:t>
+            </a:r>
+            <a:endParaRPr lang="en-GB" dirty="0">
+              <a:highlight>
+                <a:srgbClr val="FFFF00"/>
+              </a:highlight>
+            </a:endParaRPr>
+          </a:p>
+        </p:txBody>
+      </p:sp>
+      <p:sp>
+        <p:nvSpPr>
+          <p:cNvPr id="7" name="Arrow: Down 6">
+            <a:extLst>
+              <a:ext uri="{FF2B5EF4-FFF2-40B4-BE49-F238E27FC236}">
+                <a16:creationId xmlns:a16="http://schemas.microsoft.com/office/drawing/2014/main" id="{4AD9B64B-8F85-4F6D-B02B-9978D4B7BB25}"/>
+              </a:ext>
+            </a:extLst>
+          </p:cNvPr>
+          <p:cNvSpPr/>
+          <p:nvPr/>
+        </p:nvSpPr>
+        <p:spPr>
+          <a:xfrm rot="16200000">
+            <a:off x="410999" y="6105291"/>
+            <a:ext cx="469783" cy="620786"/>
+          </a:xfrm>
+          <a:prstGeom prst="downArrow">
+            <a:avLst/>
+          </a:prstGeom>
+        </p:spPr>
+        <p:style>
+          <a:lnRef idx="2">
+            <a:schemeClr val="accent1">
+              <a:shade val="50000"/>
+            </a:schemeClr>
+          </a:lnRef>
+          <a:fillRef idx="1">
+            <a:schemeClr val="accent1"/>
+          </a:fillRef>
+          <a:effectRef idx="0">
+            <a:schemeClr val="accent1"/>
+          </a:effectRef>
+          <a:fontRef idx="minor">
+            <a:schemeClr val="lt1"/>
+          </a:fontRef>
+        </p:style>
+        <p:txBody>
+          <a:bodyPr rtlCol="0" anchor="ctr"/>
+          <a:lstStyle/>
+          <a:p>
+            <a:pPr algn="ctr"/>
+            <a:endParaRPr lang="en-GB"/>
+          </a:p>
+        </p:txBody>
+      </p:sp>
     </p:spTree>
     <p:extLst>
       <p:ext uri="{BB962C8B-B14F-4D97-AF65-F5344CB8AC3E}">

</xml_diff>